<commit_message>
accommodation plots updated and presentation updated
accommodation plots updated and presentation updated
</commit_message>
<xml_diff>
--- a/presentation/visit_scotland_presentation.pptx
+++ b/presentation/visit_scotland_presentation.pptx
@@ -2150,6 +2150,11 @@
               <a:rPr lang="en-US" sz="1200" dirty="0"/>
               <a:t> is most popular? Is there a difference by location?</a:t>
             </a:r>
+          </a:p>
+          <a:p>
+            <a:endParaRPr lang="en-US" sz="1200" dirty="0"/>
+          </a:p>
+          <a:p>
             <a:endParaRPr lang="en-US" dirty="0"/>
           </a:p>
         </p:txBody>
@@ -24776,6 +24781,743 @@
       </p:grpSpPr>
       <p:sp>
         <p:nvSpPr>
+          <p:cNvPr id="37" name="Rectangle 36">
+            <a:extLst>
+              <a:ext uri="{FF2B5EF4-FFF2-40B4-BE49-F238E27FC236}">
+                <a16:creationId xmlns:a16="http://schemas.microsoft.com/office/drawing/2014/main" id="{4D564D1C-BBBA-41AB-8D3D-65E6513686EA}"/>
+              </a:ext>
+              <a:ext uri="{C183D7F6-B498-43B3-948B-1728B52AA6E4}">
+                <adec:decorative xmlns:adec="http://schemas.microsoft.com/office/drawing/2017/decorative" val="1"/>
+              </a:ext>
+            </a:extLst>
+          </p:cNvPr>
+          <p:cNvSpPr>
+            <a:spLocks noGrp="1" noRot="1" noChangeAspect="1" noMove="1" noResize="1" noEditPoints="1" noAdjustHandles="1" noChangeArrowheads="1" noChangeShapeType="1" noTextEdit="1"/>
+          </p:cNvSpPr>
+          <p:nvPr>
+            <p:extLst>
+              <p:ext uri="{386F3935-93C4-4BCD-93E2-E3B085C9AB24}">
+                <p16:designElem xmlns:p16="http://schemas.microsoft.com/office/powerpoint/2015/main" val="1"/>
+              </p:ext>
+            </p:extLst>
+          </p:nvPr>
+        </p:nvSpPr>
+        <p:spPr>
+          <a:xfrm>
+            <a:off x="0" y="0"/>
+            <a:ext cx="12192000" cy="6858000"/>
+          </a:xfrm>
+          <a:prstGeom prst="rect">
+            <a:avLst/>
+          </a:prstGeom>
+          <a:solidFill>
+            <a:schemeClr val="bg1"/>
+          </a:solidFill>
+          <a:ln>
+            <a:noFill/>
+          </a:ln>
+        </p:spPr>
+        <p:style>
+          <a:lnRef idx="2">
+            <a:schemeClr val="accent1">
+              <a:shade val="50000"/>
+            </a:schemeClr>
+          </a:lnRef>
+          <a:fillRef idx="1">
+            <a:schemeClr val="accent1"/>
+          </a:fillRef>
+          <a:effectRef idx="0">
+            <a:schemeClr val="accent1"/>
+          </a:effectRef>
+          <a:fontRef idx="minor">
+            <a:schemeClr val="lt1"/>
+          </a:fontRef>
+        </p:style>
+        <p:txBody>
+          <a:bodyPr rtlCol="0" anchor="ctr"/>
+          <a:lstStyle/>
+          <a:p>
+            <a:pPr algn="ctr"/>
+            <a:endParaRPr lang="en-US"/>
+          </a:p>
+        </p:txBody>
+      </p:sp>
+      <p:sp>
+        <p:nvSpPr>
+          <p:cNvPr id="39" name="Rectangle 38">
+            <a:extLst>
+              <a:ext uri="{FF2B5EF4-FFF2-40B4-BE49-F238E27FC236}">
+                <a16:creationId xmlns:a16="http://schemas.microsoft.com/office/drawing/2014/main" id="{4D63F519-D67F-403F-938E-102A5A37D900}"/>
+              </a:ext>
+              <a:ext uri="{C183D7F6-B498-43B3-948B-1728B52AA6E4}">
+                <adec:decorative xmlns:adec="http://schemas.microsoft.com/office/drawing/2017/decorative" val="1"/>
+              </a:ext>
+            </a:extLst>
+          </p:cNvPr>
+          <p:cNvSpPr>
+            <a:spLocks noGrp="1" noRot="1" noChangeAspect="1" noMove="1" noResize="1" noEditPoints="1" noAdjustHandles="1" noChangeArrowheads="1" noChangeShapeType="1" noTextEdit="1"/>
+          </p:cNvSpPr>
+          <p:nvPr>
+            <p:extLst>
+              <p:ext uri="{386F3935-93C4-4BCD-93E2-E3B085C9AB24}">
+                <p16:designElem xmlns:p16="http://schemas.microsoft.com/office/powerpoint/2015/main" val="1"/>
+              </p:ext>
+            </p:extLst>
+          </p:nvPr>
+        </p:nvSpPr>
+        <p:spPr>
+          <a:xfrm>
+            <a:off x="10437812" y="0"/>
+            <a:ext cx="685800" cy="1143000"/>
+          </a:xfrm>
+          <a:prstGeom prst="rect">
+            <a:avLst/>
+          </a:prstGeom>
+          <a:solidFill>
+            <a:schemeClr val="accent1"/>
+          </a:solidFill>
+          <a:ln>
+            <a:noFill/>
+          </a:ln>
+        </p:spPr>
+        <p:style>
+          <a:lnRef idx="1">
+            <a:schemeClr val="accent1"/>
+          </a:lnRef>
+          <a:fillRef idx="3">
+            <a:schemeClr val="accent1"/>
+          </a:fillRef>
+          <a:effectRef idx="2">
+            <a:schemeClr val="accent1"/>
+          </a:effectRef>
+          <a:fontRef idx="minor">
+            <a:schemeClr val="lt1"/>
+          </a:fontRef>
+        </p:style>
+      </p:sp>
+      <p:sp>
+        <p:nvSpPr>
+          <p:cNvPr id="41" name="Freeform: Shape 40">
+            <a:extLst>
+              <a:ext uri="{FF2B5EF4-FFF2-40B4-BE49-F238E27FC236}">
+                <a16:creationId xmlns:a16="http://schemas.microsoft.com/office/drawing/2014/main" id="{0690B2E9-00B3-4554-8C5C-2D5134ADF40E}"/>
+              </a:ext>
+              <a:ext uri="{C183D7F6-B498-43B3-948B-1728B52AA6E4}">
+                <adec:decorative xmlns:adec="http://schemas.microsoft.com/office/drawing/2017/decorative" val="1"/>
+              </a:ext>
+            </a:extLst>
+          </p:cNvPr>
+          <p:cNvSpPr>
+            <a:spLocks noGrp="1" noRot="1" noChangeAspect="1" noMove="1" noResize="1" noEditPoints="1" noAdjustHandles="1" noChangeArrowheads="1" noChangeShapeType="1" noTextEdit="1"/>
+          </p:cNvSpPr>
+          <p:nvPr>
+            <p:extLst>
+              <p:ext uri="{386F3935-93C4-4BCD-93E2-E3B085C9AB24}">
+                <p16:designElem xmlns:p16="http://schemas.microsoft.com/office/powerpoint/2015/main" val="1"/>
+              </p:ext>
+            </p:extLst>
+          </p:nvPr>
+        </p:nvSpPr>
+        <p:spPr>
+          <a:xfrm>
+            <a:off x="457200" y="4133850"/>
+            <a:ext cx="11277600" cy="2250018"/>
+          </a:xfrm>
+          <a:custGeom>
+            <a:avLst/>
+            <a:gdLst>
+              <a:gd name="connsiteX0" fmla="*/ 5264150 w 11277600"/>
+              <a:gd name="connsiteY0" fmla="*/ 0 h 2250018"/>
+              <a:gd name="connsiteX1" fmla="*/ 5499100 w 11277600"/>
+              <a:gd name="connsiteY1" fmla="*/ 1588 h 2250018"/>
+              <a:gd name="connsiteX2" fmla="*/ 5730875 w 11277600"/>
+              <a:gd name="connsiteY2" fmla="*/ 1588 h 2250018"/>
+              <a:gd name="connsiteX3" fmla="*/ 5961063 w 11277600"/>
+              <a:gd name="connsiteY3" fmla="*/ 4763 h 2250018"/>
+              <a:gd name="connsiteX4" fmla="*/ 6186488 w 11277600"/>
+              <a:gd name="connsiteY4" fmla="*/ 9525 h 2250018"/>
+              <a:gd name="connsiteX5" fmla="*/ 6410325 w 11277600"/>
+              <a:gd name="connsiteY5" fmla="*/ 14288 h 2250018"/>
+              <a:gd name="connsiteX6" fmla="*/ 6629400 w 11277600"/>
+              <a:gd name="connsiteY6" fmla="*/ 19050 h 2250018"/>
+              <a:gd name="connsiteX7" fmla="*/ 6846888 w 11277600"/>
+              <a:gd name="connsiteY7" fmla="*/ 26988 h 2250018"/>
+              <a:gd name="connsiteX8" fmla="*/ 7061200 w 11277600"/>
+              <a:gd name="connsiteY8" fmla="*/ 34925 h 2250018"/>
+              <a:gd name="connsiteX9" fmla="*/ 7270750 w 11277600"/>
+              <a:gd name="connsiteY9" fmla="*/ 42863 h 2250018"/>
+              <a:gd name="connsiteX10" fmla="*/ 7680325 w 11277600"/>
+              <a:gd name="connsiteY10" fmla="*/ 63500 h 2250018"/>
+              <a:gd name="connsiteX11" fmla="*/ 8072438 w 11277600"/>
+              <a:gd name="connsiteY11" fmla="*/ 85725 h 2250018"/>
+              <a:gd name="connsiteX12" fmla="*/ 8448675 w 11277600"/>
+              <a:gd name="connsiteY12" fmla="*/ 109538 h 2250018"/>
+              <a:gd name="connsiteX13" fmla="*/ 8805862 w 11277600"/>
+              <a:gd name="connsiteY13" fmla="*/ 134938 h 2250018"/>
+              <a:gd name="connsiteX14" fmla="*/ 9145588 w 11277600"/>
+              <a:gd name="connsiteY14" fmla="*/ 161925 h 2250018"/>
+              <a:gd name="connsiteX15" fmla="*/ 9461500 w 11277600"/>
+              <a:gd name="connsiteY15" fmla="*/ 190500 h 2250018"/>
+              <a:gd name="connsiteX16" fmla="*/ 9758362 w 11277600"/>
+              <a:gd name="connsiteY16" fmla="*/ 219075 h 2250018"/>
+              <a:gd name="connsiteX17" fmla="*/ 10031412 w 11277600"/>
+              <a:gd name="connsiteY17" fmla="*/ 247650 h 2250018"/>
+              <a:gd name="connsiteX18" fmla="*/ 10282238 w 11277600"/>
+              <a:gd name="connsiteY18" fmla="*/ 274638 h 2250018"/>
+              <a:gd name="connsiteX19" fmla="*/ 10504488 w 11277600"/>
+              <a:gd name="connsiteY19" fmla="*/ 300038 h 2250018"/>
+              <a:gd name="connsiteX20" fmla="*/ 10704512 w 11277600"/>
+              <a:gd name="connsiteY20" fmla="*/ 323850 h 2250018"/>
+              <a:gd name="connsiteX21" fmla="*/ 10874375 w 11277600"/>
+              <a:gd name="connsiteY21" fmla="*/ 344488 h 2250018"/>
+              <a:gd name="connsiteX22" fmla="*/ 11015662 w 11277600"/>
+              <a:gd name="connsiteY22" fmla="*/ 363538 h 2250018"/>
+              <a:gd name="connsiteX23" fmla="*/ 11210925 w 11277600"/>
+              <a:gd name="connsiteY23" fmla="*/ 390525 h 2250018"/>
+              <a:gd name="connsiteX24" fmla="*/ 11277600 w 11277600"/>
+              <a:gd name="connsiteY24" fmla="*/ 400050 h 2250018"/>
+              <a:gd name="connsiteX25" fmla="*/ 11277600 w 11277600"/>
+              <a:gd name="connsiteY25" fmla="*/ 2250018 h 2250018"/>
+              <a:gd name="connsiteX26" fmla="*/ 0 w 11277600"/>
+              <a:gd name="connsiteY26" fmla="*/ 2250018 h 2250018"/>
+              <a:gd name="connsiteX27" fmla="*/ 0 w 11277600"/>
+              <a:gd name="connsiteY27" fmla="*/ 398463 h 2250018"/>
+              <a:gd name="connsiteX28" fmla="*/ 255588 w 11277600"/>
+              <a:gd name="connsiteY28" fmla="*/ 358775 h 2250018"/>
+              <a:gd name="connsiteX29" fmla="*/ 511175 w 11277600"/>
+              <a:gd name="connsiteY29" fmla="*/ 320675 h 2250018"/>
+              <a:gd name="connsiteX30" fmla="*/ 766762 w 11277600"/>
+              <a:gd name="connsiteY30" fmla="*/ 284163 h 2250018"/>
+              <a:gd name="connsiteX31" fmla="*/ 1023938 w 11277600"/>
+              <a:gd name="connsiteY31" fmla="*/ 252413 h 2250018"/>
+              <a:gd name="connsiteX32" fmla="*/ 1279525 w 11277600"/>
+              <a:gd name="connsiteY32" fmla="*/ 220663 h 2250018"/>
+              <a:gd name="connsiteX33" fmla="*/ 1536700 w 11277600"/>
+              <a:gd name="connsiteY33" fmla="*/ 190500 h 2250018"/>
+              <a:gd name="connsiteX34" fmla="*/ 1790700 w 11277600"/>
+              <a:gd name="connsiteY34" fmla="*/ 165100 h 2250018"/>
+              <a:gd name="connsiteX35" fmla="*/ 2047875 w 11277600"/>
+              <a:gd name="connsiteY35" fmla="*/ 141288 h 2250018"/>
+              <a:gd name="connsiteX36" fmla="*/ 2303462 w 11277600"/>
+              <a:gd name="connsiteY36" fmla="*/ 119063 h 2250018"/>
+              <a:gd name="connsiteX37" fmla="*/ 2555875 w 11277600"/>
+              <a:gd name="connsiteY37" fmla="*/ 100013 h 2250018"/>
+              <a:gd name="connsiteX38" fmla="*/ 2809875 w 11277600"/>
+              <a:gd name="connsiteY38" fmla="*/ 80963 h 2250018"/>
+              <a:gd name="connsiteX39" fmla="*/ 3062288 w 11277600"/>
+              <a:gd name="connsiteY39" fmla="*/ 65088 h 2250018"/>
+              <a:gd name="connsiteX40" fmla="*/ 3313113 w 11277600"/>
+              <a:gd name="connsiteY40" fmla="*/ 52388 h 2250018"/>
+              <a:gd name="connsiteX41" fmla="*/ 3563938 w 11277600"/>
+              <a:gd name="connsiteY41" fmla="*/ 39688 h 2250018"/>
+              <a:gd name="connsiteX42" fmla="*/ 3811588 w 11277600"/>
+              <a:gd name="connsiteY42" fmla="*/ 28575 h 2250018"/>
+              <a:gd name="connsiteX43" fmla="*/ 4057650 w 11277600"/>
+              <a:gd name="connsiteY43" fmla="*/ 20638 h 2250018"/>
+              <a:gd name="connsiteX44" fmla="*/ 4303713 w 11277600"/>
+              <a:gd name="connsiteY44" fmla="*/ 14288 h 2250018"/>
+              <a:gd name="connsiteX45" fmla="*/ 4546600 w 11277600"/>
+              <a:gd name="connsiteY45" fmla="*/ 7938 h 2250018"/>
+              <a:gd name="connsiteX46" fmla="*/ 4787900 w 11277600"/>
+              <a:gd name="connsiteY46" fmla="*/ 4763 h 2250018"/>
+              <a:gd name="connsiteX47" fmla="*/ 5027613 w 11277600"/>
+              <a:gd name="connsiteY47" fmla="*/ 1588 h 2250018"/>
+            </a:gdLst>
+            <a:ahLst/>
+            <a:cxnLst>
+              <a:cxn ang="0">
+                <a:pos x="connsiteX0" y="connsiteY0"/>
+              </a:cxn>
+              <a:cxn ang="0">
+                <a:pos x="connsiteX1" y="connsiteY1"/>
+              </a:cxn>
+              <a:cxn ang="0">
+                <a:pos x="connsiteX2" y="connsiteY2"/>
+              </a:cxn>
+              <a:cxn ang="0">
+                <a:pos x="connsiteX3" y="connsiteY3"/>
+              </a:cxn>
+              <a:cxn ang="0">
+                <a:pos x="connsiteX4" y="connsiteY4"/>
+              </a:cxn>
+              <a:cxn ang="0">
+                <a:pos x="connsiteX5" y="connsiteY5"/>
+              </a:cxn>
+              <a:cxn ang="0">
+                <a:pos x="connsiteX6" y="connsiteY6"/>
+              </a:cxn>
+              <a:cxn ang="0">
+                <a:pos x="connsiteX7" y="connsiteY7"/>
+              </a:cxn>
+              <a:cxn ang="0">
+                <a:pos x="connsiteX8" y="connsiteY8"/>
+              </a:cxn>
+              <a:cxn ang="0">
+                <a:pos x="connsiteX9" y="connsiteY9"/>
+              </a:cxn>
+              <a:cxn ang="0">
+                <a:pos x="connsiteX10" y="connsiteY10"/>
+              </a:cxn>
+              <a:cxn ang="0">
+                <a:pos x="connsiteX11" y="connsiteY11"/>
+              </a:cxn>
+              <a:cxn ang="0">
+                <a:pos x="connsiteX12" y="connsiteY12"/>
+              </a:cxn>
+              <a:cxn ang="0">
+                <a:pos x="connsiteX13" y="connsiteY13"/>
+              </a:cxn>
+              <a:cxn ang="0">
+                <a:pos x="connsiteX14" y="connsiteY14"/>
+              </a:cxn>
+              <a:cxn ang="0">
+                <a:pos x="connsiteX15" y="connsiteY15"/>
+              </a:cxn>
+              <a:cxn ang="0">
+                <a:pos x="connsiteX16" y="connsiteY16"/>
+              </a:cxn>
+              <a:cxn ang="0">
+                <a:pos x="connsiteX17" y="connsiteY17"/>
+              </a:cxn>
+              <a:cxn ang="0">
+                <a:pos x="connsiteX18" y="connsiteY18"/>
+              </a:cxn>
+              <a:cxn ang="0">
+                <a:pos x="connsiteX19" y="connsiteY19"/>
+              </a:cxn>
+              <a:cxn ang="0">
+                <a:pos x="connsiteX20" y="connsiteY20"/>
+              </a:cxn>
+              <a:cxn ang="0">
+                <a:pos x="connsiteX21" y="connsiteY21"/>
+              </a:cxn>
+              <a:cxn ang="0">
+                <a:pos x="connsiteX22" y="connsiteY22"/>
+              </a:cxn>
+              <a:cxn ang="0">
+                <a:pos x="connsiteX23" y="connsiteY23"/>
+              </a:cxn>
+              <a:cxn ang="0">
+                <a:pos x="connsiteX24" y="connsiteY24"/>
+              </a:cxn>
+              <a:cxn ang="0">
+                <a:pos x="connsiteX25" y="connsiteY25"/>
+              </a:cxn>
+              <a:cxn ang="0">
+                <a:pos x="connsiteX26" y="connsiteY26"/>
+              </a:cxn>
+              <a:cxn ang="0">
+                <a:pos x="connsiteX27" y="connsiteY27"/>
+              </a:cxn>
+              <a:cxn ang="0">
+                <a:pos x="connsiteX28" y="connsiteY28"/>
+              </a:cxn>
+              <a:cxn ang="0">
+                <a:pos x="connsiteX29" y="connsiteY29"/>
+              </a:cxn>
+              <a:cxn ang="0">
+                <a:pos x="connsiteX30" y="connsiteY30"/>
+              </a:cxn>
+              <a:cxn ang="0">
+                <a:pos x="connsiteX31" y="connsiteY31"/>
+              </a:cxn>
+              <a:cxn ang="0">
+                <a:pos x="connsiteX32" y="connsiteY32"/>
+              </a:cxn>
+              <a:cxn ang="0">
+                <a:pos x="connsiteX33" y="connsiteY33"/>
+              </a:cxn>
+              <a:cxn ang="0">
+                <a:pos x="connsiteX34" y="connsiteY34"/>
+              </a:cxn>
+              <a:cxn ang="0">
+                <a:pos x="connsiteX35" y="connsiteY35"/>
+              </a:cxn>
+              <a:cxn ang="0">
+                <a:pos x="connsiteX36" y="connsiteY36"/>
+              </a:cxn>
+              <a:cxn ang="0">
+                <a:pos x="connsiteX37" y="connsiteY37"/>
+              </a:cxn>
+              <a:cxn ang="0">
+                <a:pos x="connsiteX38" y="connsiteY38"/>
+              </a:cxn>
+              <a:cxn ang="0">
+                <a:pos x="connsiteX39" y="connsiteY39"/>
+              </a:cxn>
+              <a:cxn ang="0">
+                <a:pos x="connsiteX40" y="connsiteY40"/>
+              </a:cxn>
+              <a:cxn ang="0">
+                <a:pos x="connsiteX41" y="connsiteY41"/>
+              </a:cxn>
+              <a:cxn ang="0">
+                <a:pos x="connsiteX42" y="connsiteY42"/>
+              </a:cxn>
+              <a:cxn ang="0">
+                <a:pos x="connsiteX43" y="connsiteY43"/>
+              </a:cxn>
+              <a:cxn ang="0">
+                <a:pos x="connsiteX44" y="connsiteY44"/>
+              </a:cxn>
+              <a:cxn ang="0">
+                <a:pos x="connsiteX45" y="connsiteY45"/>
+              </a:cxn>
+              <a:cxn ang="0">
+                <a:pos x="connsiteX46" y="connsiteY46"/>
+              </a:cxn>
+              <a:cxn ang="0">
+                <a:pos x="connsiteX47" y="connsiteY47"/>
+              </a:cxn>
+            </a:cxnLst>
+            <a:rect l="l" t="t" r="r" b="b"/>
+            <a:pathLst>
+              <a:path w="11277600" h="2250018">
+                <a:moveTo>
+                  <a:pt x="5264150" y="0"/>
+                </a:moveTo>
+                <a:lnTo>
+                  <a:pt x="5499100" y="1588"/>
+                </a:lnTo>
+                <a:lnTo>
+                  <a:pt x="5730875" y="1588"/>
+                </a:lnTo>
+                <a:lnTo>
+                  <a:pt x="5961063" y="4763"/>
+                </a:lnTo>
+                <a:lnTo>
+                  <a:pt x="6186488" y="9525"/>
+                </a:lnTo>
+                <a:lnTo>
+                  <a:pt x="6410325" y="14288"/>
+                </a:lnTo>
+                <a:lnTo>
+                  <a:pt x="6629400" y="19050"/>
+                </a:lnTo>
+                <a:lnTo>
+                  <a:pt x="6846888" y="26988"/>
+                </a:lnTo>
+                <a:lnTo>
+                  <a:pt x="7061200" y="34925"/>
+                </a:lnTo>
+                <a:lnTo>
+                  <a:pt x="7270750" y="42863"/>
+                </a:lnTo>
+                <a:lnTo>
+                  <a:pt x="7680325" y="63500"/>
+                </a:lnTo>
+                <a:lnTo>
+                  <a:pt x="8072438" y="85725"/>
+                </a:lnTo>
+                <a:lnTo>
+                  <a:pt x="8448675" y="109538"/>
+                </a:lnTo>
+                <a:lnTo>
+                  <a:pt x="8805862" y="134938"/>
+                </a:lnTo>
+                <a:lnTo>
+                  <a:pt x="9145588" y="161925"/>
+                </a:lnTo>
+                <a:lnTo>
+                  <a:pt x="9461500" y="190500"/>
+                </a:lnTo>
+                <a:lnTo>
+                  <a:pt x="9758362" y="219075"/>
+                </a:lnTo>
+                <a:lnTo>
+                  <a:pt x="10031412" y="247650"/>
+                </a:lnTo>
+                <a:lnTo>
+                  <a:pt x="10282238" y="274638"/>
+                </a:lnTo>
+                <a:lnTo>
+                  <a:pt x="10504488" y="300038"/>
+                </a:lnTo>
+                <a:lnTo>
+                  <a:pt x="10704512" y="323850"/>
+                </a:lnTo>
+                <a:lnTo>
+                  <a:pt x="10874375" y="344488"/>
+                </a:lnTo>
+                <a:lnTo>
+                  <a:pt x="11015662" y="363538"/>
+                </a:lnTo>
+                <a:lnTo>
+                  <a:pt x="11210925" y="390525"/>
+                </a:lnTo>
+                <a:lnTo>
+                  <a:pt x="11277600" y="400050"/>
+                </a:lnTo>
+                <a:lnTo>
+                  <a:pt x="11277600" y="2250018"/>
+                </a:lnTo>
+                <a:lnTo>
+                  <a:pt x="0" y="2250018"/>
+                </a:lnTo>
+                <a:lnTo>
+                  <a:pt x="0" y="398463"/>
+                </a:lnTo>
+                <a:lnTo>
+                  <a:pt x="255588" y="358775"/>
+                </a:lnTo>
+                <a:lnTo>
+                  <a:pt x="511175" y="320675"/>
+                </a:lnTo>
+                <a:lnTo>
+                  <a:pt x="766762" y="284163"/>
+                </a:lnTo>
+                <a:lnTo>
+                  <a:pt x="1023938" y="252413"/>
+                </a:lnTo>
+                <a:lnTo>
+                  <a:pt x="1279525" y="220663"/>
+                </a:lnTo>
+                <a:lnTo>
+                  <a:pt x="1536700" y="190500"/>
+                </a:lnTo>
+                <a:lnTo>
+                  <a:pt x="1790700" y="165100"/>
+                </a:lnTo>
+                <a:lnTo>
+                  <a:pt x="2047875" y="141288"/>
+                </a:lnTo>
+                <a:lnTo>
+                  <a:pt x="2303462" y="119063"/>
+                </a:lnTo>
+                <a:lnTo>
+                  <a:pt x="2555875" y="100013"/>
+                </a:lnTo>
+                <a:lnTo>
+                  <a:pt x="2809875" y="80963"/>
+                </a:lnTo>
+                <a:lnTo>
+                  <a:pt x="3062288" y="65088"/>
+                </a:lnTo>
+                <a:lnTo>
+                  <a:pt x="3313113" y="52388"/>
+                </a:lnTo>
+                <a:lnTo>
+                  <a:pt x="3563938" y="39688"/>
+                </a:lnTo>
+                <a:lnTo>
+                  <a:pt x="3811588" y="28575"/>
+                </a:lnTo>
+                <a:lnTo>
+                  <a:pt x="4057650" y="20638"/>
+                </a:lnTo>
+                <a:lnTo>
+                  <a:pt x="4303713" y="14288"/>
+                </a:lnTo>
+                <a:lnTo>
+                  <a:pt x="4546600" y="7938"/>
+                </a:lnTo>
+                <a:lnTo>
+                  <a:pt x="4787900" y="4763"/>
+                </a:lnTo>
+                <a:lnTo>
+                  <a:pt x="5027613" y="1588"/>
+                </a:lnTo>
+                <a:close/>
+              </a:path>
+            </a:pathLst>
+          </a:custGeom>
+          <a:ln>
+            <a:noFill/>
+          </a:ln>
+        </p:spPr>
+        <p:style>
+          <a:lnRef idx="2">
+            <a:schemeClr val="accent1">
+              <a:shade val="50000"/>
+            </a:schemeClr>
+          </a:lnRef>
+          <a:fillRef idx="1003">
+            <a:schemeClr val="dk2"/>
+          </a:fillRef>
+          <a:effectRef idx="0">
+            <a:schemeClr val="accent1"/>
+          </a:effectRef>
+          <a:fontRef idx="minor">
+            <a:schemeClr val="lt1"/>
+          </a:fontRef>
+        </p:style>
+        <p:txBody>
+          <a:bodyPr wrap="square" rtlCol="0" anchor="ctr">
+            <a:noAutofit/>
+          </a:bodyPr>
+          <a:lstStyle/>
+          <a:p>
+            <a:pPr algn="ctr"/>
+            <a:endParaRPr lang="en-US"/>
+          </a:p>
+        </p:txBody>
+      </p:sp>
+      <p:sp>
+        <p:nvSpPr>
+          <p:cNvPr id="43" name="Freeform 5">
+            <a:extLst>
+              <a:ext uri="{FF2B5EF4-FFF2-40B4-BE49-F238E27FC236}">
+                <a16:creationId xmlns:a16="http://schemas.microsoft.com/office/drawing/2014/main" id="{25225EF6-7666-40A5-813B-4BE52C749418}"/>
+              </a:ext>
+              <a:ext uri="{C183D7F6-B498-43B3-948B-1728B52AA6E4}">
+                <adec:decorative xmlns:adec="http://schemas.microsoft.com/office/drawing/2017/decorative" val="1"/>
+              </a:ext>
+            </a:extLst>
+          </p:cNvPr>
+          <p:cNvSpPr>
+            <a:spLocks noGrp="1" noRot="1" noChangeAspect="1" noMove="1" noResize="1" noEditPoints="1" noAdjustHandles="1" noChangeArrowheads="1" noChangeShapeType="1" noTextEdit="1"/>
+          </p:cNvSpPr>
+          <p:nvPr>
+            <p:extLst>
+              <p:ext uri="{386F3935-93C4-4BCD-93E2-E3B085C9AB24}">
+                <p16:designElem xmlns:p16="http://schemas.microsoft.com/office/powerpoint/2015/main" val="1"/>
+              </p:ext>
+            </p:extLst>
+          </p:nvPr>
+        </p:nvSpPr>
+        <p:spPr bwMode="gray">
+          <a:xfrm rot="10371525">
+            <a:off x="263767" y="4117124"/>
+            <a:ext cx="3299407" cy="440924"/>
+          </a:xfrm>
+          <a:custGeom>
+            <a:avLst/>
+            <a:gdLst/>
+            <a:ahLst/>
+            <a:cxnLst/>
+            <a:rect l="l" t="t" r="r" b="b"/>
+            <a:pathLst>
+              <a:path w="10000" h="5291">
+                <a:moveTo>
+                  <a:pt x="85" y="2532"/>
+                </a:moveTo>
+                <a:cubicBezTo>
+                  <a:pt x="1736" y="3911"/>
+                  <a:pt x="7524" y="5298"/>
+                  <a:pt x="9958" y="5291"/>
+                </a:cubicBezTo>
+                <a:cubicBezTo>
+                  <a:pt x="9989" y="1958"/>
+                  <a:pt x="9969" y="3333"/>
+                  <a:pt x="10000" y="0"/>
+                </a:cubicBezTo>
+                <a:lnTo>
+                  <a:pt x="10000" y="0"/>
+                </a:lnTo>
+                <a:lnTo>
+                  <a:pt x="9667" y="204"/>
+                </a:lnTo>
+                <a:lnTo>
+                  <a:pt x="9334" y="400"/>
+                </a:lnTo>
+                <a:lnTo>
+                  <a:pt x="9001" y="590"/>
+                </a:lnTo>
+                <a:lnTo>
+                  <a:pt x="8667" y="753"/>
+                </a:lnTo>
+                <a:lnTo>
+                  <a:pt x="8333" y="917"/>
+                </a:lnTo>
+                <a:lnTo>
+                  <a:pt x="7999" y="1071"/>
+                </a:lnTo>
+                <a:lnTo>
+                  <a:pt x="7669" y="1202"/>
+                </a:lnTo>
+                <a:lnTo>
+                  <a:pt x="7333" y="1325"/>
+                </a:lnTo>
+                <a:lnTo>
+                  <a:pt x="7000" y="1440"/>
+                </a:lnTo>
+                <a:lnTo>
+                  <a:pt x="6673" y="1538"/>
+                </a:lnTo>
+                <a:lnTo>
+                  <a:pt x="6340" y="1636"/>
+                </a:lnTo>
+                <a:lnTo>
+                  <a:pt x="6013" y="1719"/>
+                </a:lnTo>
+                <a:lnTo>
+                  <a:pt x="5686" y="1784"/>
+                </a:lnTo>
+                <a:lnTo>
+                  <a:pt x="5359" y="1850"/>
+                </a:lnTo>
+                <a:lnTo>
+                  <a:pt x="5036" y="1906"/>
+                </a:lnTo>
+                <a:lnTo>
+                  <a:pt x="4717" y="1948"/>
+                </a:lnTo>
+                <a:lnTo>
+                  <a:pt x="4396" y="1980"/>
+                </a:lnTo>
+                <a:lnTo>
+                  <a:pt x="4079" y="2013"/>
+                </a:lnTo>
+                <a:lnTo>
+                  <a:pt x="3766" y="2029"/>
+                </a:lnTo>
+                <a:lnTo>
+                  <a:pt x="3454" y="2046"/>
+                </a:lnTo>
+                <a:lnTo>
+                  <a:pt x="3145" y="2053"/>
+                </a:lnTo>
+                <a:lnTo>
+                  <a:pt x="2839" y="2046"/>
+                </a:lnTo>
+                <a:lnTo>
+                  <a:pt x="2537" y="2046"/>
+                </a:lnTo>
+                <a:lnTo>
+                  <a:pt x="2238" y="2029"/>
+                </a:lnTo>
+                <a:lnTo>
+                  <a:pt x="1943" y="2004"/>
+                </a:lnTo>
+                <a:lnTo>
+                  <a:pt x="1653" y="1980"/>
+                </a:lnTo>
+                <a:lnTo>
+                  <a:pt x="1368" y="1955"/>
+                </a:lnTo>
+                <a:lnTo>
+                  <a:pt x="1085" y="1915"/>
+                </a:lnTo>
+                <a:lnTo>
+                  <a:pt x="806" y="1873"/>
+                </a:lnTo>
+                <a:lnTo>
+                  <a:pt x="533" y="1833"/>
+                </a:lnTo>
+                <a:lnTo>
+                  <a:pt x="0" y="1726"/>
+                </a:lnTo>
+                <a:cubicBezTo>
+                  <a:pt x="28" y="1995"/>
+                  <a:pt x="57" y="2263"/>
+                  <a:pt x="85" y="2532"/>
+                </a:cubicBezTo>
+                <a:close/>
+              </a:path>
+            </a:pathLst>
+          </a:custGeom>
+          <a:solidFill>
+            <a:schemeClr val="bg1">
+              <a:alpha val="20000"/>
+            </a:schemeClr>
+          </a:solidFill>
+          <a:ln>
+            <a:noFill/>
+          </a:ln>
+        </p:spPr>
+      </p:sp>
+      <p:sp>
+        <p:nvSpPr>
           <p:cNvPr id="2" name="Title 1">
             <a:extLst>
               <a:ext uri="{FF2B5EF4-FFF2-40B4-BE49-F238E27FC236}">
@@ -24792,8 +25534,8 @@
         </p:nvSpPr>
         <p:spPr>
           <a:xfrm>
-            <a:off x="8382055" y="1241266"/>
-            <a:ext cx="3161016" cy="3153753"/>
+            <a:off x="649976" y="4174067"/>
+            <a:ext cx="10893094" cy="1481440"/>
           </a:xfrm>
         </p:spPr>
         <p:txBody>
@@ -24802,468 +25544,20 @@
           </a:bodyPr>
           <a:lstStyle/>
           <a:p>
+            <a:pPr algn="ctr"/>
             <a:r>
-              <a:rPr lang="en-US" sz="2600">
-                <a:solidFill>
-                  <a:srgbClr val="EBEBEB"/>
-                </a:solidFill>
-              </a:rPr>
+              <a:rPr lang="en-US" sz="7200"/>
               <a:t>Accommodation</a:t>
             </a:r>
           </a:p>
         </p:txBody>
       </p:sp>
-      <p:grpSp>
-        <p:nvGrpSpPr>
-          <p:cNvPr id="10" name="Group 9">
+      <p:pic>
+        <p:nvPicPr>
+          <p:cNvPr id="6" name="Picture 5">
             <a:extLst>
               <a:ext uri="{FF2B5EF4-FFF2-40B4-BE49-F238E27FC236}">
-                <a16:creationId xmlns:a16="http://schemas.microsoft.com/office/drawing/2014/main" id="{25A657F0-42F3-40D3-BC75-7DA1F5C6A225}"/>
-              </a:ext>
-              <a:ext uri="{C183D7F6-B498-43B3-948B-1728B52AA6E4}">
-                <adec:decorative xmlns:adec="http://schemas.microsoft.com/office/drawing/2017/decorative" val="1"/>
-              </a:ext>
-            </a:extLst>
-          </p:cNvPr>
-          <p:cNvGrpSpPr>
-            <a:grpSpLocks noGrp="1" noUngrp="1" noRot="1" noChangeAspect="1" noMove="1" noResize="1"/>
-          </p:cNvGrpSpPr>
-          <p:nvPr>
-            <p:extLst>
-              <p:ext uri="{386F3935-93C4-4BCD-93E2-E3B085C9AB24}">
-                <p16:designElem xmlns:p16="http://schemas.microsoft.com/office/powerpoint/2015/main" val="1"/>
-              </p:ext>
-            </p:extLst>
-          </p:nvPr>
-        </p:nvGrpSpPr>
-        <p:grpSpPr>
-          <a:xfrm>
-            <a:off x="423332" y="396837"/>
-            <a:ext cx="7906665" cy="6058999"/>
-            <a:chOff x="423332" y="396837"/>
-            <a:chExt cx="7906665" cy="6058999"/>
-          </a:xfrm>
-        </p:grpSpPr>
-        <p:sp>
-          <p:nvSpPr>
-            <p:cNvPr id="11" name="Rectangle 10">
-              <a:extLst>
-                <a:ext uri="{FF2B5EF4-FFF2-40B4-BE49-F238E27FC236}">
-                  <a16:creationId xmlns:a16="http://schemas.microsoft.com/office/drawing/2014/main" id="{2E94FF68-7A60-47B7-AB98-1674FC7F2D14}"/>
-                </a:ext>
-                <a:ext uri="{C183D7F6-B498-43B3-948B-1728B52AA6E4}">
-                  <adec:decorative xmlns:adec="http://schemas.microsoft.com/office/drawing/2017/decorative" val="1"/>
-                </a:ext>
-              </a:extLst>
-            </p:cNvPr>
-            <p:cNvSpPr/>
-            <p:nvPr>
-              <p:extLst>
-                <p:ext uri="{386F3935-93C4-4BCD-93E2-E3B085C9AB24}">
-                  <p16:designElem xmlns:p16="http://schemas.microsoft.com/office/powerpoint/2015/main" val="1"/>
-                </p:ext>
-              </p:extLst>
-            </p:nvPr>
-          </p:nvSpPr>
-          <p:spPr bwMode="gray">
-            <a:xfrm flipH="1">
-              <a:off x="423332" y="402165"/>
-              <a:ext cx="6785133" cy="6053670"/>
-            </a:xfrm>
-            <a:prstGeom prst="rect">
-              <a:avLst/>
-            </a:prstGeom>
-            <a:solidFill>
-              <a:schemeClr val="bg1"/>
-            </a:solidFill>
-            <a:ln>
-              <a:noFill/>
-            </a:ln>
-            <a:effectLst/>
-          </p:spPr>
-          <p:style>
-            <a:lnRef idx="1">
-              <a:schemeClr val="accent1"/>
-            </a:lnRef>
-            <a:fillRef idx="3">
-              <a:schemeClr val="accent1"/>
-            </a:fillRef>
-            <a:effectRef idx="2">
-              <a:schemeClr val="accent1"/>
-            </a:effectRef>
-            <a:fontRef idx="minor">
-              <a:schemeClr val="lt1"/>
-            </a:fontRef>
-          </p:style>
-        </p:sp>
-        <p:sp>
-          <p:nvSpPr>
-            <p:cNvPr id="12" name="Freeform 5">
-              <a:extLst>
-                <a:ext uri="{FF2B5EF4-FFF2-40B4-BE49-F238E27FC236}">
-                  <a16:creationId xmlns:a16="http://schemas.microsoft.com/office/drawing/2014/main" id="{42B4F8D7-4E9C-45EF-9072-1AF32CEF7102}"/>
-                </a:ext>
-                <a:ext uri="{C183D7F6-B498-43B3-948B-1728B52AA6E4}">
-                  <adec:decorative xmlns:adec="http://schemas.microsoft.com/office/drawing/2017/decorative" val="1"/>
-                </a:ext>
-              </a:extLst>
-            </p:cNvPr>
-            <p:cNvSpPr/>
-            <p:nvPr>
-              <p:extLst>
-                <p:ext uri="{386F3935-93C4-4BCD-93E2-E3B085C9AB24}">
-                  <p16:designElem xmlns:p16="http://schemas.microsoft.com/office/powerpoint/2015/main" val="1"/>
-                </p:ext>
-              </p:extLst>
-            </p:nvPr>
-          </p:nvSpPr>
-          <p:spPr bwMode="gray">
-            <a:xfrm rot="5400000" flipH="1">
-              <a:off x="4616676" y="2801722"/>
-              <a:ext cx="6053670" cy="1254558"/>
-            </a:xfrm>
-            <a:custGeom>
-              <a:avLst/>
-              <a:gdLst/>
-              <a:ahLst/>
-              <a:cxnLst/>
-              <a:rect l="l" t="t" r="r" b="b"/>
-              <a:pathLst>
-                <a:path w="10000" h="8000">
-                  <a:moveTo>
-                    <a:pt x="0" y="0"/>
-                  </a:moveTo>
-                  <a:lnTo>
-                    <a:pt x="0" y="7970"/>
-                  </a:lnTo>
-                  <a:lnTo>
-                    <a:pt x="10000" y="8000"/>
-                  </a:lnTo>
-                  <a:lnTo>
-                    <a:pt x="10000" y="7"/>
-                  </a:lnTo>
-                  <a:lnTo>
-                    <a:pt x="10000" y="7"/>
-                  </a:lnTo>
-                  <a:lnTo>
-                    <a:pt x="9773" y="156"/>
-                  </a:lnTo>
-                  <a:lnTo>
-                    <a:pt x="9547" y="298"/>
-                  </a:lnTo>
-                  <a:lnTo>
-                    <a:pt x="9320" y="437"/>
-                  </a:lnTo>
-                  <a:lnTo>
-                    <a:pt x="9092" y="556"/>
-                  </a:lnTo>
-                  <a:lnTo>
-                    <a:pt x="8865" y="676"/>
-                  </a:lnTo>
-                  <a:lnTo>
-                    <a:pt x="8637" y="788"/>
-                  </a:lnTo>
-                  <a:lnTo>
-                    <a:pt x="8412" y="884"/>
-                  </a:lnTo>
-                  <a:lnTo>
-                    <a:pt x="8184" y="975"/>
-                  </a:lnTo>
-                  <a:lnTo>
-                    <a:pt x="7957" y="1058"/>
-                  </a:lnTo>
-                  <a:lnTo>
-                    <a:pt x="7734" y="1130"/>
-                  </a:lnTo>
-                  <a:lnTo>
-                    <a:pt x="7508" y="1202"/>
-                  </a:lnTo>
-                  <a:lnTo>
-                    <a:pt x="7285" y="1262"/>
-                  </a:lnTo>
-                  <a:lnTo>
-                    <a:pt x="7062" y="1309"/>
-                  </a:lnTo>
-                  <a:lnTo>
-                    <a:pt x="6840" y="1358"/>
-                  </a:lnTo>
-                  <a:lnTo>
-                    <a:pt x="6620" y="1399"/>
-                  </a:lnTo>
-                  <a:lnTo>
-                    <a:pt x="6402" y="1428"/>
-                  </a:lnTo>
-                  <a:lnTo>
-                    <a:pt x="6184" y="1453"/>
-                  </a:lnTo>
-                  <a:lnTo>
-                    <a:pt x="5968" y="1477"/>
-                  </a:lnTo>
-                  <a:lnTo>
-                    <a:pt x="5755" y="1488"/>
-                  </a:lnTo>
-                  <a:lnTo>
-                    <a:pt x="5542" y="1500"/>
-                  </a:lnTo>
-                  <a:lnTo>
-                    <a:pt x="5332" y="1506"/>
-                  </a:lnTo>
-                  <a:lnTo>
-                    <a:pt x="5124" y="1500"/>
-                  </a:lnTo>
-                  <a:lnTo>
-                    <a:pt x="4918" y="1500"/>
-                  </a:lnTo>
-                  <a:lnTo>
-                    <a:pt x="4714" y="1488"/>
-                  </a:lnTo>
-                  <a:lnTo>
-                    <a:pt x="4514" y="1470"/>
-                  </a:lnTo>
-                  <a:lnTo>
-                    <a:pt x="4316" y="1453"/>
-                  </a:lnTo>
-                  <a:lnTo>
-                    <a:pt x="4122" y="1434"/>
-                  </a:lnTo>
-                  <a:lnTo>
-                    <a:pt x="3929" y="1405"/>
-                  </a:lnTo>
-                  <a:lnTo>
-                    <a:pt x="3739" y="1374"/>
-                  </a:lnTo>
-                  <a:lnTo>
-                    <a:pt x="3553" y="1346"/>
-                  </a:lnTo>
-                  <a:lnTo>
-                    <a:pt x="3190" y="1267"/>
-                  </a:lnTo>
-                  <a:lnTo>
-                    <a:pt x="2842" y="1183"/>
-                  </a:lnTo>
-                  <a:lnTo>
-                    <a:pt x="2508" y="1095"/>
-                  </a:lnTo>
-                  <a:lnTo>
-                    <a:pt x="2192" y="998"/>
-                  </a:lnTo>
-                  <a:lnTo>
-                    <a:pt x="1890" y="897"/>
-                  </a:lnTo>
-                  <a:lnTo>
-                    <a:pt x="1610" y="788"/>
-                  </a:lnTo>
-                  <a:lnTo>
-                    <a:pt x="1347" y="681"/>
-                  </a:lnTo>
-                  <a:lnTo>
-                    <a:pt x="1105" y="574"/>
-                  </a:lnTo>
-                  <a:lnTo>
-                    <a:pt x="883" y="473"/>
-                  </a:lnTo>
-                  <a:lnTo>
-                    <a:pt x="686" y="377"/>
-                  </a:lnTo>
-                  <a:lnTo>
-                    <a:pt x="508" y="286"/>
-                  </a:lnTo>
-                  <a:lnTo>
-                    <a:pt x="358" y="210"/>
-                  </a:lnTo>
-                  <a:lnTo>
-                    <a:pt x="232" y="138"/>
-                  </a:lnTo>
-                  <a:lnTo>
-                    <a:pt x="59" y="35"/>
-                  </a:lnTo>
-                  <a:lnTo>
-                    <a:pt x="0" y="0"/>
-                  </a:lnTo>
-                  <a:lnTo>
-                    <a:pt x="0" y="0"/>
-                  </a:lnTo>
-                  <a:close/>
-                </a:path>
-              </a:pathLst>
-            </a:custGeom>
-            <a:solidFill>
-              <a:schemeClr val="bg1"/>
-            </a:solidFill>
-            <a:ln>
-              <a:noFill/>
-            </a:ln>
-          </p:spPr>
-        </p:sp>
-        <p:sp>
-          <p:nvSpPr>
-            <p:cNvPr id="13" name="Freeform 5">
-              <a:extLst>
-                <a:ext uri="{FF2B5EF4-FFF2-40B4-BE49-F238E27FC236}">
-                  <a16:creationId xmlns:a16="http://schemas.microsoft.com/office/drawing/2014/main" id="{3ECBDDDB-593C-40F0-8E80-AA75798EE40C}"/>
-                </a:ext>
-                <a:ext uri="{C183D7F6-B498-43B3-948B-1728B52AA6E4}">
-                  <adec:decorative xmlns:adec="http://schemas.microsoft.com/office/drawing/2017/decorative" val="1"/>
-                </a:ext>
-              </a:extLst>
-            </p:cNvPr>
-            <p:cNvSpPr/>
-            <p:nvPr>
-              <p:extLst>
-                <p:ext uri="{386F3935-93C4-4BCD-93E2-E3B085C9AB24}">
-                  <p16:designElem xmlns:p16="http://schemas.microsoft.com/office/powerpoint/2015/main" val="1"/>
-                </p:ext>
-              </p:extLst>
-            </p:nvPr>
-          </p:nvSpPr>
-          <p:spPr bwMode="gray">
-            <a:xfrm rot="5677511" flipH="1">
-              <a:off x="6459831" y="1826079"/>
-              <a:ext cx="3299407" cy="440924"/>
-            </a:xfrm>
-            <a:custGeom>
-              <a:avLst/>
-              <a:gdLst/>
-              <a:ahLst/>
-              <a:cxnLst/>
-              <a:rect l="l" t="t" r="r" b="b"/>
-              <a:pathLst>
-                <a:path w="10000" h="5291">
-                  <a:moveTo>
-                    <a:pt x="85" y="2532"/>
-                  </a:moveTo>
-                  <a:cubicBezTo>
-                    <a:pt x="1736" y="3911"/>
-                    <a:pt x="7524" y="5298"/>
-                    <a:pt x="9958" y="5291"/>
-                  </a:cubicBezTo>
-                  <a:cubicBezTo>
-                    <a:pt x="9989" y="1958"/>
-                    <a:pt x="9969" y="3333"/>
-                    <a:pt x="10000" y="0"/>
-                  </a:cubicBezTo>
-                  <a:lnTo>
-                    <a:pt x="10000" y="0"/>
-                  </a:lnTo>
-                  <a:lnTo>
-                    <a:pt x="9667" y="204"/>
-                  </a:lnTo>
-                  <a:lnTo>
-                    <a:pt x="9334" y="400"/>
-                  </a:lnTo>
-                  <a:lnTo>
-                    <a:pt x="9001" y="590"/>
-                  </a:lnTo>
-                  <a:lnTo>
-                    <a:pt x="8667" y="753"/>
-                  </a:lnTo>
-                  <a:lnTo>
-                    <a:pt x="8333" y="917"/>
-                  </a:lnTo>
-                  <a:lnTo>
-                    <a:pt x="7999" y="1071"/>
-                  </a:lnTo>
-                  <a:lnTo>
-                    <a:pt x="7669" y="1202"/>
-                  </a:lnTo>
-                  <a:lnTo>
-                    <a:pt x="7333" y="1325"/>
-                  </a:lnTo>
-                  <a:lnTo>
-                    <a:pt x="7000" y="1440"/>
-                  </a:lnTo>
-                  <a:lnTo>
-                    <a:pt x="6673" y="1538"/>
-                  </a:lnTo>
-                  <a:lnTo>
-                    <a:pt x="6340" y="1636"/>
-                  </a:lnTo>
-                  <a:lnTo>
-                    <a:pt x="6013" y="1719"/>
-                  </a:lnTo>
-                  <a:lnTo>
-                    <a:pt x="5686" y="1784"/>
-                  </a:lnTo>
-                  <a:lnTo>
-                    <a:pt x="5359" y="1850"/>
-                  </a:lnTo>
-                  <a:lnTo>
-                    <a:pt x="5036" y="1906"/>
-                  </a:lnTo>
-                  <a:lnTo>
-                    <a:pt x="4717" y="1948"/>
-                  </a:lnTo>
-                  <a:lnTo>
-                    <a:pt x="4396" y="1980"/>
-                  </a:lnTo>
-                  <a:lnTo>
-                    <a:pt x="4079" y="2013"/>
-                  </a:lnTo>
-                  <a:lnTo>
-                    <a:pt x="3766" y="2029"/>
-                  </a:lnTo>
-                  <a:lnTo>
-                    <a:pt x="3454" y="2046"/>
-                  </a:lnTo>
-                  <a:lnTo>
-                    <a:pt x="3145" y="2053"/>
-                  </a:lnTo>
-                  <a:lnTo>
-                    <a:pt x="2839" y="2046"/>
-                  </a:lnTo>
-                  <a:lnTo>
-                    <a:pt x="2537" y="2046"/>
-                  </a:lnTo>
-                  <a:lnTo>
-                    <a:pt x="2238" y="2029"/>
-                  </a:lnTo>
-                  <a:lnTo>
-                    <a:pt x="1943" y="2004"/>
-                  </a:lnTo>
-                  <a:lnTo>
-                    <a:pt x="1653" y="1980"/>
-                  </a:lnTo>
-                  <a:lnTo>
-                    <a:pt x="1368" y="1955"/>
-                  </a:lnTo>
-                  <a:lnTo>
-                    <a:pt x="1085" y="1915"/>
-                  </a:lnTo>
-                  <a:lnTo>
-                    <a:pt x="806" y="1873"/>
-                  </a:lnTo>
-                  <a:lnTo>
-                    <a:pt x="533" y="1833"/>
-                  </a:lnTo>
-                  <a:lnTo>
-                    <a:pt x="0" y="1726"/>
-                  </a:lnTo>
-                  <a:cubicBezTo>
-                    <a:pt x="28" y="1995"/>
-                    <a:pt x="57" y="2263"/>
-                    <a:pt x="85" y="2532"/>
-                  </a:cubicBezTo>
-                  <a:close/>
-                </a:path>
-              </a:pathLst>
-            </a:custGeom>
-            <a:solidFill>
-              <a:schemeClr val="bg1">
-                <a:alpha val="20000"/>
-              </a:schemeClr>
-            </a:solidFill>
-            <a:ln>
-              <a:noFill/>
-            </a:ln>
-          </p:spPr>
-        </p:sp>
-      </p:grpSp>
-      <p:pic>
-        <p:nvPicPr>
-          <p:cNvPr id="5" name="Picture 4">
-            <a:extLst>
-              <a:ext uri="{FF2B5EF4-FFF2-40B4-BE49-F238E27FC236}">
-                <a16:creationId xmlns:a16="http://schemas.microsoft.com/office/drawing/2014/main" id="{900E951A-9885-5249-AD21-4A6688E3B36C}"/>
+                <a16:creationId xmlns:a16="http://schemas.microsoft.com/office/drawing/2014/main" id="{237077B2-1F73-8A47-ADE8-006D6C98DCE5}"/>
               </a:ext>
             </a:extLst>
           </p:cNvPr>
@@ -25280,12 +25574,48 @@
         </p:blipFill>
         <p:spPr>
           <a:xfrm>
-            <a:off x="1109763" y="1439668"/>
-            <a:ext cx="6443180" cy="3978663"/>
+            <a:off x="1580828" y="1026838"/>
+            <a:ext cx="4428394" cy="2734533"/>
           </a:xfrm>
-          <a:prstGeom prst="rect">
-            <a:avLst/>
+          <a:prstGeom prst="roundRect">
+            <a:avLst>
+              <a:gd name="adj" fmla="val 1858"/>
+            </a:avLst>
           </a:prstGeom>
+          <a:effectLst/>
+        </p:spPr>
+      </p:pic>
+      <p:pic>
+        <p:nvPicPr>
+          <p:cNvPr id="7" name="Picture 6">
+            <a:extLst>
+              <a:ext uri="{FF2B5EF4-FFF2-40B4-BE49-F238E27FC236}">
+                <a16:creationId xmlns:a16="http://schemas.microsoft.com/office/drawing/2014/main" id="{4E448BFD-3882-6B4A-B589-6569FDD83F24}"/>
+              </a:ext>
+            </a:extLst>
+          </p:cNvPr>
+          <p:cNvPicPr>
+            <a:picLocks noChangeAspect="1"/>
+          </p:cNvPicPr>
+          <p:nvPr/>
+        </p:nvPicPr>
+        <p:blipFill>
+          <a:blip r:embed="rId4"/>
+          <a:stretch>
+            <a:fillRect/>
+          </a:stretch>
+        </p:blipFill>
+        <p:spPr>
+          <a:xfrm>
+            <a:off x="6172946" y="1021996"/>
+            <a:ext cx="4428394" cy="2734533"/>
+          </a:xfrm>
+          <a:prstGeom prst="roundRect">
+            <a:avLst>
+              <a:gd name="adj" fmla="val 1858"/>
+            </a:avLst>
+          </a:prstGeom>
+          <a:effectLst/>
         </p:spPr>
       </p:pic>
     </p:spTree>

</xml_diff>

<commit_message>
plots and presentation updated
plots and presentation updated
</commit_message>
<xml_diff>
--- a/presentation/visit_scotland_presentation.pptx
+++ b/presentation/visit_scotland_presentation.pptx
@@ -15,7 +15,7 @@
     <p:sldId id="259" r:id="rId6"/>
     <p:sldId id="261" r:id="rId7"/>
     <p:sldId id="284" r:id="rId8"/>
-    <p:sldId id="263" r:id="rId9"/>
+    <p:sldId id="285" r:id="rId9"/>
     <p:sldId id="278" r:id="rId10"/>
     <p:sldId id="279" r:id="rId11"/>
     <p:sldId id="265" r:id="rId12"/>
@@ -609,29 +609,16 @@
           <a:bodyPr/>
           <a:lstStyle/>
           <a:p>
-            <a:r>
-              <a:rPr lang="en-US" dirty="0"/>
-              <a:t>Answer to question:</a:t>
-            </a:r>
+            <a:endParaRPr lang="en-US" sz="1200" i="1" dirty="0"/>
+          </a:p>
+          <a:p>
+            <a:endParaRPr lang="en-US" sz="1200" i="1" dirty="0"/>
           </a:p>
           <a:p>
             <a:r>
-              <a:rPr lang="en-US" sz="1200" dirty="0"/>
-              <a:t>Is there a particular key demographic of visitors we should be focusing on? Who spends the most? Who visits the most?</a:t>
+              <a:rPr lang="en-US" sz="1200" i="1" dirty="0"/>
+              <a:t>Q: Who spends the most? Who visits the most? (demographics)</a:t>
             </a:r>
-          </a:p>
-          <a:p>
-            <a:endParaRPr lang="en-US" sz="1200" dirty="0"/>
-          </a:p>
-          <a:p>
-            <a:endParaRPr lang="en-US" sz="1200" dirty="0"/>
-          </a:p>
-          <a:p>
-            <a:r>
-              <a:rPr lang="en-US" sz="1200" dirty="0"/>
-              <a:t>REMEMBER TO LOOK AT NIGHTS</a:t>
-            </a:r>
-            <a:endParaRPr lang="en-US" dirty="0"/>
           </a:p>
         </p:txBody>
       </p:sp>
@@ -715,24 +702,15 @@
           <a:bodyPr/>
           <a:lstStyle/>
           <a:p>
-            <a:r>
-              <a:rPr lang="en-US" dirty="0"/>
-              <a:t>Answer to question:</a:t>
-            </a:r>
+            <a:endParaRPr lang="en-US" sz="1200" i="1" dirty="0"/>
+          </a:p>
+          <a:p>
+            <a:endParaRPr lang="en-US" sz="1200" i="1" dirty="0"/>
           </a:p>
           <a:p>
             <a:r>
-              <a:rPr lang="en-US" sz="1200" dirty="0"/>
-              <a:t>Is there a particular key demographic of visitors we should be focusing on? Who spends the most? Who visits the most?</a:t>
-            </a:r>
-          </a:p>
-          <a:p>
-            <a:endParaRPr lang="en-US" sz="1200" dirty="0"/>
-          </a:p>
-          <a:p>
-            <a:r>
-              <a:rPr lang="en-US" sz="1200" dirty="0"/>
-              <a:t>LOOK AT IF YOUNGEST PEOPLE HAVE BEEN INCREASING</a:t>
+              <a:rPr lang="en-US" sz="1200" i="1" dirty="0"/>
+              <a:t>Q: Is there a particular key demographic of visitors we should be focusing on?</a:t>
             </a:r>
           </a:p>
         </p:txBody>
@@ -817,23 +795,18 @@
           <a:bodyPr/>
           <a:lstStyle/>
           <a:p>
-            <a:r>
-              <a:rPr lang="en-US" dirty="0"/>
-              <a:t>Answer to question:</a:t>
-            </a:r>
+            <a:endParaRPr lang="en-US" dirty="0"/>
           </a:p>
           <a:p>
             <a:r>
-              <a:rPr lang="en-US" sz="1200" dirty="0"/>
-              <a:t>Is there a particular key demographic of visitors we should be focusing on? Who spends the most? Who visits the most?</a:t>
+              <a:rPr lang="en-US" i="1" dirty="0"/>
+              <a:t>Q:</a:t>
             </a:r>
-          </a:p>
-          <a:p>
             <a:r>
-              <a:rPr lang="en-US" sz="1200" dirty="0"/>
-              <a:t>When looking at regional tourism, what insights can we gain? Where are our visitors from? How do they differ in the money they spend, nights they spend in Scotland, or number of visits they do?</a:t>
+              <a:rPr lang="en-US" sz="1200" i="1" dirty="0"/>
+              <a:t> When looking at regional tourism, what insights can we gain? Where are our visitors from? How do they differ in the money they spend, nights they spend in Scotland, or number of visits they do?</a:t>
             </a:r>
-            <a:endParaRPr lang="en-US" dirty="0"/>
+            <a:endParaRPr lang="en-US" i="1" dirty="0"/>
           </a:p>
         </p:txBody>
       </p:sp>
@@ -1639,17 +1612,21 @@
           <a:bodyPr/>
           <a:lstStyle/>
           <a:p>
-            <a:r>
-              <a:rPr lang="en-US" dirty="0"/>
-              <a:t>Answer to question:</a:t>
-            </a:r>
+            <a:endParaRPr lang="en-US" i="0" dirty="0"/>
+          </a:p>
+          <a:p>
+            <a:endParaRPr lang="en-US" i="1" dirty="0"/>
           </a:p>
           <a:p>
             <a:r>
-              <a:rPr lang="en-US" sz="1200" dirty="0"/>
-              <a:t>Is there a particular method of travel our visitors arrive by? Some of our locations are remote and not easily accessible by public transport, so this would be good information to have.</a:t>
+              <a:rPr lang="en-US" i="1" dirty="0"/>
+              <a:t>Q:</a:t>
             </a:r>
-            <a:endParaRPr lang="en-US" dirty="0"/>
+            <a:r>
+              <a:rPr lang="en-US" sz="1200" i="1" dirty="0"/>
+              <a:t> Is there a particular method of travel our visitors arrive by? Some of our locations are remote and not easily accessible by public transport, so this would be good information to have.</a:t>
+            </a:r>
+            <a:endParaRPr lang="en-US" i="1" dirty="0"/>
           </a:p>
         </p:txBody>
       </p:sp>
@@ -1734,14 +1711,8 @@
           <a:lstStyle/>
           <a:p>
             <a:r>
-              <a:rPr lang="en-US" dirty="0"/>
-              <a:t>Answer to question:</a:t>
-            </a:r>
-          </a:p>
-          <a:p>
-            <a:r>
               <a:rPr lang="en-US" sz="1200" dirty="0"/>
-              <a:t>What type of locations receive the most visits? What kinds of locations do people spend the most in?</a:t>
+              <a:t>Spend is the same as visits by location.</a:t>
             </a:r>
           </a:p>
           <a:p>
@@ -1749,10 +1720,9 @@
           </a:p>
           <a:p>
             <a:r>
-              <a:rPr lang="en-US" sz="1200" dirty="0"/>
-              <a:t>This is for spend, but it is the same for visits</a:t>
+              <a:rPr lang="en-US" sz="1200" i="1" dirty="0"/>
+              <a:t>Q: What type of locations receive the most visits? What kinds of locations do people spend the most in?</a:t>
             </a:r>
-            <a:endParaRPr lang="en-US" dirty="0"/>
           </a:p>
         </p:txBody>
       </p:sp>
@@ -2038,24 +2008,22 @@
           <a:bodyPr/>
           <a:lstStyle/>
           <a:p>
+            <a:endParaRPr lang="en-US" i="1" dirty="0"/>
+          </a:p>
+          <a:p>
             <a:r>
-              <a:rPr lang="en-US" dirty="0"/>
-              <a:t>Answer to Q:</a:t>
+              <a:rPr lang="en-US" i="1" dirty="0"/>
+              <a:t>Q:</a:t>
+            </a:r>
+            <a:r>
+              <a:rPr lang="en-US" sz="1200" i="1" dirty="0"/>
+              <a:t> What type of accommodation is most popular?</a:t>
             </a:r>
           </a:p>
           <a:p>
-            <a:r>
-              <a:rPr lang="en-US" sz="1200" dirty="0"/>
-              <a:t>What type of </a:t>
-            </a:r>
-            <a:r>
-              <a:rPr lang="en-US" sz="1200" dirty="0" err="1"/>
-              <a:t>accomodation</a:t>
-            </a:r>
-            <a:r>
-              <a:rPr lang="en-US" sz="1200" dirty="0"/>
-              <a:t> is most popular? Is there a difference by location?</a:t>
-            </a:r>
+            <a:endParaRPr lang="en-US" sz="1200" dirty="0"/>
+          </a:p>
+          <a:p>
             <a:endParaRPr lang="en-US" dirty="0"/>
           </a:p>
         </p:txBody>
@@ -2086,7 +2054,7 @@
     </p:spTree>
     <p:extLst>
       <p:ext uri="{BB962C8B-B14F-4D97-AF65-F5344CB8AC3E}">
-        <p14:creationId xmlns:p14="http://schemas.microsoft.com/office/powerpoint/2010/main" val="2036907532"/>
+        <p14:creationId xmlns:p14="http://schemas.microsoft.com/office/powerpoint/2010/main" val="3647308075"/>
       </p:ext>
     </p:extLst>
   </p:cSld>
@@ -2140,33 +2108,22 @@
           <a:bodyPr/>
           <a:lstStyle/>
           <a:p>
-            <a:r>
-              <a:rPr lang="en-US" dirty="0"/>
-              <a:t>Answer to Q:</a:t>
-            </a:r>
+            <a:endParaRPr lang="en-US" dirty="0"/>
           </a:p>
           <a:p>
             <a:r>
-              <a:rPr lang="en-US" sz="1200" dirty="0"/>
-              <a:t>What type of </a:t>
+              <a:rPr lang="en-US" i="1" dirty="0"/>
+              <a:t>Q:</a:t>
             </a:r>
             <a:r>
-              <a:rPr lang="en-US" sz="1200" dirty="0" err="1"/>
-              <a:t>accomodation</a:t>
+              <a:rPr lang="en-US" sz="1200" i="1" dirty="0"/>
+              <a:t> Is there a difference by </a:t>
             </a:r>
             <a:r>
-              <a:rPr lang="en-US" sz="1200" dirty="0"/>
-              <a:t> is most popular? Is there a difference by location?</a:t>
+              <a:rPr lang="en-US" sz="1200" i="1"/>
+              <a:t>location?</a:t>
             </a:r>
-          </a:p>
-          <a:p>
             <a:endParaRPr lang="en-US" sz="1200" dirty="0"/>
-          </a:p>
-          <a:p>
-            <a:r>
-              <a:rPr lang="en-US" sz="1200" dirty="0"/>
-              <a:t>Break down the urban graph by year</a:t>
-            </a:r>
           </a:p>
           <a:p>
             <a:endParaRPr lang="en-US" sz="1200" dirty="0"/>
@@ -15954,10 +15911,10 @@
       </p:grpSpPr>
       <p:sp>
         <p:nvSpPr>
-          <p:cNvPr id="11" name="Rectangle 10">
+          <p:cNvPr id="33" name="Rectangle 32">
             <a:extLst>
               <a:ext uri="{FF2B5EF4-FFF2-40B4-BE49-F238E27FC236}">
-                <a16:creationId xmlns:a16="http://schemas.microsoft.com/office/drawing/2014/main" id="{4D564D1C-BBBA-41AB-8D3D-65E6513686EA}"/>
+                <a16:creationId xmlns:a16="http://schemas.microsoft.com/office/drawing/2014/main" id="{1B9CC3E5-EA42-4393-A2C0-5192B91BD745}"/>
               </a:ext>
               <a:ext uri="{C183D7F6-B498-43B3-948B-1728B52AA6E4}">
                 <adec:decorative xmlns:adec="http://schemas.microsoft.com/office/drawing/2017/decorative" val="1"/>
@@ -16015,12 +15972,45 @@
           </a:p>
         </p:txBody>
       </p:sp>
+      <p:pic>
+        <p:nvPicPr>
+          <p:cNvPr id="4" name="Picture 3">
+            <a:extLst>
+              <a:ext uri="{FF2B5EF4-FFF2-40B4-BE49-F238E27FC236}">
+                <a16:creationId xmlns:a16="http://schemas.microsoft.com/office/drawing/2014/main" id="{47C9CAF8-2AFC-C241-976E-B7935F09755B}"/>
+              </a:ext>
+            </a:extLst>
+          </p:cNvPr>
+          <p:cNvPicPr>
+            <a:picLocks noChangeAspect="1"/>
+          </p:cNvPicPr>
+          <p:nvPr/>
+        </p:nvPicPr>
+        <p:blipFill>
+          <a:blip r:embed="rId3"/>
+          <a:stretch>
+            <a:fillRect/>
+          </a:stretch>
+        </p:blipFill>
+        <p:spPr>
+          <a:xfrm>
+            <a:off x="561110" y="511836"/>
+            <a:ext cx="5448111" cy="3364208"/>
+          </a:xfrm>
+          <a:prstGeom prst="roundRect">
+            <a:avLst>
+              <a:gd name="adj" fmla="val 0"/>
+            </a:avLst>
+          </a:prstGeom>
+          <a:effectLst/>
+        </p:spPr>
+      </p:pic>
       <p:sp>
         <p:nvSpPr>
-          <p:cNvPr id="13" name="Rectangle 12">
+          <p:cNvPr id="35" name="Rectangle 34">
             <a:extLst>
               <a:ext uri="{FF2B5EF4-FFF2-40B4-BE49-F238E27FC236}">
-                <a16:creationId xmlns:a16="http://schemas.microsoft.com/office/drawing/2014/main" id="{4D63F519-D67F-403F-938E-102A5A37D900}"/>
+                <a16:creationId xmlns:a16="http://schemas.microsoft.com/office/drawing/2014/main" id="{FB8DBC8E-FBA7-466C-8D97-75B15FBE9048}"/>
               </a:ext>
               <a:ext uri="{C183D7F6-B498-43B3-948B-1728B52AA6E4}">
                 <adec:decorative xmlns:adec="http://schemas.microsoft.com/office/drawing/2017/decorative" val="1"/>
@@ -16068,12 +16058,45 @@
           </a:fontRef>
         </p:style>
       </p:sp>
+      <p:pic>
+        <p:nvPicPr>
+          <p:cNvPr id="3" name="Picture 2">
+            <a:extLst>
+              <a:ext uri="{FF2B5EF4-FFF2-40B4-BE49-F238E27FC236}">
+                <a16:creationId xmlns:a16="http://schemas.microsoft.com/office/drawing/2014/main" id="{958C7A4C-B8D1-394D-A7D0-D41E760B2BB1}"/>
+              </a:ext>
+            </a:extLst>
+          </p:cNvPr>
+          <p:cNvPicPr>
+            <a:picLocks noChangeAspect="1"/>
+          </p:cNvPicPr>
+          <p:nvPr/>
+        </p:nvPicPr>
+        <p:blipFill>
+          <a:blip r:embed="rId4"/>
+          <a:stretch>
+            <a:fillRect/>
+          </a:stretch>
+        </p:blipFill>
+        <p:spPr>
+          <a:xfrm>
+            <a:off x="6172946" y="535121"/>
+            <a:ext cx="5370123" cy="3316051"/>
+          </a:xfrm>
+          <a:prstGeom prst="roundRect">
+            <a:avLst>
+              <a:gd name="adj" fmla="val 0"/>
+            </a:avLst>
+          </a:prstGeom>
+          <a:effectLst/>
+        </p:spPr>
+      </p:pic>
       <p:sp>
         <p:nvSpPr>
-          <p:cNvPr id="15" name="Freeform: Shape 14">
+          <p:cNvPr id="37" name="Freeform: Shape 36">
             <a:extLst>
               <a:ext uri="{FF2B5EF4-FFF2-40B4-BE49-F238E27FC236}">
-                <a16:creationId xmlns:a16="http://schemas.microsoft.com/office/drawing/2014/main" id="{0690B2E9-00B3-4554-8C5C-2D5134ADF40E}"/>
+                <a16:creationId xmlns:a16="http://schemas.microsoft.com/office/drawing/2014/main" id="{E6FFF64E-1FE4-4AE0-9D62-567AA183C128}"/>
               </a:ext>
               <a:ext uri="{C183D7F6-B498-43B3-948B-1728B52AA6E4}">
                 <adec:decorative xmlns:adec="http://schemas.microsoft.com/office/drawing/2017/decorative" val="1"/>
@@ -16527,10 +16550,10 @@
       </p:sp>
       <p:sp>
         <p:nvSpPr>
-          <p:cNvPr id="17" name="Freeform 5">
+          <p:cNvPr id="39" name="Freeform 5">
             <a:extLst>
               <a:ext uri="{FF2B5EF4-FFF2-40B4-BE49-F238E27FC236}">
-                <a16:creationId xmlns:a16="http://schemas.microsoft.com/office/drawing/2014/main" id="{25225EF6-7666-40A5-813B-4BE52C749418}"/>
+                <a16:creationId xmlns:a16="http://schemas.microsoft.com/office/drawing/2014/main" id="{9C80E52D-DE5C-4267-9C99-8741F2E42E36}"/>
               </a:ext>
               <a:ext uri="{C183D7F6-B498-43B3-948B-1728B52AA6E4}">
                 <adec:decorative xmlns:adec="http://schemas.microsoft.com/office/drawing/2017/decorative" val="1"/>
@@ -16707,8 +16730,8 @@
         </p:nvSpPr>
         <p:spPr>
           <a:xfrm>
-            <a:off x="649976" y="4174067"/>
-            <a:ext cx="10893094" cy="1481440"/>
+            <a:off x="649975" y="4517136"/>
+            <a:ext cx="10893095" cy="1174947"/>
           </a:xfrm>
         </p:spPr>
         <p:txBody>
@@ -16717,80 +16740,13 @@
           </a:bodyPr>
           <a:lstStyle/>
           <a:p>
-            <a:pPr algn="ctr"/>
             <a:r>
-              <a:rPr lang="en-US" sz="7200"/>
-              <a:t>Demographic</a:t>
+              <a:rPr lang="en-US" sz="6000" dirty="0"/>
+              <a:t>Demographics</a:t>
             </a:r>
           </a:p>
         </p:txBody>
       </p:sp>
-      <p:pic>
-        <p:nvPicPr>
-          <p:cNvPr id="6" name="Picture 5">
-            <a:extLst>
-              <a:ext uri="{FF2B5EF4-FFF2-40B4-BE49-F238E27FC236}">
-                <a16:creationId xmlns:a16="http://schemas.microsoft.com/office/drawing/2014/main" id="{6FEA0154-4C20-6143-B9CD-BBBC11A1C974}"/>
-              </a:ext>
-            </a:extLst>
-          </p:cNvPr>
-          <p:cNvPicPr>
-            <a:picLocks noChangeAspect="1"/>
-          </p:cNvPicPr>
-          <p:nvPr/>
-        </p:nvPicPr>
-        <p:blipFill>
-          <a:blip r:embed="rId3"/>
-          <a:stretch>
-            <a:fillRect/>
-          </a:stretch>
-        </p:blipFill>
-        <p:spPr>
-          <a:xfrm>
-            <a:off x="2233496" y="1026839"/>
-            <a:ext cx="3775725" cy="2331510"/>
-          </a:xfrm>
-          <a:prstGeom prst="roundRect">
-            <a:avLst>
-              <a:gd name="adj" fmla="val 1858"/>
-            </a:avLst>
-          </a:prstGeom>
-          <a:effectLst/>
-        </p:spPr>
-      </p:pic>
-      <p:pic>
-        <p:nvPicPr>
-          <p:cNvPr id="5" name="Picture 4">
-            <a:extLst>
-              <a:ext uri="{FF2B5EF4-FFF2-40B4-BE49-F238E27FC236}">
-                <a16:creationId xmlns:a16="http://schemas.microsoft.com/office/drawing/2014/main" id="{85B0613B-9C93-9841-8BC8-434D5B6CBE84}"/>
-              </a:ext>
-            </a:extLst>
-          </p:cNvPr>
-          <p:cNvPicPr>
-            <a:picLocks noChangeAspect="1"/>
-          </p:cNvPicPr>
-          <p:nvPr/>
-        </p:nvPicPr>
-        <p:blipFill>
-          <a:blip r:embed="rId4"/>
-          <a:stretch>
-            <a:fillRect/>
-          </a:stretch>
-        </p:blipFill>
-        <p:spPr>
-          <a:xfrm>
-            <a:off x="6172946" y="1021997"/>
-            <a:ext cx="3775725" cy="2331510"/>
-          </a:xfrm>
-          <a:prstGeom prst="roundRect">
-            <a:avLst>
-              <a:gd name="adj" fmla="val 1858"/>
-            </a:avLst>
-          </a:prstGeom>
-          <a:effectLst/>
-        </p:spPr>
-      </p:pic>
     </p:spTree>
     <p:extLst>
       <p:ext uri="{BB962C8B-B14F-4D97-AF65-F5344CB8AC3E}">
@@ -16858,19 +16814,19 @@
           <a:lstStyle/>
           <a:p>
             <a:r>
-              <a:rPr lang="en-US" sz="3400">
+              <a:rPr lang="en-US" sz="3000">
                 <a:solidFill>
                   <a:srgbClr val="EBEBEB"/>
                 </a:solidFill>
               </a:rPr>
-              <a:t>Demographic</a:t>
+              <a:t>Demographics</a:t>
             </a:r>
           </a:p>
         </p:txBody>
       </p:sp>
       <p:grpSp>
         <p:nvGrpSpPr>
-          <p:cNvPr id="9" name="Group 8">
+          <p:cNvPr id="17" name="Group 16">
             <a:extLst>
               <a:ext uri="{FF2B5EF4-FFF2-40B4-BE49-F238E27FC236}">
                 <a16:creationId xmlns:a16="http://schemas.microsoft.com/office/drawing/2014/main" id="{25A657F0-42F3-40D3-BC75-7DA1F5C6A225}"/>
@@ -16901,7 +16857,7 @@
         </p:grpSpPr>
         <p:sp>
           <p:nvSpPr>
-            <p:cNvPr id="10" name="Rectangle 9">
+            <p:cNvPr id="18" name="Rectangle 17">
               <a:extLst>
                 <a:ext uri="{FF2B5EF4-FFF2-40B4-BE49-F238E27FC236}">
                   <a16:creationId xmlns:a16="http://schemas.microsoft.com/office/drawing/2014/main" id="{2E94FF68-7A60-47B7-AB98-1674FC7F2D14}"/>
@@ -16953,7 +16909,7 @@
         </p:sp>
         <p:sp>
           <p:nvSpPr>
-            <p:cNvPr id="11" name="Freeform 5">
+            <p:cNvPr id="19" name="Freeform 5">
               <a:extLst>
                 <a:ext uri="{FF2B5EF4-FFF2-40B4-BE49-F238E27FC236}">
                   <a16:creationId xmlns:a16="http://schemas.microsoft.com/office/drawing/2014/main" id="{42B4F8D7-4E9C-45EF-9072-1AF32CEF7102}"/>
@@ -17152,7 +17108,7 @@
         </p:sp>
         <p:sp>
           <p:nvSpPr>
-            <p:cNvPr id="12" name="Freeform 5">
+            <p:cNvPr id="20" name="Freeform 5">
               <a:extLst>
                 <a:ext uri="{FF2B5EF4-FFF2-40B4-BE49-F238E27FC236}">
                   <a16:creationId xmlns:a16="http://schemas.microsoft.com/office/drawing/2014/main" id="{3ECBDDDB-593C-40F0-8E80-AA75798EE40C}"/>
@@ -17315,10 +17271,10 @@
       </p:grpSp>
       <p:pic>
         <p:nvPicPr>
-          <p:cNvPr id="4" name="Picture 3">
+          <p:cNvPr id="3" name="Picture 2">
             <a:extLst>
               <a:ext uri="{FF2B5EF4-FFF2-40B4-BE49-F238E27FC236}">
-                <a16:creationId xmlns:a16="http://schemas.microsoft.com/office/drawing/2014/main" id="{1F6B2368-17CD-F546-B61D-6D02E23B8B29}"/>
+                <a16:creationId xmlns:a16="http://schemas.microsoft.com/office/drawing/2014/main" id="{854DBF47-713A-7E48-B080-E19ACBB36F4A}"/>
               </a:ext>
             </a:extLst>
           </p:cNvPr>
@@ -17410,19 +17366,19 @@
           <a:lstStyle/>
           <a:p>
             <a:r>
-              <a:rPr lang="en-US">
+              <a:rPr lang="en-US" dirty="0">
                 <a:solidFill>
                   <a:srgbClr val="EBEBEB"/>
                 </a:solidFill>
               </a:rPr>
-              <a:t>By region</a:t>
+              <a:t>Region</a:t>
             </a:r>
           </a:p>
         </p:txBody>
       </p:sp>
       <p:grpSp>
         <p:nvGrpSpPr>
-          <p:cNvPr id="13" name="Group 12">
+          <p:cNvPr id="21" name="Group 20">
             <a:extLst>
               <a:ext uri="{FF2B5EF4-FFF2-40B4-BE49-F238E27FC236}">
                 <a16:creationId xmlns:a16="http://schemas.microsoft.com/office/drawing/2014/main" id="{25A657F0-42F3-40D3-BC75-7DA1F5C6A225}"/>
@@ -17453,7 +17409,7 @@
         </p:grpSpPr>
         <p:sp>
           <p:nvSpPr>
-            <p:cNvPr id="14" name="Rectangle 13">
+            <p:cNvPr id="22" name="Rectangle 21">
               <a:extLst>
                 <a:ext uri="{FF2B5EF4-FFF2-40B4-BE49-F238E27FC236}">
                   <a16:creationId xmlns:a16="http://schemas.microsoft.com/office/drawing/2014/main" id="{2E94FF68-7A60-47B7-AB98-1674FC7F2D14}"/>
@@ -17505,7 +17461,7 @@
         </p:sp>
         <p:sp>
           <p:nvSpPr>
-            <p:cNvPr id="15" name="Freeform 5">
+            <p:cNvPr id="23" name="Freeform 5">
               <a:extLst>
                 <a:ext uri="{FF2B5EF4-FFF2-40B4-BE49-F238E27FC236}">
                   <a16:creationId xmlns:a16="http://schemas.microsoft.com/office/drawing/2014/main" id="{42B4F8D7-4E9C-45EF-9072-1AF32CEF7102}"/>
@@ -17704,7 +17660,7 @@
         </p:sp>
         <p:sp>
           <p:nvSpPr>
-            <p:cNvPr id="16" name="Freeform 5">
+            <p:cNvPr id="24" name="Freeform 5">
               <a:extLst>
                 <a:ext uri="{FF2B5EF4-FFF2-40B4-BE49-F238E27FC236}">
                   <a16:creationId xmlns:a16="http://schemas.microsoft.com/office/drawing/2014/main" id="{3ECBDDDB-593C-40F0-8E80-AA75798EE40C}"/>
@@ -17867,10 +17823,10 @@
       </p:grpSp>
       <p:pic>
         <p:nvPicPr>
-          <p:cNvPr id="8" name="Picture 7">
+          <p:cNvPr id="3" name="Picture 2">
             <a:extLst>
               <a:ext uri="{FF2B5EF4-FFF2-40B4-BE49-F238E27FC236}">
-                <a16:creationId xmlns:a16="http://schemas.microsoft.com/office/drawing/2014/main" id="{D3109D7C-1423-814A-864B-34CFAFA51B09}"/>
+                <a16:creationId xmlns:a16="http://schemas.microsoft.com/office/drawing/2014/main" id="{259EB0F2-935F-BC43-845D-6EC55DF7F28C}"/>
               </a:ext>
             </a:extLst>
           </p:cNvPr>
@@ -19828,20 +19784,6 @@
                   <a:schemeClr val="tx1"/>
                 </a:solidFill>
               </a:rPr>
-              <a:t>Future models</a:t>
-            </a:r>
-          </a:p>
-          <a:p>
-            <a:pPr marL="342900" indent="-342900">
-              <a:buFont typeface="Wingdings 3" charset="2"/>
-              <a:buChar char=""/>
-            </a:pPr>
-            <a:r>
-              <a:rPr lang="en-US" dirty="0">
-                <a:solidFill>
-                  <a:schemeClr val="tx1"/>
-                </a:solidFill>
-              </a:rPr>
               <a:t>recommendations</a:t>
             </a:r>
           </a:p>
@@ -21746,7 +21688,7 @@
                   <a:schemeClr val="tx1"/>
                 </a:solidFill>
               </a:rPr>
-              <a:t> is the official consumer website of VisitScotland, Scotland’s national tourist board</a:t>
+              <a:t> - official consumer website of VisitScotland, Scotland’s national tourist board</a:t>
             </a:r>
           </a:p>
           <a:p>
@@ -21755,20 +21697,26 @@
               <a:buChar char=""/>
             </a:pPr>
             <a:r>
-              <a:rPr lang="en-GB" sz="2000" dirty="0" err="1">
+              <a:rPr lang="en-GB" sz="2000" dirty="0">
                 <a:solidFill>
                   <a:schemeClr val="tx1"/>
                 </a:solidFill>
               </a:rPr>
-              <a:t>Visitscotland</a:t>
+              <a:t>works to ensure that visitors experience the very best of Scotland</a:t>
             </a:r>
+          </a:p>
+          <a:p>
+            <a:pPr marL="342900" indent="-342900">
+              <a:buFont typeface="Wingdings 3" charset="2"/>
+              <a:buChar char=""/>
+            </a:pPr>
             <a:r>
               <a:rPr lang="en-GB" sz="2000" dirty="0">
                 <a:solidFill>
                   <a:schemeClr val="tx1"/>
                 </a:solidFill>
               </a:rPr>
-              <a:t> works to ensure that visitors experience the very best of Scotland and that the country makes the most of its outstanding tourism assets and realises its potential</a:t>
+              <a:t>that the country makes the most of its outstanding tourism assets and realises its potential</a:t>
             </a:r>
             <a:endParaRPr lang="en-US" sz="2000" dirty="0">
               <a:solidFill>
@@ -21787,21 +21735,7 @@
                   <a:schemeClr val="tx1"/>
                 </a:solidFill>
               </a:rPr>
-              <a:t>Data for VisitScotland provided</a:t>
-            </a:r>
-          </a:p>
-          <a:p>
-            <a:pPr marL="342900" indent="-342900">
-              <a:buFont typeface="Wingdings 3" charset="2"/>
-              <a:buChar char=""/>
-            </a:pPr>
-            <a:r>
-              <a:rPr lang="en-US" sz="2000" dirty="0">
-                <a:solidFill>
-                  <a:schemeClr val="tx1"/>
-                </a:solidFill>
-              </a:rPr>
-              <a:t>9 business questions asked around 6 key areas</a:t>
+              <a:t>9 questions around 6 key areas</a:t>
             </a:r>
           </a:p>
         </p:txBody>
@@ -21846,7 +21780,7 @@
       </p:grpSpPr>
       <p:sp>
         <p:nvSpPr>
-          <p:cNvPr id="30" name="Rectangle 29">
+          <p:cNvPr id="49" name="Rectangle 40">
             <a:extLst>
               <a:ext uri="{FF2B5EF4-FFF2-40B4-BE49-F238E27FC236}">
                 <a16:creationId xmlns:a16="http://schemas.microsoft.com/office/drawing/2014/main" id="{1B9CC3E5-EA42-4393-A2C0-5192B91BD745}"/>
@@ -21909,10 +21843,10 @@
       </p:sp>
       <p:pic>
         <p:nvPicPr>
-          <p:cNvPr id="6" name="Picture 5">
+          <p:cNvPr id="5" name="Picture 4">
             <a:extLst>
               <a:ext uri="{FF2B5EF4-FFF2-40B4-BE49-F238E27FC236}">
-                <a16:creationId xmlns:a16="http://schemas.microsoft.com/office/drawing/2014/main" id="{EFD47F28-CFFB-9D43-8AE2-2721A7C6FD71}"/>
+                <a16:creationId xmlns:a16="http://schemas.microsoft.com/office/drawing/2014/main" id="{36734976-6D34-B146-9DCE-B8D6FEFB2380}"/>
               </a:ext>
             </a:extLst>
           </p:cNvPr>
@@ -21942,7 +21876,7 @@
       </p:pic>
       <p:sp>
         <p:nvSpPr>
-          <p:cNvPr id="32" name="Rectangle 31">
+          <p:cNvPr id="50" name="Rectangle 42">
             <a:extLst>
               <a:ext uri="{FF2B5EF4-FFF2-40B4-BE49-F238E27FC236}">
                 <a16:creationId xmlns:a16="http://schemas.microsoft.com/office/drawing/2014/main" id="{FB8DBC8E-FBA7-466C-8D97-75B15FBE9048}"/>
@@ -21995,10 +21929,10 @@
       </p:sp>
       <p:pic>
         <p:nvPicPr>
-          <p:cNvPr id="4" name="Picture 3">
+          <p:cNvPr id="3" name="Picture 2">
             <a:extLst>
               <a:ext uri="{FF2B5EF4-FFF2-40B4-BE49-F238E27FC236}">
-                <a16:creationId xmlns:a16="http://schemas.microsoft.com/office/drawing/2014/main" id="{16A79824-CEED-A847-9C7E-8D830B55422E}"/>
+                <a16:creationId xmlns:a16="http://schemas.microsoft.com/office/drawing/2014/main" id="{B60BB42D-D04F-A441-9CD2-6488F61B9353}"/>
               </a:ext>
             </a:extLst>
           </p:cNvPr>
@@ -22028,7 +21962,7 @@
       </p:pic>
       <p:sp>
         <p:nvSpPr>
-          <p:cNvPr id="34" name="Freeform: Shape 33">
+          <p:cNvPr id="51" name="Freeform: Shape 44">
             <a:extLst>
               <a:ext uri="{FF2B5EF4-FFF2-40B4-BE49-F238E27FC236}">
                 <a16:creationId xmlns:a16="http://schemas.microsoft.com/office/drawing/2014/main" id="{E6FFF64E-1FE4-4AE0-9D62-567AA183C128}"/>
@@ -22485,7 +22419,7 @@
       </p:sp>
       <p:sp>
         <p:nvSpPr>
-          <p:cNvPr id="36" name="Freeform 5">
+          <p:cNvPr id="52" name="Freeform 5">
             <a:extLst>
               <a:ext uri="{FF2B5EF4-FFF2-40B4-BE49-F238E27FC236}">
                 <a16:creationId xmlns:a16="http://schemas.microsoft.com/office/drawing/2014/main" id="{9C80E52D-DE5C-4267-9C99-8741F2E42E36}"/>
@@ -22722,7 +22656,7 @@
       </p:grpSpPr>
       <p:sp>
         <p:nvSpPr>
-          <p:cNvPr id="40" name="Rectangle 39">
+          <p:cNvPr id="51" name="Rectangle 50">
             <a:extLst>
               <a:ext uri="{FF2B5EF4-FFF2-40B4-BE49-F238E27FC236}">
                 <a16:creationId xmlns:a16="http://schemas.microsoft.com/office/drawing/2014/main" id="{1B9CC3E5-EA42-4393-A2C0-5192B91BD745}"/>
@@ -22785,10 +22719,10 @@
       </p:sp>
       <p:pic>
         <p:nvPicPr>
-          <p:cNvPr id="13" name="Picture 12">
+          <p:cNvPr id="5" name="Picture 4">
             <a:extLst>
               <a:ext uri="{FF2B5EF4-FFF2-40B4-BE49-F238E27FC236}">
-                <a16:creationId xmlns:a16="http://schemas.microsoft.com/office/drawing/2014/main" id="{45E7576D-6D12-2043-8673-9F06BFE693FA}"/>
+                <a16:creationId xmlns:a16="http://schemas.microsoft.com/office/drawing/2014/main" id="{5EE696C9-7995-5248-B6C0-4D9BBD47FD9E}"/>
               </a:ext>
             </a:extLst>
           </p:cNvPr>
@@ -22818,7 +22752,7 @@
       </p:pic>
       <p:sp>
         <p:nvSpPr>
-          <p:cNvPr id="42" name="Rectangle 41">
+          <p:cNvPr id="53" name="Rectangle 52">
             <a:extLst>
               <a:ext uri="{FF2B5EF4-FFF2-40B4-BE49-F238E27FC236}">
                 <a16:creationId xmlns:a16="http://schemas.microsoft.com/office/drawing/2014/main" id="{FB8DBC8E-FBA7-466C-8D97-75B15FBE9048}"/>
@@ -22871,10 +22805,10 @@
       </p:sp>
       <p:pic>
         <p:nvPicPr>
-          <p:cNvPr id="4" name="Picture 3">
+          <p:cNvPr id="3" name="Picture 2">
             <a:extLst>
               <a:ext uri="{FF2B5EF4-FFF2-40B4-BE49-F238E27FC236}">
-                <a16:creationId xmlns:a16="http://schemas.microsoft.com/office/drawing/2014/main" id="{57C3CC1D-690B-224B-ACF4-285F58BF3451}"/>
+                <a16:creationId xmlns:a16="http://schemas.microsoft.com/office/drawing/2014/main" id="{440AACFE-5A25-344E-BD1A-3C3FA23B00C8}"/>
               </a:ext>
             </a:extLst>
           </p:cNvPr>
@@ -22904,7 +22838,7 @@
       </p:pic>
       <p:sp>
         <p:nvSpPr>
-          <p:cNvPr id="44" name="Freeform: Shape 43">
+          <p:cNvPr id="55" name="Freeform: Shape 54">
             <a:extLst>
               <a:ext uri="{FF2B5EF4-FFF2-40B4-BE49-F238E27FC236}">
                 <a16:creationId xmlns:a16="http://schemas.microsoft.com/office/drawing/2014/main" id="{E6FFF64E-1FE4-4AE0-9D62-567AA183C128}"/>
@@ -23361,7 +23295,7 @@
       </p:sp>
       <p:sp>
         <p:nvSpPr>
-          <p:cNvPr id="46" name="Freeform 5">
+          <p:cNvPr id="57" name="Freeform 5">
             <a:extLst>
               <a:ext uri="{FF2B5EF4-FFF2-40B4-BE49-F238E27FC236}">
                 <a16:creationId xmlns:a16="http://schemas.microsoft.com/office/drawing/2014/main" id="{9C80E52D-DE5C-4267-9C99-8741F2E42E36}"/>
@@ -23552,8 +23486,8 @@
           <a:lstStyle/>
           <a:p>
             <a:r>
-              <a:rPr lang="en-US" sz="6000"/>
-              <a:t>Locations</a:t>
+              <a:rPr lang="en-US" sz="6000" dirty="0"/>
+              <a:t>Location</a:t>
             </a:r>
           </a:p>
         </p:txBody>
@@ -24676,8 +24610,16 @@
 </file>
 
 <file path=ppt/slides/slide8.xml><?xml version="1.0" encoding="utf-8"?>
-<p:sld xmlns:a="http://schemas.openxmlformats.org/drawingml/2006/main" xmlns:r="http://schemas.openxmlformats.org/officeDocument/2006/relationships" xmlns:p="http://schemas.openxmlformats.org/presentationml/2006/main" show="0">
+<p:sld xmlns:a="http://schemas.openxmlformats.org/drawingml/2006/main" xmlns:r="http://schemas.openxmlformats.org/officeDocument/2006/relationships" xmlns:p="http://schemas.openxmlformats.org/presentationml/2006/main">
   <p:cSld>
+    <p:bg>
+      <p:bgPr>
+        <a:solidFill>
+          <a:schemeClr val="bg1"/>
+        </a:solidFill>
+        <a:effectLst/>
+      </p:bgPr>
+    </p:bg>
     <p:spTree>
       <p:nvGrpSpPr>
         <p:cNvPr id="1" name=""/>
@@ -24710,8 +24652,8 @@
         </p:nvSpPr>
         <p:spPr>
           <a:xfrm>
-            <a:off x="1069848" y="1298448"/>
-            <a:ext cx="7315200" cy="970538"/>
+            <a:off x="7007145" y="1241266"/>
+            <a:ext cx="4535926" cy="3153753"/>
           </a:xfrm>
         </p:spPr>
         <p:txBody>
@@ -24721,19 +24663,467 @@
           <a:lstStyle/>
           <a:p>
             <a:r>
-              <a:rPr lang="en-US" dirty="0"/>
+              <a:rPr lang="en-US" sz="3800">
+                <a:solidFill>
+                  <a:srgbClr val="EBEBEB"/>
+                </a:solidFill>
+              </a:rPr>
               <a:t>Accommodation</a:t>
             </a:r>
-            <a:endParaRPr lang="en-US" sz="4400" dirty="0"/>
           </a:p>
         </p:txBody>
       </p:sp>
+      <p:grpSp>
+        <p:nvGrpSpPr>
+          <p:cNvPr id="8" name="Group 7">
+            <a:extLst>
+              <a:ext uri="{FF2B5EF4-FFF2-40B4-BE49-F238E27FC236}">
+                <a16:creationId xmlns:a16="http://schemas.microsoft.com/office/drawing/2014/main" id="{7E2D86BB-893F-471B-AD66-50E01777C082}"/>
+              </a:ext>
+              <a:ext uri="{C183D7F6-B498-43B3-948B-1728B52AA6E4}">
+                <adec:decorative xmlns:adec="http://schemas.microsoft.com/office/drawing/2017/decorative" val="1"/>
+              </a:ext>
+            </a:extLst>
+          </p:cNvPr>
+          <p:cNvGrpSpPr>
+            <a:grpSpLocks noGrp="1" noUngrp="1" noRot="1" noChangeAspect="1" noMove="1" noResize="1"/>
+          </p:cNvGrpSpPr>
+          <p:nvPr>
+            <p:extLst>
+              <p:ext uri="{386F3935-93C4-4BCD-93E2-E3B085C9AB24}">
+                <p16:designElem xmlns:p16="http://schemas.microsoft.com/office/powerpoint/2015/main" val="1"/>
+              </p:ext>
+            </p:extLst>
+          </p:nvPr>
+        </p:nvGrpSpPr>
+        <p:grpSpPr>
+          <a:xfrm>
+            <a:off x="423333" y="396837"/>
+            <a:ext cx="6451503" cy="6058999"/>
+            <a:chOff x="423333" y="396837"/>
+            <a:chExt cx="6451503" cy="6058999"/>
+          </a:xfrm>
+        </p:grpSpPr>
+        <p:sp>
+          <p:nvSpPr>
+            <p:cNvPr id="9" name="Rectangle 8">
+              <a:extLst>
+                <a:ext uri="{FF2B5EF4-FFF2-40B4-BE49-F238E27FC236}">
+                  <a16:creationId xmlns:a16="http://schemas.microsoft.com/office/drawing/2014/main" id="{61E3F80D-79C6-468A-83E4-3FEA585566FA}"/>
+                </a:ext>
+                <a:ext uri="{C183D7F6-B498-43B3-948B-1728B52AA6E4}">
+                  <adec:decorative xmlns:adec="http://schemas.microsoft.com/office/drawing/2017/decorative" val="1"/>
+                </a:ext>
+              </a:extLst>
+            </p:cNvPr>
+            <p:cNvSpPr/>
+            <p:nvPr>
+              <p:extLst>
+                <p:ext uri="{386F3935-93C4-4BCD-93E2-E3B085C9AB24}">
+                  <p16:designElem xmlns:p16="http://schemas.microsoft.com/office/powerpoint/2015/main" val="1"/>
+                </p:ext>
+              </p:extLst>
+            </p:nvPr>
+          </p:nvSpPr>
+          <p:spPr bwMode="gray">
+            <a:xfrm flipH="1">
+              <a:off x="423333" y="402165"/>
+              <a:ext cx="5229339" cy="6053670"/>
+            </a:xfrm>
+            <a:prstGeom prst="rect">
+              <a:avLst/>
+            </a:prstGeom>
+            <a:solidFill>
+              <a:schemeClr val="bg1"/>
+            </a:solidFill>
+            <a:ln>
+              <a:noFill/>
+            </a:ln>
+            <a:effectLst/>
+          </p:spPr>
+          <p:style>
+            <a:lnRef idx="1">
+              <a:schemeClr val="accent1"/>
+            </a:lnRef>
+            <a:fillRef idx="3">
+              <a:schemeClr val="accent1"/>
+            </a:fillRef>
+            <a:effectRef idx="2">
+              <a:schemeClr val="accent1"/>
+            </a:effectRef>
+            <a:fontRef idx="minor">
+              <a:schemeClr val="lt1"/>
+            </a:fontRef>
+          </p:style>
+        </p:sp>
+        <p:sp>
+          <p:nvSpPr>
+            <p:cNvPr id="10" name="Freeform 5">
+              <a:extLst>
+                <a:ext uri="{FF2B5EF4-FFF2-40B4-BE49-F238E27FC236}">
+                  <a16:creationId xmlns:a16="http://schemas.microsoft.com/office/drawing/2014/main" id="{009504C1-96CE-44B4-8DF0-613CF9D1DABE}"/>
+                </a:ext>
+                <a:ext uri="{C183D7F6-B498-43B3-948B-1728B52AA6E4}">
+                  <adec:decorative xmlns:adec="http://schemas.microsoft.com/office/drawing/2017/decorative" val="1"/>
+                </a:ext>
+              </a:extLst>
+            </p:cNvPr>
+            <p:cNvSpPr/>
+            <p:nvPr>
+              <p:extLst>
+                <p:ext uri="{386F3935-93C4-4BCD-93E2-E3B085C9AB24}">
+                  <p16:designElem xmlns:p16="http://schemas.microsoft.com/office/powerpoint/2015/main" val="1"/>
+                </p:ext>
+              </p:extLst>
+            </p:nvPr>
+          </p:nvSpPr>
+          <p:spPr bwMode="gray">
+            <a:xfrm rot="5400000" flipH="1">
+              <a:off x="3161515" y="2801722"/>
+              <a:ext cx="6053670" cy="1254558"/>
+            </a:xfrm>
+            <a:custGeom>
+              <a:avLst/>
+              <a:gdLst/>
+              <a:ahLst/>
+              <a:cxnLst/>
+              <a:rect l="l" t="t" r="r" b="b"/>
+              <a:pathLst>
+                <a:path w="10000" h="8000">
+                  <a:moveTo>
+                    <a:pt x="0" y="0"/>
+                  </a:moveTo>
+                  <a:lnTo>
+                    <a:pt x="0" y="7970"/>
+                  </a:lnTo>
+                  <a:lnTo>
+                    <a:pt x="10000" y="8000"/>
+                  </a:lnTo>
+                  <a:lnTo>
+                    <a:pt x="10000" y="7"/>
+                  </a:lnTo>
+                  <a:lnTo>
+                    <a:pt x="10000" y="7"/>
+                  </a:lnTo>
+                  <a:lnTo>
+                    <a:pt x="9773" y="156"/>
+                  </a:lnTo>
+                  <a:lnTo>
+                    <a:pt x="9547" y="298"/>
+                  </a:lnTo>
+                  <a:lnTo>
+                    <a:pt x="9320" y="437"/>
+                  </a:lnTo>
+                  <a:lnTo>
+                    <a:pt x="9092" y="556"/>
+                  </a:lnTo>
+                  <a:lnTo>
+                    <a:pt x="8865" y="676"/>
+                  </a:lnTo>
+                  <a:lnTo>
+                    <a:pt x="8637" y="788"/>
+                  </a:lnTo>
+                  <a:lnTo>
+                    <a:pt x="8412" y="884"/>
+                  </a:lnTo>
+                  <a:lnTo>
+                    <a:pt x="8184" y="975"/>
+                  </a:lnTo>
+                  <a:lnTo>
+                    <a:pt x="7957" y="1058"/>
+                  </a:lnTo>
+                  <a:lnTo>
+                    <a:pt x="7734" y="1130"/>
+                  </a:lnTo>
+                  <a:lnTo>
+                    <a:pt x="7508" y="1202"/>
+                  </a:lnTo>
+                  <a:lnTo>
+                    <a:pt x="7285" y="1262"/>
+                  </a:lnTo>
+                  <a:lnTo>
+                    <a:pt x="7062" y="1309"/>
+                  </a:lnTo>
+                  <a:lnTo>
+                    <a:pt x="6840" y="1358"/>
+                  </a:lnTo>
+                  <a:lnTo>
+                    <a:pt x="6620" y="1399"/>
+                  </a:lnTo>
+                  <a:lnTo>
+                    <a:pt x="6402" y="1428"/>
+                  </a:lnTo>
+                  <a:lnTo>
+                    <a:pt x="6184" y="1453"/>
+                  </a:lnTo>
+                  <a:lnTo>
+                    <a:pt x="5968" y="1477"/>
+                  </a:lnTo>
+                  <a:lnTo>
+                    <a:pt x="5755" y="1488"/>
+                  </a:lnTo>
+                  <a:lnTo>
+                    <a:pt x="5542" y="1500"/>
+                  </a:lnTo>
+                  <a:lnTo>
+                    <a:pt x="5332" y="1506"/>
+                  </a:lnTo>
+                  <a:lnTo>
+                    <a:pt x="5124" y="1500"/>
+                  </a:lnTo>
+                  <a:lnTo>
+                    <a:pt x="4918" y="1500"/>
+                  </a:lnTo>
+                  <a:lnTo>
+                    <a:pt x="4714" y="1488"/>
+                  </a:lnTo>
+                  <a:lnTo>
+                    <a:pt x="4514" y="1470"/>
+                  </a:lnTo>
+                  <a:lnTo>
+                    <a:pt x="4316" y="1453"/>
+                  </a:lnTo>
+                  <a:lnTo>
+                    <a:pt x="4122" y="1434"/>
+                  </a:lnTo>
+                  <a:lnTo>
+                    <a:pt x="3929" y="1405"/>
+                  </a:lnTo>
+                  <a:lnTo>
+                    <a:pt x="3739" y="1374"/>
+                  </a:lnTo>
+                  <a:lnTo>
+                    <a:pt x="3553" y="1346"/>
+                  </a:lnTo>
+                  <a:lnTo>
+                    <a:pt x="3190" y="1267"/>
+                  </a:lnTo>
+                  <a:lnTo>
+                    <a:pt x="2842" y="1183"/>
+                  </a:lnTo>
+                  <a:lnTo>
+                    <a:pt x="2508" y="1095"/>
+                  </a:lnTo>
+                  <a:lnTo>
+                    <a:pt x="2192" y="998"/>
+                  </a:lnTo>
+                  <a:lnTo>
+                    <a:pt x="1890" y="897"/>
+                  </a:lnTo>
+                  <a:lnTo>
+                    <a:pt x="1610" y="788"/>
+                  </a:lnTo>
+                  <a:lnTo>
+                    <a:pt x="1347" y="681"/>
+                  </a:lnTo>
+                  <a:lnTo>
+                    <a:pt x="1105" y="574"/>
+                  </a:lnTo>
+                  <a:lnTo>
+                    <a:pt x="883" y="473"/>
+                  </a:lnTo>
+                  <a:lnTo>
+                    <a:pt x="686" y="377"/>
+                  </a:lnTo>
+                  <a:lnTo>
+                    <a:pt x="508" y="286"/>
+                  </a:lnTo>
+                  <a:lnTo>
+                    <a:pt x="358" y="210"/>
+                  </a:lnTo>
+                  <a:lnTo>
+                    <a:pt x="232" y="138"/>
+                  </a:lnTo>
+                  <a:lnTo>
+                    <a:pt x="59" y="35"/>
+                  </a:lnTo>
+                  <a:lnTo>
+                    <a:pt x="0" y="0"/>
+                  </a:lnTo>
+                  <a:lnTo>
+                    <a:pt x="0" y="0"/>
+                  </a:lnTo>
+                  <a:close/>
+                </a:path>
+              </a:pathLst>
+            </a:custGeom>
+            <a:solidFill>
+              <a:schemeClr val="bg1"/>
+            </a:solidFill>
+            <a:ln>
+              <a:noFill/>
+            </a:ln>
+          </p:spPr>
+        </p:sp>
+        <p:sp>
+          <p:nvSpPr>
+            <p:cNvPr id="11" name="Freeform 5">
+              <a:extLst>
+                <a:ext uri="{FF2B5EF4-FFF2-40B4-BE49-F238E27FC236}">
+                  <a16:creationId xmlns:a16="http://schemas.microsoft.com/office/drawing/2014/main" id="{1F299836-4C10-4395-B386-C0FA537C417E}"/>
+                </a:ext>
+                <a:ext uri="{C183D7F6-B498-43B3-948B-1728B52AA6E4}">
+                  <adec:decorative xmlns:adec="http://schemas.microsoft.com/office/drawing/2017/decorative" val="1"/>
+                </a:ext>
+              </a:extLst>
+            </p:cNvPr>
+            <p:cNvSpPr/>
+            <p:nvPr>
+              <p:extLst>
+                <p:ext uri="{386F3935-93C4-4BCD-93E2-E3B085C9AB24}">
+                  <p16:designElem xmlns:p16="http://schemas.microsoft.com/office/powerpoint/2015/main" val="1"/>
+                </p:ext>
+              </p:extLst>
+            </p:nvPr>
+          </p:nvSpPr>
+          <p:spPr bwMode="gray">
+            <a:xfrm rot="5677511" flipH="1">
+              <a:off x="5004670" y="1826079"/>
+              <a:ext cx="3299407" cy="440924"/>
+            </a:xfrm>
+            <a:custGeom>
+              <a:avLst/>
+              <a:gdLst/>
+              <a:ahLst/>
+              <a:cxnLst/>
+              <a:rect l="l" t="t" r="r" b="b"/>
+              <a:pathLst>
+                <a:path w="10000" h="5291">
+                  <a:moveTo>
+                    <a:pt x="85" y="2532"/>
+                  </a:moveTo>
+                  <a:cubicBezTo>
+                    <a:pt x="1736" y="3911"/>
+                    <a:pt x="7524" y="5298"/>
+                    <a:pt x="9958" y="5291"/>
+                  </a:cubicBezTo>
+                  <a:cubicBezTo>
+                    <a:pt x="9989" y="1958"/>
+                    <a:pt x="9969" y="3333"/>
+                    <a:pt x="10000" y="0"/>
+                  </a:cubicBezTo>
+                  <a:lnTo>
+                    <a:pt x="10000" y="0"/>
+                  </a:lnTo>
+                  <a:lnTo>
+                    <a:pt x="9667" y="204"/>
+                  </a:lnTo>
+                  <a:lnTo>
+                    <a:pt x="9334" y="400"/>
+                  </a:lnTo>
+                  <a:lnTo>
+                    <a:pt x="9001" y="590"/>
+                  </a:lnTo>
+                  <a:lnTo>
+                    <a:pt x="8667" y="753"/>
+                  </a:lnTo>
+                  <a:lnTo>
+                    <a:pt x="8333" y="917"/>
+                  </a:lnTo>
+                  <a:lnTo>
+                    <a:pt x="7999" y="1071"/>
+                  </a:lnTo>
+                  <a:lnTo>
+                    <a:pt x="7669" y="1202"/>
+                  </a:lnTo>
+                  <a:lnTo>
+                    <a:pt x="7333" y="1325"/>
+                  </a:lnTo>
+                  <a:lnTo>
+                    <a:pt x="7000" y="1440"/>
+                  </a:lnTo>
+                  <a:lnTo>
+                    <a:pt x="6673" y="1538"/>
+                  </a:lnTo>
+                  <a:lnTo>
+                    <a:pt x="6340" y="1636"/>
+                  </a:lnTo>
+                  <a:lnTo>
+                    <a:pt x="6013" y="1719"/>
+                  </a:lnTo>
+                  <a:lnTo>
+                    <a:pt x="5686" y="1784"/>
+                  </a:lnTo>
+                  <a:lnTo>
+                    <a:pt x="5359" y="1850"/>
+                  </a:lnTo>
+                  <a:lnTo>
+                    <a:pt x="5036" y="1906"/>
+                  </a:lnTo>
+                  <a:lnTo>
+                    <a:pt x="4717" y="1948"/>
+                  </a:lnTo>
+                  <a:lnTo>
+                    <a:pt x="4396" y="1980"/>
+                  </a:lnTo>
+                  <a:lnTo>
+                    <a:pt x="4079" y="2013"/>
+                  </a:lnTo>
+                  <a:lnTo>
+                    <a:pt x="3766" y="2029"/>
+                  </a:lnTo>
+                  <a:lnTo>
+                    <a:pt x="3454" y="2046"/>
+                  </a:lnTo>
+                  <a:lnTo>
+                    <a:pt x="3145" y="2053"/>
+                  </a:lnTo>
+                  <a:lnTo>
+                    <a:pt x="2839" y="2046"/>
+                  </a:lnTo>
+                  <a:lnTo>
+                    <a:pt x="2537" y="2046"/>
+                  </a:lnTo>
+                  <a:lnTo>
+                    <a:pt x="2238" y="2029"/>
+                  </a:lnTo>
+                  <a:lnTo>
+                    <a:pt x="1943" y="2004"/>
+                  </a:lnTo>
+                  <a:lnTo>
+                    <a:pt x="1653" y="1980"/>
+                  </a:lnTo>
+                  <a:lnTo>
+                    <a:pt x="1368" y="1955"/>
+                  </a:lnTo>
+                  <a:lnTo>
+                    <a:pt x="1085" y="1915"/>
+                  </a:lnTo>
+                  <a:lnTo>
+                    <a:pt x="806" y="1873"/>
+                  </a:lnTo>
+                  <a:lnTo>
+                    <a:pt x="533" y="1833"/>
+                  </a:lnTo>
+                  <a:lnTo>
+                    <a:pt x="0" y="1726"/>
+                  </a:lnTo>
+                  <a:cubicBezTo>
+                    <a:pt x="28" y="1995"/>
+                    <a:pt x="57" y="2263"/>
+                    <a:pt x="85" y="2532"/>
+                  </a:cubicBezTo>
+                  <a:close/>
+                </a:path>
+              </a:pathLst>
+            </a:custGeom>
+            <a:solidFill>
+              <a:schemeClr val="bg1">
+                <a:alpha val="20000"/>
+              </a:schemeClr>
+            </a:solidFill>
+            <a:ln>
+              <a:noFill/>
+            </a:ln>
+          </p:spPr>
+        </p:sp>
+      </p:grpSp>
       <p:pic>
         <p:nvPicPr>
-          <p:cNvPr id="4" name="Picture 3">
+          <p:cNvPr id="3" name="Picture 2">
             <a:extLst>
               <a:ext uri="{FF2B5EF4-FFF2-40B4-BE49-F238E27FC236}">
-                <a16:creationId xmlns:a16="http://schemas.microsoft.com/office/drawing/2014/main" id="{89EBEB71-EFE6-0C4D-8202-9FD22FE79773}"/>
+                <a16:creationId xmlns:a16="http://schemas.microsoft.com/office/drawing/2014/main" id="{9B7F6766-9AA7-3B44-87B8-610A6AB7F623}"/>
               </a:ext>
             </a:extLst>
           </p:cNvPr>
@@ -24750,8 +25140,8 @@
         </p:blipFill>
         <p:spPr>
           <a:xfrm>
-            <a:off x="3585814" y="2268986"/>
-            <a:ext cx="5020371" cy="3096982"/>
+            <a:off x="1109763" y="1890271"/>
+            <a:ext cx="4983737" cy="3077457"/>
           </a:xfrm>
           <a:prstGeom prst="rect">
             <a:avLst/>
@@ -24761,7 +25151,7 @@
     </p:spTree>
     <p:extLst>
       <p:ext uri="{BB962C8B-B14F-4D97-AF65-F5344CB8AC3E}">
-        <p14:creationId xmlns:p14="http://schemas.microsoft.com/office/powerpoint/2010/main" val="4215023738"/>
+        <p14:creationId xmlns:p14="http://schemas.microsoft.com/office/powerpoint/2010/main" val="1103887060"/>
       </p:ext>
     </p:extLst>
   </p:cSld>
@@ -24798,10 +25188,10 @@
       </p:grpSpPr>
       <p:sp>
         <p:nvSpPr>
-          <p:cNvPr id="37" name="Rectangle 36">
+          <p:cNvPr id="48" name="Rectangle 47">
             <a:extLst>
               <a:ext uri="{FF2B5EF4-FFF2-40B4-BE49-F238E27FC236}">
-                <a16:creationId xmlns:a16="http://schemas.microsoft.com/office/drawing/2014/main" id="{4D564D1C-BBBA-41AB-8D3D-65E6513686EA}"/>
+                <a16:creationId xmlns:a16="http://schemas.microsoft.com/office/drawing/2014/main" id="{1B9CC3E5-EA42-4393-A2C0-5192B91BD745}"/>
               </a:ext>
               <a:ext uri="{C183D7F6-B498-43B3-948B-1728B52AA6E4}">
                 <adec:decorative xmlns:adec="http://schemas.microsoft.com/office/drawing/2017/decorative" val="1"/>
@@ -24859,12 +25249,45 @@
           </a:p>
         </p:txBody>
       </p:sp>
+      <p:pic>
+        <p:nvPicPr>
+          <p:cNvPr id="4" name="Picture 3">
+            <a:extLst>
+              <a:ext uri="{FF2B5EF4-FFF2-40B4-BE49-F238E27FC236}">
+                <a16:creationId xmlns:a16="http://schemas.microsoft.com/office/drawing/2014/main" id="{E003279C-933C-7C4D-BF75-4B2CFB43A104}"/>
+              </a:ext>
+            </a:extLst>
+          </p:cNvPr>
+          <p:cNvPicPr>
+            <a:picLocks noChangeAspect="1"/>
+          </p:cNvPicPr>
+          <p:nvPr/>
+        </p:nvPicPr>
+        <p:blipFill>
+          <a:blip r:embed="rId3"/>
+          <a:stretch>
+            <a:fillRect/>
+          </a:stretch>
+        </p:blipFill>
+        <p:spPr>
+          <a:xfrm>
+            <a:off x="561110" y="511836"/>
+            <a:ext cx="5448111" cy="3364208"/>
+          </a:xfrm>
+          <a:prstGeom prst="roundRect">
+            <a:avLst>
+              <a:gd name="adj" fmla="val 0"/>
+            </a:avLst>
+          </a:prstGeom>
+          <a:effectLst/>
+        </p:spPr>
+      </p:pic>
       <p:sp>
         <p:nvSpPr>
-          <p:cNvPr id="39" name="Rectangle 38">
+          <p:cNvPr id="50" name="Rectangle 49">
             <a:extLst>
               <a:ext uri="{FF2B5EF4-FFF2-40B4-BE49-F238E27FC236}">
-                <a16:creationId xmlns:a16="http://schemas.microsoft.com/office/drawing/2014/main" id="{4D63F519-D67F-403F-938E-102A5A37D900}"/>
+                <a16:creationId xmlns:a16="http://schemas.microsoft.com/office/drawing/2014/main" id="{FB8DBC8E-FBA7-466C-8D97-75B15FBE9048}"/>
               </a:ext>
               <a:ext uri="{C183D7F6-B498-43B3-948B-1728B52AA6E4}">
                 <adec:decorative xmlns:adec="http://schemas.microsoft.com/office/drawing/2017/decorative" val="1"/>
@@ -24912,12 +25335,45 @@
           </a:fontRef>
         </p:style>
       </p:sp>
+      <p:pic>
+        <p:nvPicPr>
+          <p:cNvPr id="3" name="Picture 2">
+            <a:extLst>
+              <a:ext uri="{FF2B5EF4-FFF2-40B4-BE49-F238E27FC236}">
+                <a16:creationId xmlns:a16="http://schemas.microsoft.com/office/drawing/2014/main" id="{0025CCF5-D759-2543-8AB4-52F344C24B19}"/>
+              </a:ext>
+            </a:extLst>
+          </p:cNvPr>
+          <p:cNvPicPr>
+            <a:picLocks noChangeAspect="1"/>
+          </p:cNvPicPr>
+          <p:nvPr/>
+        </p:nvPicPr>
+        <p:blipFill>
+          <a:blip r:embed="rId4"/>
+          <a:stretch>
+            <a:fillRect/>
+          </a:stretch>
+        </p:blipFill>
+        <p:spPr>
+          <a:xfrm>
+            <a:off x="6172946" y="535121"/>
+            <a:ext cx="5370123" cy="3316051"/>
+          </a:xfrm>
+          <a:prstGeom prst="roundRect">
+            <a:avLst>
+              <a:gd name="adj" fmla="val 0"/>
+            </a:avLst>
+          </a:prstGeom>
+          <a:effectLst/>
+        </p:spPr>
+      </p:pic>
       <p:sp>
         <p:nvSpPr>
-          <p:cNvPr id="41" name="Freeform: Shape 40">
+          <p:cNvPr id="52" name="Freeform: Shape 51">
             <a:extLst>
               <a:ext uri="{FF2B5EF4-FFF2-40B4-BE49-F238E27FC236}">
-                <a16:creationId xmlns:a16="http://schemas.microsoft.com/office/drawing/2014/main" id="{0690B2E9-00B3-4554-8C5C-2D5134ADF40E}"/>
+                <a16:creationId xmlns:a16="http://schemas.microsoft.com/office/drawing/2014/main" id="{E6FFF64E-1FE4-4AE0-9D62-567AA183C128}"/>
               </a:ext>
               <a:ext uri="{C183D7F6-B498-43B3-948B-1728B52AA6E4}">
                 <adec:decorative xmlns:adec="http://schemas.microsoft.com/office/drawing/2017/decorative" val="1"/>
@@ -25371,10 +25827,10 @@
       </p:sp>
       <p:sp>
         <p:nvSpPr>
-          <p:cNvPr id="43" name="Freeform 5">
+          <p:cNvPr id="54" name="Freeform 5">
             <a:extLst>
               <a:ext uri="{FF2B5EF4-FFF2-40B4-BE49-F238E27FC236}">
-                <a16:creationId xmlns:a16="http://schemas.microsoft.com/office/drawing/2014/main" id="{25225EF6-7666-40A5-813B-4BE52C749418}"/>
+                <a16:creationId xmlns:a16="http://schemas.microsoft.com/office/drawing/2014/main" id="{9C80E52D-DE5C-4267-9C99-8741F2E42E36}"/>
               </a:ext>
               <a:ext uri="{C183D7F6-B498-43B3-948B-1728B52AA6E4}">
                 <adec:decorative xmlns:adec="http://schemas.microsoft.com/office/drawing/2017/decorative" val="1"/>
@@ -25551,8 +26007,8 @@
         </p:nvSpPr>
         <p:spPr>
           <a:xfrm>
-            <a:off x="649976" y="4174067"/>
-            <a:ext cx="10893094" cy="1481440"/>
+            <a:off x="649975" y="4517136"/>
+            <a:ext cx="10893095" cy="1174947"/>
           </a:xfrm>
         </p:spPr>
         <p:txBody>
@@ -25561,80 +26017,13 @@
           </a:bodyPr>
           <a:lstStyle/>
           <a:p>
-            <a:pPr algn="ctr"/>
             <a:r>
-              <a:rPr lang="en-US" sz="7200"/>
+              <a:rPr lang="en-US" sz="6000"/>
               <a:t>Accommodation</a:t>
             </a:r>
           </a:p>
         </p:txBody>
       </p:sp>
-      <p:pic>
-        <p:nvPicPr>
-          <p:cNvPr id="6" name="Picture 5">
-            <a:extLst>
-              <a:ext uri="{FF2B5EF4-FFF2-40B4-BE49-F238E27FC236}">
-                <a16:creationId xmlns:a16="http://schemas.microsoft.com/office/drawing/2014/main" id="{237077B2-1F73-8A47-ADE8-006D6C98DCE5}"/>
-              </a:ext>
-            </a:extLst>
-          </p:cNvPr>
-          <p:cNvPicPr>
-            <a:picLocks noChangeAspect="1"/>
-          </p:cNvPicPr>
-          <p:nvPr/>
-        </p:nvPicPr>
-        <p:blipFill>
-          <a:blip r:embed="rId3"/>
-          <a:stretch>
-            <a:fillRect/>
-          </a:stretch>
-        </p:blipFill>
-        <p:spPr>
-          <a:xfrm>
-            <a:off x="1580828" y="1026838"/>
-            <a:ext cx="4428394" cy="2734533"/>
-          </a:xfrm>
-          <a:prstGeom prst="roundRect">
-            <a:avLst>
-              <a:gd name="adj" fmla="val 1858"/>
-            </a:avLst>
-          </a:prstGeom>
-          <a:effectLst/>
-        </p:spPr>
-      </p:pic>
-      <p:pic>
-        <p:nvPicPr>
-          <p:cNvPr id="7" name="Picture 6">
-            <a:extLst>
-              <a:ext uri="{FF2B5EF4-FFF2-40B4-BE49-F238E27FC236}">
-                <a16:creationId xmlns:a16="http://schemas.microsoft.com/office/drawing/2014/main" id="{4E448BFD-3882-6B4A-B589-6569FDD83F24}"/>
-              </a:ext>
-            </a:extLst>
-          </p:cNvPr>
-          <p:cNvPicPr>
-            <a:picLocks noChangeAspect="1"/>
-          </p:cNvPicPr>
-          <p:nvPr/>
-        </p:nvPicPr>
-        <p:blipFill>
-          <a:blip r:embed="rId4"/>
-          <a:stretch>
-            <a:fillRect/>
-          </a:stretch>
-        </p:blipFill>
-        <p:spPr>
-          <a:xfrm>
-            <a:off x="6172946" y="1021996"/>
-            <a:ext cx="4428394" cy="2734533"/>
-          </a:xfrm>
-          <a:prstGeom prst="roundRect">
-            <a:avLst>
-              <a:gd name="adj" fmla="val 1858"/>
-            </a:avLst>
-          </a:prstGeom>
-          <a:effectLst/>
-        </p:spPr>
-      </p:pic>
     </p:spTree>
     <p:extLst>
       <p:ext uri="{BB962C8B-B14F-4D97-AF65-F5344CB8AC3E}">

</xml_diff>

<commit_message>
cleaning code in main notebook
cleaning code in main notebook - removed the secondary cleaning script (was built for model building)
</commit_message>
<xml_diff>
--- a/presentation/visit_scotland_presentation.pptx
+++ b/presentation/visit_scotland_presentation.pptx
@@ -22,7 +22,7 @@
     <p:sldId id="281" r:id="rId13"/>
     <p:sldId id="261" r:id="rId14"/>
     <p:sldId id="267" r:id="rId15"/>
-    <p:sldId id="269" r:id="rId16"/>
+    <p:sldId id="288" r:id="rId16"/>
     <p:sldId id="272" r:id="rId17"/>
     <p:sldId id="274" r:id="rId18"/>
     <p:sldId id="275" r:id="rId19"/>
@@ -1001,16 +1001,12 @@
           </a:p>
           <a:p>
             <a:r>
-              <a:rPr lang="en-US" i="1" dirty="0" err="1"/>
-              <a:t>Q:</a:t>
-            </a:r>
-            <a:r>
-              <a:rPr lang="en-US" sz="1200" i="1" dirty="0" err="1"/>
-              <a:t>How</a:t>
+              <a:rPr lang="en-US" i="1" dirty="0"/>
+              <a:t>Q: </a:t>
             </a:r>
             <a:r>
               <a:rPr lang="en-US" sz="1200" i="1" dirty="0"/>
-              <a:t> have general tourism rates changed over time?</a:t>
+              <a:t>How have general tourism rates changed over time?</a:t>
             </a:r>
             <a:endParaRPr lang="en-US" i="1" dirty="0"/>
           </a:p>
@@ -1096,14 +1092,38 @@
           <a:bodyPr/>
           <a:lstStyle/>
           <a:p>
+            <a:pPr marL="171450" indent="-171450">
+              <a:buFontTx/>
+              <a:buChar char="-"/>
+            </a:pPr>
             <a:r>
               <a:rPr lang="en-US" dirty="0"/>
-              <a:t>Answer to Q:</a:t>
+              <a:t>Trend is one of visits spending more, across fewer visits - but to build an effective and accurate model to predict and explore this. A clear recommendation to change their collection method </a:t>
             </a:r>
+            <a:r>
+              <a:rPr lang="en-US"/>
+              <a:t>to collect monthly. </a:t>
+            </a:r>
+            <a:endParaRPr lang="en-US" dirty="0"/>
           </a:p>
           <a:p>
+            <a:pPr marL="171450" indent="-171450">
+              <a:buFontTx/>
+              <a:buChar char="-"/>
+            </a:pPr>
+            <a:endParaRPr lang="en-US" i="1" dirty="0"/>
+          </a:p>
+          <a:p>
+            <a:pPr marL="171450" indent="-171450">
+              <a:buFontTx/>
+              <a:buChar char="-"/>
+            </a:pPr>
             <a:r>
-              <a:rPr lang="en-US" sz="1200" dirty="0"/>
+              <a:rPr lang="en-US" i="1" dirty="0"/>
+              <a:t>Q: </a:t>
+            </a:r>
+            <a:r>
+              <a:rPr lang="en-US" sz="1200" i="1" dirty="0"/>
               <a:t>Is there any way to predict spending and visits for Visit Scotland?</a:t>
             </a:r>
             <a:endParaRPr lang="en-US" dirty="0"/>
@@ -1136,7 +1156,7 @@
     </p:spTree>
     <p:extLst>
       <p:ext uri="{BB962C8B-B14F-4D97-AF65-F5344CB8AC3E}">
-        <p14:creationId xmlns:p14="http://schemas.microsoft.com/office/powerpoint/2010/main" val="862993618"/>
+        <p14:creationId xmlns:p14="http://schemas.microsoft.com/office/powerpoint/2010/main" val="1890869426"/>
       </p:ext>
     </p:extLst>
   </p:cSld>
@@ -1190,16 +1210,6 @@
           <a:bodyPr/>
           <a:lstStyle/>
           <a:p>
-            <a:r>
-              <a:rPr lang="en-US" dirty="0"/>
-              <a:t>Answer to Q:</a:t>
-            </a:r>
-          </a:p>
-          <a:p>
-            <a:r>
-              <a:rPr lang="en-US" sz="1200" dirty="0"/>
-              <a:t>Is there any way to predict spending and visits for Visit Scotland?</a:t>
-            </a:r>
             <a:endParaRPr lang="en-US" dirty="0"/>
           </a:p>
         </p:txBody>
@@ -18595,45 +18605,73 @@
       </p:grpSpPr>
       <p:sp>
         <p:nvSpPr>
-          <p:cNvPr id="2" name="Title 1">
+          <p:cNvPr id="11" name="Rectangle 10">
             <a:extLst>
               <a:ext uri="{FF2B5EF4-FFF2-40B4-BE49-F238E27FC236}">
-                <a16:creationId xmlns:a16="http://schemas.microsoft.com/office/drawing/2014/main" id="{45A24646-3429-8847-A682-94E49DC8BB92}"/>
+                <a16:creationId xmlns:a16="http://schemas.microsoft.com/office/drawing/2014/main" id="{1B9CC3E5-EA42-4393-A2C0-5192B91BD745}"/>
+              </a:ext>
+              <a:ext uri="{C183D7F6-B498-43B3-948B-1728B52AA6E4}">
+                <adec:decorative xmlns:adec="http://schemas.microsoft.com/office/drawing/2017/decorative" val="1"/>
               </a:ext>
             </a:extLst>
           </p:cNvPr>
           <p:cNvSpPr>
-            <a:spLocks noGrp="1"/>
+            <a:spLocks noGrp="1" noRot="1" noChangeAspect="1" noMove="1" noResize="1" noEditPoints="1" noAdjustHandles="1" noChangeArrowheads="1" noChangeShapeType="1" noTextEdit="1"/>
           </p:cNvSpPr>
           <p:nvPr>
-            <p:ph type="ctrTitle"/>
+            <p:extLst>
+              <p:ext uri="{386F3935-93C4-4BCD-93E2-E3B085C9AB24}">
+                <p16:designElem xmlns:p16="http://schemas.microsoft.com/office/powerpoint/2015/main" val="1"/>
+              </p:ext>
+            </p:extLst>
           </p:nvPr>
         </p:nvSpPr>
         <p:spPr>
           <a:xfrm>
-            <a:off x="649975" y="4517136"/>
-            <a:ext cx="9453911" cy="1174947"/>
+            <a:off x="0" y="0"/>
+            <a:ext cx="12192000" cy="6858000"/>
           </a:xfrm>
+          <a:prstGeom prst="rect">
+            <a:avLst/>
+          </a:prstGeom>
+          <a:solidFill>
+            <a:schemeClr val="bg1"/>
+          </a:solidFill>
+          <a:ln>
+            <a:noFill/>
+          </a:ln>
         </p:spPr>
+        <p:style>
+          <a:lnRef idx="2">
+            <a:schemeClr val="accent1">
+              <a:shade val="50000"/>
+            </a:schemeClr>
+          </a:lnRef>
+          <a:fillRef idx="1">
+            <a:schemeClr val="accent1"/>
+          </a:fillRef>
+          <a:effectRef idx="0">
+            <a:schemeClr val="accent1"/>
+          </a:effectRef>
+          <a:fontRef idx="minor">
+            <a:schemeClr val="lt1"/>
+          </a:fontRef>
+        </p:style>
         <p:txBody>
-          <a:bodyPr>
-            <a:normAutofit/>
-          </a:bodyPr>
+          <a:bodyPr rtlCol="0" anchor="ctr"/>
           <a:lstStyle/>
           <a:p>
-            <a:r>
-              <a:rPr lang="en-US" sz="6000"/>
-              <a:t>Across time</a:t>
-            </a:r>
+            <a:pPr algn="ctr"/>
+            <a:endParaRPr lang="en-US"/>
           </a:p>
         </p:txBody>
       </p:sp>
       <p:pic>
         <p:nvPicPr>
-          <p:cNvPr id="4" name="Picture 3">
+          <p:cNvPr id="6" name="Picture 5">
             <a:extLst>
               <a:ext uri="{FF2B5EF4-FFF2-40B4-BE49-F238E27FC236}">
-                <a16:creationId xmlns:a16="http://schemas.microsoft.com/office/drawing/2014/main" id="{BFFB4731-3F54-704B-8CBE-F127B93C7D55}"/>
+                <a16:creationId xmlns:a16="http://schemas.microsoft.com/office/drawing/2014/main" id="{CEDD238D-79DC-C044-A47B-2F16C17B7E3B}"/>
               </a:ext>
             </a:extLst>
           </p:cNvPr>
@@ -18650,23 +18688,76 @@
         </p:blipFill>
         <p:spPr>
           <a:xfrm>
-            <a:off x="734845" y="1063144"/>
-            <a:ext cx="4602657" cy="2842140"/>
+            <a:off x="561110" y="511836"/>
+            <a:ext cx="5448111" cy="3364208"/>
           </a:xfrm>
           <a:prstGeom prst="roundRect">
             <a:avLst>
-              <a:gd name="adj" fmla="val 1858"/>
+              <a:gd name="adj" fmla="val 0"/>
             </a:avLst>
           </a:prstGeom>
           <a:effectLst/>
         </p:spPr>
       </p:pic>
+      <p:sp>
+        <p:nvSpPr>
+          <p:cNvPr id="13" name="Rectangle 12">
+            <a:extLst>
+              <a:ext uri="{FF2B5EF4-FFF2-40B4-BE49-F238E27FC236}">
+                <a16:creationId xmlns:a16="http://schemas.microsoft.com/office/drawing/2014/main" id="{FB8DBC8E-FBA7-466C-8D97-75B15FBE9048}"/>
+              </a:ext>
+              <a:ext uri="{C183D7F6-B498-43B3-948B-1728B52AA6E4}">
+                <adec:decorative xmlns:adec="http://schemas.microsoft.com/office/drawing/2017/decorative" val="1"/>
+              </a:ext>
+            </a:extLst>
+          </p:cNvPr>
+          <p:cNvSpPr>
+            <a:spLocks noGrp="1" noRot="1" noChangeAspect="1" noMove="1" noResize="1" noEditPoints="1" noAdjustHandles="1" noChangeArrowheads="1" noChangeShapeType="1" noTextEdit="1"/>
+          </p:cNvSpPr>
+          <p:nvPr>
+            <p:extLst>
+              <p:ext uri="{386F3935-93C4-4BCD-93E2-E3B085C9AB24}">
+                <p16:designElem xmlns:p16="http://schemas.microsoft.com/office/powerpoint/2015/main" val="1"/>
+              </p:ext>
+            </p:extLst>
+          </p:nvPr>
+        </p:nvSpPr>
+        <p:spPr>
+          <a:xfrm>
+            <a:off x="10437812" y="0"/>
+            <a:ext cx="685800" cy="1143000"/>
+          </a:xfrm>
+          <a:prstGeom prst="rect">
+            <a:avLst/>
+          </a:prstGeom>
+          <a:solidFill>
+            <a:schemeClr val="accent1"/>
+          </a:solidFill>
+          <a:ln>
+            <a:noFill/>
+          </a:ln>
+        </p:spPr>
+        <p:style>
+          <a:lnRef idx="1">
+            <a:schemeClr val="accent1"/>
+          </a:lnRef>
+          <a:fillRef idx="3">
+            <a:schemeClr val="accent1"/>
+          </a:fillRef>
+          <a:effectRef idx="2">
+            <a:schemeClr val="accent1"/>
+          </a:effectRef>
+          <a:fontRef idx="minor">
+            <a:schemeClr val="lt1"/>
+          </a:fontRef>
+        </p:style>
+      </p:sp>
       <p:pic>
         <p:nvPicPr>
-          <p:cNvPr id="5" name="Picture 4">
+          <p:cNvPr id="3" name="Picture 2">
             <a:extLst>
               <a:ext uri="{FF2B5EF4-FFF2-40B4-BE49-F238E27FC236}">
-                <a16:creationId xmlns:a16="http://schemas.microsoft.com/office/drawing/2014/main" id="{0E9EBC2E-FF63-9449-8CF3-979E3FD765FC}"/>
+                <a16:creationId xmlns:a16="http://schemas.microsoft.com/office/drawing/2014/main" id="{F6815E55-794F-1241-9DE2-35523B79F8CE}"/>
               </a:ext>
             </a:extLst>
           </p:cNvPr>
@@ -18683,47 +18774,638 @@
         </p:blipFill>
         <p:spPr>
           <a:xfrm>
-            <a:off x="5501228" y="1063144"/>
-            <a:ext cx="4602658" cy="2842141"/>
+            <a:off x="6172946" y="535121"/>
+            <a:ext cx="5370123" cy="3316051"/>
           </a:xfrm>
           <a:prstGeom prst="roundRect">
             <a:avLst>
-              <a:gd name="adj" fmla="val 1858"/>
+              <a:gd name="adj" fmla="val 0"/>
             </a:avLst>
           </a:prstGeom>
           <a:effectLst/>
         </p:spPr>
       </p:pic>
-    </p:spTree>
-    <p:extLst>
-      <p:ext uri="{BB962C8B-B14F-4D97-AF65-F5344CB8AC3E}">
-        <p14:creationId xmlns:p14="http://schemas.microsoft.com/office/powerpoint/2010/main" val="2487231236"/>
-      </p:ext>
-    </p:extLst>
-  </p:cSld>
-  <p:clrMapOvr>
-    <a:masterClrMapping/>
-  </p:clrMapOvr>
-</p:sld>
-</file>
-
-<file path=ppt/slides/slide15.xml><?xml version="1.0" encoding="utf-8"?>
-<p:sld xmlns:a="http://schemas.openxmlformats.org/drawingml/2006/main" xmlns:r="http://schemas.openxmlformats.org/officeDocument/2006/relationships" xmlns:p="http://schemas.openxmlformats.org/presentationml/2006/main">
-  <p:cSld>
-    <p:spTree>
-      <p:nvGrpSpPr>
-        <p:cNvPr id="1" name=""/>
-        <p:cNvGrpSpPr/>
-        <p:nvPr/>
-      </p:nvGrpSpPr>
-      <p:grpSpPr>
-        <a:xfrm>
-          <a:off x="0" y="0"/>
-          <a:ext cx="0" cy="0"/>
-          <a:chOff x="0" y="0"/>
-          <a:chExt cx="0" cy="0"/>
-        </a:xfrm>
-      </p:grpSpPr>
+      <p:sp>
+        <p:nvSpPr>
+          <p:cNvPr id="15" name="Freeform: Shape 14">
+            <a:extLst>
+              <a:ext uri="{FF2B5EF4-FFF2-40B4-BE49-F238E27FC236}">
+                <a16:creationId xmlns:a16="http://schemas.microsoft.com/office/drawing/2014/main" id="{E6FFF64E-1FE4-4AE0-9D62-567AA183C128}"/>
+              </a:ext>
+              <a:ext uri="{C183D7F6-B498-43B3-948B-1728B52AA6E4}">
+                <adec:decorative xmlns:adec="http://schemas.microsoft.com/office/drawing/2017/decorative" val="1"/>
+              </a:ext>
+            </a:extLst>
+          </p:cNvPr>
+          <p:cNvSpPr>
+            <a:spLocks noGrp="1" noRot="1" noChangeAspect="1" noMove="1" noResize="1" noEditPoints="1" noAdjustHandles="1" noChangeArrowheads="1" noChangeShapeType="1" noTextEdit="1"/>
+          </p:cNvSpPr>
+          <p:nvPr>
+            <p:extLst>
+              <p:ext uri="{386F3935-93C4-4BCD-93E2-E3B085C9AB24}">
+                <p16:designElem xmlns:p16="http://schemas.microsoft.com/office/powerpoint/2015/main" val="1"/>
+              </p:ext>
+            </p:extLst>
+          </p:nvPr>
+        </p:nvSpPr>
+        <p:spPr>
+          <a:xfrm>
+            <a:off x="457200" y="4133850"/>
+            <a:ext cx="11277600" cy="2250018"/>
+          </a:xfrm>
+          <a:custGeom>
+            <a:avLst/>
+            <a:gdLst>
+              <a:gd name="connsiteX0" fmla="*/ 5264150 w 11277600"/>
+              <a:gd name="connsiteY0" fmla="*/ 0 h 2250018"/>
+              <a:gd name="connsiteX1" fmla="*/ 5499100 w 11277600"/>
+              <a:gd name="connsiteY1" fmla="*/ 1588 h 2250018"/>
+              <a:gd name="connsiteX2" fmla="*/ 5730875 w 11277600"/>
+              <a:gd name="connsiteY2" fmla="*/ 1588 h 2250018"/>
+              <a:gd name="connsiteX3" fmla="*/ 5961063 w 11277600"/>
+              <a:gd name="connsiteY3" fmla="*/ 4763 h 2250018"/>
+              <a:gd name="connsiteX4" fmla="*/ 6186488 w 11277600"/>
+              <a:gd name="connsiteY4" fmla="*/ 9525 h 2250018"/>
+              <a:gd name="connsiteX5" fmla="*/ 6410325 w 11277600"/>
+              <a:gd name="connsiteY5" fmla="*/ 14288 h 2250018"/>
+              <a:gd name="connsiteX6" fmla="*/ 6629400 w 11277600"/>
+              <a:gd name="connsiteY6" fmla="*/ 19050 h 2250018"/>
+              <a:gd name="connsiteX7" fmla="*/ 6846888 w 11277600"/>
+              <a:gd name="connsiteY7" fmla="*/ 26988 h 2250018"/>
+              <a:gd name="connsiteX8" fmla="*/ 7061200 w 11277600"/>
+              <a:gd name="connsiteY8" fmla="*/ 34925 h 2250018"/>
+              <a:gd name="connsiteX9" fmla="*/ 7270750 w 11277600"/>
+              <a:gd name="connsiteY9" fmla="*/ 42863 h 2250018"/>
+              <a:gd name="connsiteX10" fmla="*/ 7680325 w 11277600"/>
+              <a:gd name="connsiteY10" fmla="*/ 63500 h 2250018"/>
+              <a:gd name="connsiteX11" fmla="*/ 8072438 w 11277600"/>
+              <a:gd name="connsiteY11" fmla="*/ 85725 h 2250018"/>
+              <a:gd name="connsiteX12" fmla="*/ 8448675 w 11277600"/>
+              <a:gd name="connsiteY12" fmla="*/ 109538 h 2250018"/>
+              <a:gd name="connsiteX13" fmla="*/ 8805862 w 11277600"/>
+              <a:gd name="connsiteY13" fmla="*/ 134938 h 2250018"/>
+              <a:gd name="connsiteX14" fmla="*/ 9145588 w 11277600"/>
+              <a:gd name="connsiteY14" fmla="*/ 161925 h 2250018"/>
+              <a:gd name="connsiteX15" fmla="*/ 9461500 w 11277600"/>
+              <a:gd name="connsiteY15" fmla="*/ 190500 h 2250018"/>
+              <a:gd name="connsiteX16" fmla="*/ 9758362 w 11277600"/>
+              <a:gd name="connsiteY16" fmla="*/ 219075 h 2250018"/>
+              <a:gd name="connsiteX17" fmla="*/ 10031412 w 11277600"/>
+              <a:gd name="connsiteY17" fmla="*/ 247650 h 2250018"/>
+              <a:gd name="connsiteX18" fmla="*/ 10282238 w 11277600"/>
+              <a:gd name="connsiteY18" fmla="*/ 274638 h 2250018"/>
+              <a:gd name="connsiteX19" fmla="*/ 10504488 w 11277600"/>
+              <a:gd name="connsiteY19" fmla="*/ 300038 h 2250018"/>
+              <a:gd name="connsiteX20" fmla="*/ 10704512 w 11277600"/>
+              <a:gd name="connsiteY20" fmla="*/ 323850 h 2250018"/>
+              <a:gd name="connsiteX21" fmla="*/ 10874375 w 11277600"/>
+              <a:gd name="connsiteY21" fmla="*/ 344488 h 2250018"/>
+              <a:gd name="connsiteX22" fmla="*/ 11015662 w 11277600"/>
+              <a:gd name="connsiteY22" fmla="*/ 363538 h 2250018"/>
+              <a:gd name="connsiteX23" fmla="*/ 11210925 w 11277600"/>
+              <a:gd name="connsiteY23" fmla="*/ 390525 h 2250018"/>
+              <a:gd name="connsiteX24" fmla="*/ 11277600 w 11277600"/>
+              <a:gd name="connsiteY24" fmla="*/ 400050 h 2250018"/>
+              <a:gd name="connsiteX25" fmla="*/ 11277600 w 11277600"/>
+              <a:gd name="connsiteY25" fmla="*/ 2250018 h 2250018"/>
+              <a:gd name="connsiteX26" fmla="*/ 0 w 11277600"/>
+              <a:gd name="connsiteY26" fmla="*/ 2250018 h 2250018"/>
+              <a:gd name="connsiteX27" fmla="*/ 0 w 11277600"/>
+              <a:gd name="connsiteY27" fmla="*/ 398463 h 2250018"/>
+              <a:gd name="connsiteX28" fmla="*/ 255588 w 11277600"/>
+              <a:gd name="connsiteY28" fmla="*/ 358775 h 2250018"/>
+              <a:gd name="connsiteX29" fmla="*/ 511175 w 11277600"/>
+              <a:gd name="connsiteY29" fmla="*/ 320675 h 2250018"/>
+              <a:gd name="connsiteX30" fmla="*/ 766762 w 11277600"/>
+              <a:gd name="connsiteY30" fmla="*/ 284163 h 2250018"/>
+              <a:gd name="connsiteX31" fmla="*/ 1023938 w 11277600"/>
+              <a:gd name="connsiteY31" fmla="*/ 252413 h 2250018"/>
+              <a:gd name="connsiteX32" fmla="*/ 1279525 w 11277600"/>
+              <a:gd name="connsiteY32" fmla="*/ 220663 h 2250018"/>
+              <a:gd name="connsiteX33" fmla="*/ 1536700 w 11277600"/>
+              <a:gd name="connsiteY33" fmla="*/ 190500 h 2250018"/>
+              <a:gd name="connsiteX34" fmla="*/ 1790700 w 11277600"/>
+              <a:gd name="connsiteY34" fmla="*/ 165100 h 2250018"/>
+              <a:gd name="connsiteX35" fmla="*/ 2047875 w 11277600"/>
+              <a:gd name="connsiteY35" fmla="*/ 141288 h 2250018"/>
+              <a:gd name="connsiteX36" fmla="*/ 2303462 w 11277600"/>
+              <a:gd name="connsiteY36" fmla="*/ 119063 h 2250018"/>
+              <a:gd name="connsiteX37" fmla="*/ 2555875 w 11277600"/>
+              <a:gd name="connsiteY37" fmla="*/ 100013 h 2250018"/>
+              <a:gd name="connsiteX38" fmla="*/ 2809875 w 11277600"/>
+              <a:gd name="connsiteY38" fmla="*/ 80963 h 2250018"/>
+              <a:gd name="connsiteX39" fmla="*/ 3062288 w 11277600"/>
+              <a:gd name="connsiteY39" fmla="*/ 65088 h 2250018"/>
+              <a:gd name="connsiteX40" fmla="*/ 3313113 w 11277600"/>
+              <a:gd name="connsiteY40" fmla="*/ 52388 h 2250018"/>
+              <a:gd name="connsiteX41" fmla="*/ 3563938 w 11277600"/>
+              <a:gd name="connsiteY41" fmla="*/ 39688 h 2250018"/>
+              <a:gd name="connsiteX42" fmla="*/ 3811588 w 11277600"/>
+              <a:gd name="connsiteY42" fmla="*/ 28575 h 2250018"/>
+              <a:gd name="connsiteX43" fmla="*/ 4057650 w 11277600"/>
+              <a:gd name="connsiteY43" fmla="*/ 20638 h 2250018"/>
+              <a:gd name="connsiteX44" fmla="*/ 4303713 w 11277600"/>
+              <a:gd name="connsiteY44" fmla="*/ 14288 h 2250018"/>
+              <a:gd name="connsiteX45" fmla="*/ 4546600 w 11277600"/>
+              <a:gd name="connsiteY45" fmla="*/ 7938 h 2250018"/>
+              <a:gd name="connsiteX46" fmla="*/ 4787900 w 11277600"/>
+              <a:gd name="connsiteY46" fmla="*/ 4763 h 2250018"/>
+              <a:gd name="connsiteX47" fmla="*/ 5027613 w 11277600"/>
+              <a:gd name="connsiteY47" fmla="*/ 1588 h 2250018"/>
+            </a:gdLst>
+            <a:ahLst/>
+            <a:cxnLst>
+              <a:cxn ang="0">
+                <a:pos x="connsiteX0" y="connsiteY0"/>
+              </a:cxn>
+              <a:cxn ang="0">
+                <a:pos x="connsiteX1" y="connsiteY1"/>
+              </a:cxn>
+              <a:cxn ang="0">
+                <a:pos x="connsiteX2" y="connsiteY2"/>
+              </a:cxn>
+              <a:cxn ang="0">
+                <a:pos x="connsiteX3" y="connsiteY3"/>
+              </a:cxn>
+              <a:cxn ang="0">
+                <a:pos x="connsiteX4" y="connsiteY4"/>
+              </a:cxn>
+              <a:cxn ang="0">
+                <a:pos x="connsiteX5" y="connsiteY5"/>
+              </a:cxn>
+              <a:cxn ang="0">
+                <a:pos x="connsiteX6" y="connsiteY6"/>
+              </a:cxn>
+              <a:cxn ang="0">
+                <a:pos x="connsiteX7" y="connsiteY7"/>
+              </a:cxn>
+              <a:cxn ang="0">
+                <a:pos x="connsiteX8" y="connsiteY8"/>
+              </a:cxn>
+              <a:cxn ang="0">
+                <a:pos x="connsiteX9" y="connsiteY9"/>
+              </a:cxn>
+              <a:cxn ang="0">
+                <a:pos x="connsiteX10" y="connsiteY10"/>
+              </a:cxn>
+              <a:cxn ang="0">
+                <a:pos x="connsiteX11" y="connsiteY11"/>
+              </a:cxn>
+              <a:cxn ang="0">
+                <a:pos x="connsiteX12" y="connsiteY12"/>
+              </a:cxn>
+              <a:cxn ang="0">
+                <a:pos x="connsiteX13" y="connsiteY13"/>
+              </a:cxn>
+              <a:cxn ang="0">
+                <a:pos x="connsiteX14" y="connsiteY14"/>
+              </a:cxn>
+              <a:cxn ang="0">
+                <a:pos x="connsiteX15" y="connsiteY15"/>
+              </a:cxn>
+              <a:cxn ang="0">
+                <a:pos x="connsiteX16" y="connsiteY16"/>
+              </a:cxn>
+              <a:cxn ang="0">
+                <a:pos x="connsiteX17" y="connsiteY17"/>
+              </a:cxn>
+              <a:cxn ang="0">
+                <a:pos x="connsiteX18" y="connsiteY18"/>
+              </a:cxn>
+              <a:cxn ang="0">
+                <a:pos x="connsiteX19" y="connsiteY19"/>
+              </a:cxn>
+              <a:cxn ang="0">
+                <a:pos x="connsiteX20" y="connsiteY20"/>
+              </a:cxn>
+              <a:cxn ang="0">
+                <a:pos x="connsiteX21" y="connsiteY21"/>
+              </a:cxn>
+              <a:cxn ang="0">
+                <a:pos x="connsiteX22" y="connsiteY22"/>
+              </a:cxn>
+              <a:cxn ang="0">
+                <a:pos x="connsiteX23" y="connsiteY23"/>
+              </a:cxn>
+              <a:cxn ang="0">
+                <a:pos x="connsiteX24" y="connsiteY24"/>
+              </a:cxn>
+              <a:cxn ang="0">
+                <a:pos x="connsiteX25" y="connsiteY25"/>
+              </a:cxn>
+              <a:cxn ang="0">
+                <a:pos x="connsiteX26" y="connsiteY26"/>
+              </a:cxn>
+              <a:cxn ang="0">
+                <a:pos x="connsiteX27" y="connsiteY27"/>
+              </a:cxn>
+              <a:cxn ang="0">
+                <a:pos x="connsiteX28" y="connsiteY28"/>
+              </a:cxn>
+              <a:cxn ang="0">
+                <a:pos x="connsiteX29" y="connsiteY29"/>
+              </a:cxn>
+              <a:cxn ang="0">
+                <a:pos x="connsiteX30" y="connsiteY30"/>
+              </a:cxn>
+              <a:cxn ang="0">
+                <a:pos x="connsiteX31" y="connsiteY31"/>
+              </a:cxn>
+              <a:cxn ang="0">
+                <a:pos x="connsiteX32" y="connsiteY32"/>
+              </a:cxn>
+              <a:cxn ang="0">
+                <a:pos x="connsiteX33" y="connsiteY33"/>
+              </a:cxn>
+              <a:cxn ang="0">
+                <a:pos x="connsiteX34" y="connsiteY34"/>
+              </a:cxn>
+              <a:cxn ang="0">
+                <a:pos x="connsiteX35" y="connsiteY35"/>
+              </a:cxn>
+              <a:cxn ang="0">
+                <a:pos x="connsiteX36" y="connsiteY36"/>
+              </a:cxn>
+              <a:cxn ang="0">
+                <a:pos x="connsiteX37" y="connsiteY37"/>
+              </a:cxn>
+              <a:cxn ang="0">
+                <a:pos x="connsiteX38" y="connsiteY38"/>
+              </a:cxn>
+              <a:cxn ang="0">
+                <a:pos x="connsiteX39" y="connsiteY39"/>
+              </a:cxn>
+              <a:cxn ang="0">
+                <a:pos x="connsiteX40" y="connsiteY40"/>
+              </a:cxn>
+              <a:cxn ang="0">
+                <a:pos x="connsiteX41" y="connsiteY41"/>
+              </a:cxn>
+              <a:cxn ang="0">
+                <a:pos x="connsiteX42" y="connsiteY42"/>
+              </a:cxn>
+              <a:cxn ang="0">
+                <a:pos x="connsiteX43" y="connsiteY43"/>
+              </a:cxn>
+              <a:cxn ang="0">
+                <a:pos x="connsiteX44" y="connsiteY44"/>
+              </a:cxn>
+              <a:cxn ang="0">
+                <a:pos x="connsiteX45" y="connsiteY45"/>
+              </a:cxn>
+              <a:cxn ang="0">
+                <a:pos x="connsiteX46" y="connsiteY46"/>
+              </a:cxn>
+              <a:cxn ang="0">
+                <a:pos x="connsiteX47" y="connsiteY47"/>
+              </a:cxn>
+            </a:cxnLst>
+            <a:rect l="l" t="t" r="r" b="b"/>
+            <a:pathLst>
+              <a:path w="11277600" h="2250018">
+                <a:moveTo>
+                  <a:pt x="5264150" y="0"/>
+                </a:moveTo>
+                <a:lnTo>
+                  <a:pt x="5499100" y="1588"/>
+                </a:lnTo>
+                <a:lnTo>
+                  <a:pt x="5730875" y="1588"/>
+                </a:lnTo>
+                <a:lnTo>
+                  <a:pt x="5961063" y="4763"/>
+                </a:lnTo>
+                <a:lnTo>
+                  <a:pt x="6186488" y="9525"/>
+                </a:lnTo>
+                <a:lnTo>
+                  <a:pt x="6410325" y="14288"/>
+                </a:lnTo>
+                <a:lnTo>
+                  <a:pt x="6629400" y="19050"/>
+                </a:lnTo>
+                <a:lnTo>
+                  <a:pt x="6846888" y="26988"/>
+                </a:lnTo>
+                <a:lnTo>
+                  <a:pt x="7061200" y="34925"/>
+                </a:lnTo>
+                <a:lnTo>
+                  <a:pt x="7270750" y="42863"/>
+                </a:lnTo>
+                <a:lnTo>
+                  <a:pt x="7680325" y="63500"/>
+                </a:lnTo>
+                <a:lnTo>
+                  <a:pt x="8072438" y="85725"/>
+                </a:lnTo>
+                <a:lnTo>
+                  <a:pt x="8448675" y="109538"/>
+                </a:lnTo>
+                <a:lnTo>
+                  <a:pt x="8805862" y="134938"/>
+                </a:lnTo>
+                <a:lnTo>
+                  <a:pt x="9145588" y="161925"/>
+                </a:lnTo>
+                <a:lnTo>
+                  <a:pt x="9461500" y="190500"/>
+                </a:lnTo>
+                <a:lnTo>
+                  <a:pt x="9758362" y="219075"/>
+                </a:lnTo>
+                <a:lnTo>
+                  <a:pt x="10031412" y="247650"/>
+                </a:lnTo>
+                <a:lnTo>
+                  <a:pt x="10282238" y="274638"/>
+                </a:lnTo>
+                <a:lnTo>
+                  <a:pt x="10504488" y="300038"/>
+                </a:lnTo>
+                <a:lnTo>
+                  <a:pt x="10704512" y="323850"/>
+                </a:lnTo>
+                <a:lnTo>
+                  <a:pt x="10874375" y="344488"/>
+                </a:lnTo>
+                <a:lnTo>
+                  <a:pt x="11015662" y="363538"/>
+                </a:lnTo>
+                <a:lnTo>
+                  <a:pt x="11210925" y="390525"/>
+                </a:lnTo>
+                <a:lnTo>
+                  <a:pt x="11277600" y="400050"/>
+                </a:lnTo>
+                <a:lnTo>
+                  <a:pt x="11277600" y="2250018"/>
+                </a:lnTo>
+                <a:lnTo>
+                  <a:pt x="0" y="2250018"/>
+                </a:lnTo>
+                <a:lnTo>
+                  <a:pt x="0" y="398463"/>
+                </a:lnTo>
+                <a:lnTo>
+                  <a:pt x="255588" y="358775"/>
+                </a:lnTo>
+                <a:lnTo>
+                  <a:pt x="511175" y="320675"/>
+                </a:lnTo>
+                <a:lnTo>
+                  <a:pt x="766762" y="284163"/>
+                </a:lnTo>
+                <a:lnTo>
+                  <a:pt x="1023938" y="252413"/>
+                </a:lnTo>
+                <a:lnTo>
+                  <a:pt x="1279525" y="220663"/>
+                </a:lnTo>
+                <a:lnTo>
+                  <a:pt x="1536700" y="190500"/>
+                </a:lnTo>
+                <a:lnTo>
+                  <a:pt x="1790700" y="165100"/>
+                </a:lnTo>
+                <a:lnTo>
+                  <a:pt x="2047875" y="141288"/>
+                </a:lnTo>
+                <a:lnTo>
+                  <a:pt x="2303462" y="119063"/>
+                </a:lnTo>
+                <a:lnTo>
+                  <a:pt x="2555875" y="100013"/>
+                </a:lnTo>
+                <a:lnTo>
+                  <a:pt x="2809875" y="80963"/>
+                </a:lnTo>
+                <a:lnTo>
+                  <a:pt x="3062288" y="65088"/>
+                </a:lnTo>
+                <a:lnTo>
+                  <a:pt x="3313113" y="52388"/>
+                </a:lnTo>
+                <a:lnTo>
+                  <a:pt x="3563938" y="39688"/>
+                </a:lnTo>
+                <a:lnTo>
+                  <a:pt x="3811588" y="28575"/>
+                </a:lnTo>
+                <a:lnTo>
+                  <a:pt x="4057650" y="20638"/>
+                </a:lnTo>
+                <a:lnTo>
+                  <a:pt x="4303713" y="14288"/>
+                </a:lnTo>
+                <a:lnTo>
+                  <a:pt x="4546600" y="7938"/>
+                </a:lnTo>
+                <a:lnTo>
+                  <a:pt x="4787900" y="4763"/>
+                </a:lnTo>
+                <a:lnTo>
+                  <a:pt x="5027613" y="1588"/>
+                </a:lnTo>
+                <a:close/>
+              </a:path>
+            </a:pathLst>
+          </a:custGeom>
+          <a:ln>
+            <a:noFill/>
+          </a:ln>
+        </p:spPr>
+        <p:style>
+          <a:lnRef idx="2">
+            <a:schemeClr val="accent1">
+              <a:shade val="50000"/>
+            </a:schemeClr>
+          </a:lnRef>
+          <a:fillRef idx="1003">
+            <a:schemeClr val="dk2"/>
+          </a:fillRef>
+          <a:effectRef idx="0">
+            <a:schemeClr val="accent1"/>
+          </a:effectRef>
+          <a:fontRef idx="minor">
+            <a:schemeClr val="lt1"/>
+          </a:fontRef>
+        </p:style>
+        <p:txBody>
+          <a:bodyPr wrap="square" rtlCol="0" anchor="ctr">
+            <a:noAutofit/>
+          </a:bodyPr>
+          <a:lstStyle/>
+          <a:p>
+            <a:pPr algn="ctr"/>
+            <a:endParaRPr lang="en-US"/>
+          </a:p>
+        </p:txBody>
+      </p:sp>
+      <p:sp>
+        <p:nvSpPr>
+          <p:cNvPr id="17" name="Freeform 5">
+            <a:extLst>
+              <a:ext uri="{FF2B5EF4-FFF2-40B4-BE49-F238E27FC236}">
+                <a16:creationId xmlns:a16="http://schemas.microsoft.com/office/drawing/2014/main" id="{9C80E52D-DE5C-4267-9C99-8741F2E42E36}"/>
+              </a:ext>
+              <a:ext uri="{C183D7F6-B498-43B3-948B-1728B52AA6E4}">
+                <adec:decorative xmlns:adec="http://schemas.microsoft.com/office/drawing/2017/decorative" val="1"/>
+              </a:ext>
+            </a:extLst>
+          </p:cNvPr>
+          <p:cNvSpPr>
+            <a:spLocks noGrp="1" noRot="1" noChangeAspect="1" noMove="1" noResize="1" noEditPoints="1" noAdjustHandles="1" noChangeArrowheads="1" noChangeShapeType="1" noTextEdit="1"/>
+          </p:cNvSpPr>
+          <p:nvPr>
+            <p:extLst>
+              <p:ext uri="{386F3935-93C4-4BCD-93E2-E3B085C9AB24}">
+                <p16:designElem xmlns:p16="http://schemas.microsoft.com/office/powerpoint/2015/main" val="1"/>
+              </p:ext>
+            </p:extLst>
+          </p:nvPr>
+        </p:nvSpPr>
+        <p:spPr bwMode="gray">
+          <a:xfrm rot="10371525">
+            <a:off x="263767" y="4117124"/>
+            <a:ext cx="3299407" cy="440924"/>
+          </a:xfrm>
+          <a:custGeom>
+            <a:avLst/>
+            <a:gdLst/>
+            <a:ahLst/>
+            <a:cxnLst/>
+            <a:rect l="l" t="t" r="r" b="b"/>
+            <a:pathLst>
+              <a:path w="10000" h="5291">
+                <a:moveTo>
+                  <a:pt x="85" y="2532"/>
+                </a:moveTo>
+                <a:cubicBezTo>
+                  <a:pt x="1736" y="3911"/>
+                  <a:pt x="7524" y="5298"/>
+                  <a:pt x="9958" y="5291"/>
+                </a:cubicBezTo>
+                <a:cubicBezTo>
+                  <a:pt x="9989" y="1958"/>
+                  <a:pt x="9969" y="3333"/>
+                  <a:pt x="10000" y="0"/>
+                </a:cubicBezTo>
+                <a:lnTo>
+                  <a:pt x="10000" y="0"/>
+                </a:lnTo>
+                <a:lnTo>
+                  <a:pt x="9667" y="204"/>
+                </a:lnTo>
+                <a:lnTo>
+                  <a:pt x="9334" y="400"/>
+                </a:lnTo>
+                <a:lnTo>
+                  <a:pt x="9001" y="590"/>
+                </a:lnTo>
+                <a:lnTo>
+                  <a:pt x="8667" y="753"/>
+                </a:lnTo>
+                <a:lnTo>
+                  <a:pt x="8333" y="917"/>
+                </a:lnTo>
+                <a:lnTo>
+                  <a:pt x="7999" y="1071"/>
+                </a:lnTo>
+                <a:lnTo>
+                  <a:pt x="7669" y="1202"/>
+                </a:lnTo>
+                <a:lnTo>
+                  <a:pt x="7333" y="1325"/>
+                </a:lnTo>
+                <a:lnTo>
+                  <a:pt x="7000" y="1440"/>
+                </a:lnTo>
+                <a:lnTo>
+                  <a:pt x="6673" y="1538"/>
+                </a:lnTo>
+                <a:lnTo>
+                  <a:pt x="6340" y="1636"/>
+                </a:lnTo>
+                <a:lnTo>
+                  <a:pt x="6013" y="1719"/>
+                </a:lnTo>
+                <a:lnTo>
+                  <a:pt x="5686" y="1784"/>
+                </a:lnTo>
+                <a:lnTo>
+                  <a:pt x="5359" y="1850"/>
+                </a:lnTo>
+                <a:lnTo>
+                  <a:pt x="5036" y="1906"/>
+                </a:lnTo>
+                <a:lnTo>
+                  <a:pt x="4717" y="1948"/>
+                </a:lnTo>
+                <a:lnTo>
+                  <a:pt x="4396" y="1980"/>
+                </a:lnTo>
+                <a:lnTo>
+                  <a:pt x="4079" y="2013"/>
+                </a:lnTo>
+                <a:lnTo>
+                  <a:pt x="3766" y="2029"/>
+                </a:lnTo>
+                <a:lnTo>
+                  <a:pt x="3454" y="2046"/>
+                </a:lnTo>
+                <a:lnTo>
+                  <a:pt x="3145" y="2053"/>
+                </a:lnTo>
+                <a:lnTo>
+                  <a:pt x="2839" y="2046"/>
+                </a:lnTo>
+                <a:lnTo>
+                  <a:pt x="2537" y="2046"/>
+                </a:lnTo>
+                <a:lnTo>
+                  <a:pt x="2238" y="2029"/>
+                </a:lnTo>
+                <a:lnTo>
+                  <a:pt x="1943" y="2004"/>
+                </a:lnTo>
+                <a:lnTo>
+                  <a:pt x="1653" y="1980"/>
+                </a:lnTo>
+                <a:lnTo>
+                  <a:pt x="1368" y="1955"/>
+                </a:lnTo>
+                <a:lnTo>
+                  <a:pt x="1085" y="1915"/>
+                </a:lnTo>
+                <a:lnTo>
+                  <a:pt x="806" y="1873"/>
+                </a:lnTo>
+                <a:lnTo>
+                  <a:pt x="533" y="1833"/>
+                </a:lnTo>
+                <a:lnTo>
+                  <a:pt x="0" y="1726"/>
+                </a:lnTo>
+                <a:cubicBezTo>
+                  <a:pt x="28" y="1995"/>
+                  <a:pt x="57" y="2263"/>
+                  <a:pt x="85" y="2532"/>
+                </a:cubicBezTo>
+                <a:close/>
+              </a:path>
+            </a:pathLst>
+          </a:custGeom>
+          <a:solidFill>
+            <a:schemeClr val="bg1">
+              <a:alpha val="20000"/>
+            </a:schemeClr>
+          </a:solidFill>
+          <a:ln>
+            <a:noFill/>
+          </a:ln>
+        </p:spPr>
+      </p:sp>
       <p:sp>
         <p:nvSpPr>
           <p:cNvPr id="2" name="Title 1">
@@ -18742,28 +19424,1957 @@
         </p:nvSpPr>
         <p:spPr>
           <a:xfrm>
-            <a:off x="1069847" y="1298448"/>
-            <a:ext cx="8196815" cy="914400"/>
+            <a:off x="649975" y="4517136"/>
+            <a:ext cx="10893095" cy="1174947"/>
           </a:xfrm>
         </p:spPr>
         <p:txBody>
           <a:bodyPr>
-            <a:normAutofit fontScale="90000"/>
+            <a:normAutofit/>
           </a:bodyPr>
           <a:lstStyle/>
           <a:p>
             <a:r>
-              <a:rPr lang="en-US" dirty="0"/>
-              <a:t>Improving visits and spend</a:t>
+              <a:rPr lang="en-US" sz="6000" dirty="0"/>
+              <a:t>Change over time</a:t>
             </a:r>
-            <a:endParaRPr lang="en-US" sz="4400" dirty="0"/>
           </a:p>
         </p:txBody>
       </p:sp>
     </p:spTree>
     <p:extLst>
       <p:ext uri="{BB962C8B-B14F-4D97-AF65-F5344CB8AC3E}">
-        <p14:creationId xmlns:p14="http://schemas.microsoft.com/office/powerpoint/2010/main" val="1647205772"/>
+        <p14:creationId xmlns:p14="http://schemas.microsoft.com/office/powerpoint/2010/main" val="2487231236"/>
+      </p:ext>
+    </p:extLst>
+  </p:cSld>
+  <p:clrMapOvr>
+    <a:masterClrMapping/>
+  </p:clrMapOvr>
+</p:sld>
+</file>
+
+<file path=ppt/slides/slide15.xml><?xml version="1.0" encoding="utf-8"?>
+<p:sld xmlns:a="http://schemas.openxmlformats.org/drawingml/2006/main" xmlns:r="http://schemas.openxmlformats.org/officeDocument/2006/relationships" xmlns:p="http://schemas.openxmlformats.org/presentationml/2006/main">
+  <p:cSld>
+    <p:bg>
+      <p:bgPr>
+        <a:solidFill>
+          <a:schemeClr val="bg1"/>
+        </a:solidFill>
+        <a:effectLst/>
+      </p:bgPr>
+    </p:bg>
+    <p:spTree>
+      <p:nvGrpSpPr>
+        <p:cNvPr id="1" name=""/>
+        <p:cNvGrpSpPr/>
+        <p:nvPr/>
+      </p:nvGrpSpPr>
+      <p:grpSpPr>
+        <a:xfrm>
+          <a:off x="0" y="0"/>
+          <a:ext cx="0" cy="0"/>
+          <a:chOff x="0" y="0"/>
+          <a:chExt cx="0" cy="0"/>
+        </a:xfrm>
+      </p:grpSpPr>
+      <p:grpSp>
+        <p:nvGrpSpPr>
+          <p:cNvPr id="8" name="Group 7">
+            <a:extLst>
+              <a:ext uri="{FF2B5EF4-FFF2-40B4-BE49-F238E27FC236}">
+                <a16:creationId xmlns:a16="http://schemas.microsoft.com/office/drawing/2014/main" id="{7084313B-C03D-4981-9786-879159A60395}"/>
+              </a:ext>
+              <a:ext uri="{C183D7F6-B498-43B3-948B-1728B52AA6E4}">
+                <adec:decorative xmlns:adec="http://schemas.microsoft.com/office/drawing/2017/decorative" val="1"/>
+              </a:ext>
+            </a:extLst>
+          </p:cNvPr>
+          <p:cNvGrpSpPr>
+            <a:grpSpLocks noGrp="1" noUngrp="1" noRot="1" noChangeAspect="1" noMove="1" noResize="1"/>
+          </p:cNvGrpSpPr>
+          <p:nvPr>
+            <p:extLst>
+              <p:ext uri="{386F3935-93C4-4BCD-93E2-E3B085C9AB24}">
+                <p16:designElem xmlns:p16="http://schemas.microsoft.com/office/powerpoint/2015/main" val="1"/>
+              </p:ext>
+            </p:extLst>
+          </p:nvPr>
+        </p:nvGrpSpPr>
+        <p:grpSpPr>
+          <a:xfrm>
+            <a:off x="0" y="0"/>
+            <a:ext cx="12192000" cy="6858000"/>
+            <a:chOff x="0" y="0"/>
+            <a:chExt cx="12192000" cy="6858000"/>
+          </a:xfrm>
+        </p:grpSpPr>
+        <p:sp>
+          <p:nvSpPr>
+            <p:cNvPr id="9" name="Rectangle 8">
+              <a:extLst>
+                <a:ext uri="{FF2B5EF4-FFF2-40B4-BE49-F238E27FC236}">
+                  <a16:creationId xmlns:a16="http://schemas.microsoft.com/office/drawing/2014/main" id="{A99190B9-52DD-45DC-BE21-AACE88FEC7FE}"/>
+                </a:ext>
+                <a:ext uri="{C183D7F6-B498-43B3-948B-1728B52AA6E4}">
+                  <adec:decorative xmlns:adec="http://schemas.microsoft.com/office/drawing/2017/decorative" val="1"/>
+                </a:ext>
+              </a:extLst>
+            </p:cNvPr>
+            <p:cNvSpPr/>
+            <p:nvPr>
+              <p:extLst>
+                <p:ext uri="{386F3935-93C4-4BCD-93E2-E3B085C9AB24}">
+                  <p16:designElem xmlns:p16="http://schemas.microsoft.com/office/powerpoint/2015/main" val="1"/>
+                </p:ext>
+              </p:extLst>
+            </p:nvPr>
+          </p:nvSpPr>
+          <p:spPr>
+            <a:xfrm>
+              <a:off x="0" y="0"/>
+              <a:ext cx="12192000" cy="6858000"/>
+            </a:xfrm>
+            <a:prstGeom prst="rect">
+              <a:avLst/>
+            </a:prstGeom>
+            <a:blipFill>
+              <a:blip r:embed="rId3">
+                <a:duotone>
+                  <a:schemeClr val="dk2">
+                    <a:shade val="69000"/>
+                    <a:hueMod val="91000"/>
+                    <a:satMod val="164000"/>
+                    <a:lumMod val="74000"/>
+                  </a:schemeClr>
+                  <a:schemeClr val="dk2">
+                    <a:hueMod val="124000"/>
+                    <a:satMod val="140000"/>
+                    <a:lumMod val="142000"/>
+                  </a:schemeClr>
+                </a:duotone>
+              </a:blip>
+              <a:stretch>
+                <a:fillRect/>
+              </a:stretch>
+            </a:blipFill>
+            <a:ln>
+              <a:noFill/>
+            </a:ln>
+          </p:spPr>
+          <p:style>
+            <a:lnRef idx="2">
+              <a:schemeClr val="accent1">
+                <a:shade val="50000"/>
+              </a:schemeClr>
+            </a:lnRef>
+            <a:fillRef idx="1">
+              <a:schemeClr val="accent1"/>
+            </a:fillRef>
+            <a:effectRef idx="0">
+              <a:schemeClr val="accent1"/>
+            </a:effectRef>
+            <a:fontRef idx="minor">
+              <a:schemeClr val="lt1"/>
+            </a:fontRef>
+          </p:style>
+        </p:sp>
+        <p:sp>
+          <p:nvSpPr>
+            <p:cNvPr id="10" name="Oval 9">
+              <a:extLst>
+                <a:ext uri="{FF2B5EF4-FFF2-40B4-BE49-F238E27FC236}">
+                  <a16:creationId xmlns:a16="http://schemas.microsoft.com/office/drawing/2014/main" id="{D1EE260A-12FB-4D71-A318-71BED7FF314B}"/>
+                </a:ext>
+                <a:ext uri="{C183D7F6-B498-43B3-948B-1728B52AA6E4}">
+                  <adec:decorative xmlns:adec="http://schemas.microsoft.com/office/drawing/2017/decorative" val="1"/>
+                </a:ext>
+              </a:extLst>
+            </p:cNvPr>
+            <p:cNvSpPr/>
+            <p:nvPr>
+              <p:extLst>
+                <p:ext uri="{386F3935-93C4-4BCD-93E2-E3B085C9AB24}">
+                  <p16:designElem xmlns:p16="http://schemas.microsoft.com/office/powerpoint/2015/main" val="1"/>
+                </p:ext>
+              </p:extLst>
+            </p:nvPr>
+          </p:nvSpPr>
+          <p:spPr>
+            <a:xfrm>
+              <a:off x="0" y="2667000"/>
+              <a:ext cx="4191000" cy="4191000"/>
+            </a:xfrm>
+            <a:prstGeom prst="ellipse">
+              <a:avLst/>
+            </a:prstGeom>
+            <a:gradFill flip="none" rotWithShape="1">
+              <a:gsLst>
+                <a:gs pos="0">
+                  <a:schemeClr val="accent5">
+                    <a:alpha val="11000"/>
+                  </a:schemeClr>
+                </a:gs>
+                <a:gs pos="75000">
+                  <a:schemeClr val="accent5">
+                    <a:alpha val="0"/>
+                  </a:schemeClr>
+                </a:gs>
+                <a:gs pos="36000">
+                  <a:schemeClr val="accent5">
+                    <a:alpha val="10000"/>
+                  </a:schemeClr>
+                </a:gs>
+              </a:gsLst>
+              <a:path path="circle">
+                <a:fillToRect l="50000" t="50000" r="50000" b="50000"/>
+              </a:path>
+              <a:tileRect/>
+            </a:gradFill>
+            <a:ln>
+              <a:noFill/>
+            </a:ln>
+            <a:effectLst/>
+          </p:spPr>
+          <p:style>
+            <a:lnRef idx="1">
+              <a:schemeClr val="accent1"/>
+            </a:lnRef>
+            <a:fillRef idx="3">
+              <a:schemeClr val="accent1"/>
+            </a:fillRef>
+            <a:effectRef idx="2">
+              <a:schemeClr val="accent1"/>
+            </a:effectRef>
+            <a:fontRef idx="minor">
+              <a:schemeClr val="lt1"/>
+            </a:fontRef>
+          </p:style>
+        </p:sp>
+        <p:sp>
+          <p:nvSpPr>
+            <p:cNvPr id="11" name="Oval 10">
+              <a:extLst>
+                <a:ext uri="{FF2B5EF4-FFF2-40B4-BE49-F238E27FC236}">
+                  <a16:creationId xmlns:a16="http://schemas.microsoft.com/office/drawing/2014/main" id="{B52EC39A-8D44-4CEF-820F-A442CFA42DE1}"/>
+                </a:ext>
+                <a:ext uri="{C183D7F6-B498-43B3-948B-1728B52AA6E4}">
+                  <adec:decorative xmlns:adec="http://schemas.microsoft.com/office/drawing/2017/decorative" val="1"/>
+                </a:ext>
+              </a:extLst>
+            </p:cNvPr>
+            <p:cNvSpPr/>
+            <p:nvPr>
+              <p:extLst>
+                <p:ext uri="{386F3935-93C4-4BCD-93E2-E3B085C9AB24}">
+                  <p16:designElem xmlns:p16="http://schemas.microsoft.com/office/powerpoint/2015/main" val="1"/>
+                </p:ext>
+              </p:extLst>
+            </p:nvPr>
+          </p:nvSpPr>
+          <p:spPr>
+            <a:xfrm>
+              <a:off x="0" y="2895600"/>
+              <a:ext cx="2362200" cy="2362200"/>
+            </a:xfrm>
+            <a:prstGeom prst="ellipse">
+              <a:avLst/>
+            </a:prstGeom>
+            <a:gradFill flip="none" rotWithShape="1">
+              <a:gsLst>
+                <a:gs pos="0">
+                  <a:schemeClr val="accent5">
+                    <a:alpha val="8000"/>
+                  </a:schemeClr>
+                </a:gs>
+                <a:gs pos="72000">
+                  <a:schemeClr val="accent5">
+                    <a:alpha val="0"/>
+                  </a:schemeClr>
+                </a:gs>
+                <a:gs pos="36000">
+                  <a:schemeClr val="accent5">
+                    <a:alpha val="8000"/>
+                  </a:schemeClr>
+                </a:gs>
+              </a:gsLst>
+              <a:path path="circle">
+                <a:fillToRect l="50000" t="50000" r="50000" b="50000"/>
+              </a:path>
+              <a:tileRect/>
+            </a:gradFill>
+            <a:ln>
+              <a:noFill/>
+            </a:ln>
+            <a:effectLst/>
+          </p:spPr>
+          <p:style>
+            <a:lnRef idx="1">
+              <a:schemeClr val="accent1"/>
+            </a:lnRef>
+            <a:fillRef idx="3">
+              <a:schemeClr val="accent1"/>
+            </a:fillRef>
+            <a:effectRef idx="2">
+              <a:schemeClr val="accent1"/>
+            </a:effectRef>
+            <a:fontRef idx="minor">
+              <a:schemeClr val="lt1"/>
+            </a:fontRef>
+          </p:style>
+        </p:sp>
+        <p:sp>
+          <p:nvSpPr>
+            <p:cNvPr id="12" name="Oval 11">
+              <a:extLst>
+                <a:ext uri="{FF2B5EF4-FFF2-40B4-BE49-F238E27FC236}">
+                  <a16:creationId xmlns:a16="http://schemas.microsoft.com/office/drawing/2014/main" id="{2D010773-529F-4A3D-A0AB-E7CE12DC6173}"/>
+                </a:ext>
+                <a:ext uri="{C183D7F6-B498-43B3-948B-1728B52AA6E4}">
+                  <adec:decorative xmlns:adec="http://schemas.microsoft.com/office/drawing/2017/decorative" val="1"/>
+                </a:ext>
+              </a:extLst>
+            </p:cNvPr>
+            <p:cNvSpPr/>
+            <p:nvPr>
+              <p:extLst>
+                <p:ext uri="{386F3935-93C4-4BCD-93E2-E3B085C9AB24}">
+                  <p16:designElem xmlns:p16="http://schemas.microsoft.com/office/powerpoint/2015/main" val="1"/>
+                </p:ext>
+              </p:extLst>
+            </p:nvPr>
+          </p:nvSpPr>
+          <p:spPr>
+            <a:xfrm>
+              <a:off x="8609012" y="5867400"/>
+              <a:ext cx="990600" cy="990600"/>
+            </a:xfrm>
+            <a:prstGeom prst="ellipse">
+              <a:avLst/>
+            </a:prstGeom>
+            <a:gradFill flip="none" rotWithShape="1">
+              <a:gsLst>
+                <a:gs pos="0">
+                  <a:schemeClr val="accent5">
+                    <a:alpha val="14000"/>
+                  </a:schemeClr>
+                </a:gs>
+                <a:gs pos="66000">
+                  <a:schemeClr val="accent5">
+                    <a:alpha val="0"/>
+                  </a:schemeClr>
+                </a:gs>
+                <a:gs pos="36000">
+                  <a:schemeClr val="accent5">
+                    <a:alpha val="7000"/>
+                  </a:schemeClr>
+                </a:gs>
+              </a:gsLst>
+              <a:path path="circle">
+                <a:fillToRect l="50000" t="50000" r="50000" b="50000"/>
+              </a:path>
+              <a:tileRect/>
+            </a:gradFill>
+            <a:ln>
+              <a:noFill/>
+            </a:ln>
+            <a:effectLst/>
+          </p:spPr>
+          <p:style>
+            <a:lnRef idx="1">
+              <a:schemeClr val="accent1"/>
+            </a:lnRef>
+            <a:fillRef idx="3">
+              <a:schemeClr val="accent1"/>
+            </a:fillRef>
+            <a:effectRef idx="2">
+              <a:schemeClr val="accent1"/>
+            </a:effectRef>
+            <a:fontRef idx="minor">
+              <a:schemeClr val="lt1"/>
+            </a:fontRef>
+          </p:style>
+        </p:sp>
+        <p:sp>
+          <p:nvSpPr>
+            <p:cNvPr id="13" name="Oval 12">
+              <a:extLst>
+                <a:ext uri="{FF2B5EF4-FFF2-40B4-BE49-F238E27FC236}">
+                  <a16:creationId xmlns:a16="http://schemas.microsoft.com/office/drawing/2014/main" id="{D7582733-2D5B-4103-A63C-0D0D81780468}"/>
+                </a:ext>
+                <a:ext uri="{C183D7F6-B498-43B3-948B-1728B52AA6E4}">
+                  <adec:decorative xmlns:adec="http://schemas.microsoft.com/office/drawing/2017/decorative" val="1"/>
+                </a:ext>
+              </a:extLst>
+            </p:cNvPr>
+            <p:cNvSpPr/>
+            <p:nvPr>
+              <p:extLst>
+                <p:ext uri="{386F3935-93C4-4BCD-93E2-E3B085C9AB24}">
+                  <p16:designElem xmlns:p16="http://schemas.microsoft.com/office/powerpoint/2015/main" val="1"/>
+                </p:ext>
+              </p:extLst>
+            </p:nvPr>
+          </p:nvSpPr>
+          <p:spPr>
+            <a:xfrm>
+              <a:off x="8609012" y="1676400"/>
+              <a:ext cx="2819400" cy="2819400"/>
+            </a:xfrm>
+            <a:prstGeom prst="ellipse">
+              <a:avLst/>
+            </a:prstGeom>
+            <a:gradFill flip="none" rotWithShape="1">
+              <a:gsLst>
+                <a:gs pos="0">
+                  <a:schemeClr val="accent5">
+                    <a:alpha val="7000"/>
+                  </a:schemeClr>
+                </a:gs>
+                <a:gs pos="69000">
+                  <a:schemeClr val="accent5">
+                    <a:alpha val="0"/>
+                  </a:schemeClr>
+                </a:gs>
+                <a:gs pos="36000">
+                  <a:schemeClr val="accent5">
+                    <a:alpha val="6000"/>
+                  </a:schemeClr>
+                </a:gs>
+              </a:gsLst>
+              <a:path path="circle">
+                <a:fillToRect l="50000" t="50000" r="50000" b="50000"/>
+              </a:path>
+              <a:tileRect/>
+            </a:gradFill>
+            <a:ln>
+              <a:noFill/>
+            </a:ln>
+            <a:effectLst/>
+          </p:spPr>
+          <p:style>
+            <a:lnRef idx="1">
+              <a:schemeClr val="accent1"/>
+            </a:lnRef>
+            <a:fillRef idx="3">
+              <a:schemeClr val="accent1"/>
+            </a:fillRef>
+            <a:effectRef idx="2">
+              <a:schemeClr val="accent1"/>
+            </a:effectRef>
+            <a:fontRef idx="minor">
+              <a:schemeClr val="lt1"/>
+            </a:fontRef>
+          </p:style>
+        </p:sp>
+        <p:sp>
+          <p:nvSpPr>
+            <p:cNvPr id="14" name="Oval 13">
+              <a:extLst>
+                <a:ext uri="{FF2B5EF4-FFF2-40B4-BE49-F238E27FC236}">
+                  <a16:creationId xmlns:a16="http://schemas.microsoft.com/office/drawing/2014/main" id="{6D073C2A-0E86-458E-88D4-27124FDADCAA}"/>
+                </a:ext>
+                <a:ext uri="{C183D7F6-B498-43B3-948B-1728B52AA6E4}">
+                  <adec:decorative xmlns:adec="http://schemas.microsoft.com/office/drawing/2017/decorative" val="1"/>
+                </a:ext>
+              </a:extLst>
+            </p:cNvPr>
+            <p:cNvSpPr/>
+            <p:nvPr>
+              <p:extLst>
+                <p:ext uri="{386F3935-93C4-4BCD-93E2-E3B085C9AB24}">
+                  <p16:designElem xmlns:p16="http://schemas.microsoft.com/office/powerpoint/2015/main" val="1"/>
+                </p:ext>
+              </p:extLst>
+            </p:nvPr>
+          </p:nvSpPr>
+          <p:spPr>
+            <a:xfrm>
+              <a:off x="7999412" y="8464"/>
+              <a:ext cx="1600200" cy="1600200"/>
+            </a:xfrm>
+            <a:prstGeom prst="ellipse">
+              <a:avLst/>
+            </a:prstGeom>
+            <a:gradFill flip="none" rotWithShape="1">
+              <a:gsLst>
+                <a:gs pos="0">
+                  <a:schemeClr val="accent5">
+                    <a:alpha val="14000"/>
+                  </a:schemeClr>
+                </a:gs>
+                <a:gs pos="73000">
+                  <a:schemeClr val="accent5">
+                    <a:alpha val="0"/>
+                  </a:schemeClr>
+                </a:gs>
+                <a:gs pos="36000">
+                  <a:schemeClr val="accent5">
+                    <a:alpha val="7000"/>
+                  </a:schemeClr>
+                </a:gs>
+              </a:gsLst>
+              <a:path path="circle">
+                <a:fillToRect l="50000" t="50000" r="50000" b="50000"/>
+              </a:path>
+              <a:tileRect/>
+            </a:gradFill>
+            <a:ln>
+              <a:noFill/>
+            </a:ln>
+            <a:effectLst/>
+          </p:spPr>
+          <p:style>
+            <a:lnRef idx="1">
+              <a:schemeClr val="accent1"/>
+            </a:lnRef>
+            <a:fillRef idx="3">
+              <a:schemeClr val="accent1"/>
+            </a:fillRef>
+            <a:effectRef idx="2">
+              <a:schemeClr val="accent1"/>
+            </a:effectRef>
+            <a:fontRef idx="minor">
+              <a:schemeClr val="lt1"/>
+            </a:fontRef>
+          </p:style>
+        </p:sp>
+        <p:sp>
+          <p:nvSpPr>
+            <p:cNvPr id="15" name="Freeform 5">
+              <a:extLst>
+                <a:ext uri="{FF2B5EF4-FFF2-40B4-BE49-F238E27FC236}">
+                  <a16:creationId xmlns:a16="http://schemas.microsoft.com/office/drawing/2014/main" id="{01A64F04-7AF7-48B9-A1B0-956BBCEEFE5A}"/>
+                </a:ext>
+                <a:ext uri="{C183D7F6-B498-43B3-948B-1728B52AA6E4}">
+                  <adec:decorative xmlns:adec="http://schemas.microsoft.com/office/drawing/2017/decorative" val="1"/>
+                </a:ext>
+              </a:extLst>
+            </p:cNvPr>
+            <p:cNvSpPr/>
+            <p:nvPr>
+              <p:extLst>
+                <p:ext uri="{386F3935-93C4-4BCD-93E2-E3B085C9AB24}">
+                  <p16:designElem xmlns:p16="http://schemas.microsoft.com/office/powerpoint/2015/main" val="1"/>
+                </p:ext>
+              </p:extLst>
+            </p:nvPr>
+          </p:nvSpPr>
+          <p:spPr bwMode="gray">
+            <a:xfrm rot="21010068">
+              <a:off x="8490951" y="1797517"/>
+              <a:ext cx="3299407" cy="440924"/>
+            </a:xfrm>
+            <a:custGeom>
+              <a:avLst/>
+              <a:gdLst/>
+              <a:ahLst/>
+              <a:cxnLst/>
+              <a:rect l="l" t="t" r="r" b="b"/>
+              <a:pathLst>
+                <a:path w="10000" h="5291">
+                  <a:moveTo>
+                    <a:pt x="85" y="2532"/>
+                  </a:moveTo>
+                  <a:cubicBezTo>
+                    <a:pt x="1736" y="3911"/>
+                    <a:pt x="7524" y="5298"/>
+                    <a:pt x="9958" y="5291"/>
+                  </a:cubicBezTo>
+                  <a:cubicBezTo>
+                    <a:pt x="9989" y="1958"/>
+                    <a:pt x="9969" y="3333"/>
+                    <a:pt x="10000" y="0"/>
+                  </a:cubicBezTo>
+                  <a:lnTo>
+                    <a:pt x="10000" y="0"/>
+                  </a:lnTo>
+                  <a:lnTo>
+                    <a:pt x="9667" y="204"/>
+                  </a:lnTo>
+                  <a:lnTo>
+                    <a:pt x="9334" y="400"/>
+                  </a:lnTo>
+                  <a:lnTo>
+                    <a:pt x="9001" y="590"/>
+                  </a:lnTo>
+                  <a:lnTo>
+                    <a:pt x="8667" y="753"/>
+                  </a:lnTo>
+                  <a:lnTo>
+                    <a:pt x="8333" y="917"/>
+                  </a:lnTo>
+                  <a:lnTo>
+                    <a:pt x="7999" y="1071"/>
+                  </a:lnTo>
+                  <a:lnTo>
+                    <a:pt x="7669" y="1202"/>
+                  </a:lnTo>
+                  <a:lnTo>
+                    <a:pt x="7333" y="1325"/>
+                  </a:lnTo>
+                  <a:lnTo>
+                    <a:pt x="7000" y="1440"/>
+                  </a:lnTo>
+                  <a:lnTo>
+                    <a:pt x="6673" y="1538"/>
+                  </a:lnTo>
+                  <a:lnTo>
+                    <a:pt x="6340" y="1636"/>
+                  </a:lnTo>
+                  <a:lnTo>
+                    <a:pt x="6013" y="1719"/>
+                  </a:lnTo>
+                  <a:lnTo>
+                    <a:pt x="5686" y="1784"/>
+                  </a:lnTo>
+                  <a:lnTo>
+                    <a:pt x="5359" y="1850"/>
+                  </a:lnTo>
+                  <a:lnTo>
+                    <a:pt x="5036" y="1906"/>
+                  </a:lnTo>
+                  <a:lnTo>
+                    <a:pt x="4717" y="1948"/>
+                  </a:lnTo>
+                  <a:lnTo>
+                    <a:pt x="4396" y="1980"/>
+                  </a:lnTo>
+                  <a:lnTo>
+                    <a:pt x="4079" y="2013"/>
+                  </a:lnTo>
+                  <a:lnTo>
+                    <a:pt x="3766" y="2029"/>
+                  </a:lnTo>
+                  <a:lnTo>
+                    <a:pt x="3454" y="2046"/>
+                  </a:lnTo>
+                  <a:lnTo>
+                    <a:pt x="3145" y="2053"/>
+                  </a:lnTo>
+                  <a:lnTo>
+                    <a:pt x="2839" y="2046"/>
+                  </a:lnTo>
+                  <a:lnTo>
+                    <a:pt x="2537" y="2046"/>
+                  </a:lnTo>
+                  <a:lnTo>
+                    <a:pt x="2238" y="2029"/>
+                  </a:lnTo>
+                  <a:lnTo>
+                    <a:pt x="1943" y="2004"/>
+                  </a:lnTo>
+                  <a:lnTo>
+                    <a:pt x="1653" y="1980"/>
+                  </a:lnTo>
+                  <a:lnTo>
+                    <a:pt x="1368" y="1955"/>
+                  </a:lnTo>
+                  <a:lnTo>
+                    <a:pt x="1085" y="1915"/>
+                  </a:lnTo>
+                  <a:lnTo>
+                    <a:pt x="806" y="1873"/>
+                  </a:lnTo>
+                  <a:lnTo>
+                    <a:pt x="533" y="1833"/>
+                  </a:lnTo>
+                  <a:lnTo>
+                    <a:pt x="0" y="1726"/>
+                  </a:lnTo>
+                  <a:cubicBezTo>
+                    <a:pt x="28" y="1995"/>
+                    <a:pt x="57" y="2263"/>
+                    <a:pt x="85" y="2532"/>
+                  </a:cubicBezTo>
+                  <a:close/>
+                </a:path>
+              </a:pathLst>
+            </a:custGeom>
+            <a:solidFill>
+              <a:schemeClr val="bg1">
+                <a:alpha val="20000"/>
+              </a:schemeClr>
+            </a:solidFill>
+            <a:ln>
+              <a:noFill/>
+            </a:ln>
+          </p:spPr>
+        </p:sp>
+        <p:sp>
+          <p:nvSpPr>
+            <p:cNvPr id="16" name="Freeform 5">
+              <a:extLst>
+                <a:ext uri="{FF2B5EF4-FFF2-40B4-BE49-F238E27FC236}">
+                  <a16:creationId xmlns:a16="http://schemas.microsoft.com/office/drawing/2014/main" id="{989ABE99-7694-4211-A627-459BE5422B62}"/>
+                </a:ext>
+                <a:ext uri="{C183D7F6-B498-43B3-948B-1728B52AA6E4}">
+                  <adec:decorative xmlns:adec="http://schemas.microsoft.com/office/drawing/2017/decorative" val="1"/>
+                </a:ext>
+              </a:extLst>
+            </p:cNvPr>
+            <p:cNvSpPr/>
+            <p:nvPr>
+              <p:extLst>
+                <p:ext uri="{386F3935-93C4-4BCD-93E2-E3B085C9AB24}">
+                  <p16:designElem xmlns:p16="http://schemas.microsoft.com/office/powerpoint/2015/main" val="1"/>
+                </p:ext>
+              </p:extLst>
+            </p:nvPr>
+          </p:nvSpPr>
+          <p:spPr bwMode="gray">
+            <a:xfrm>
+              <a:off x="459506" y="1866405"/>
+              <a:ext cx="11277600" cy="4533900"/>
+            </a:xfrm>
+            <a:custGeom>
+              <a:avLst/>
+              <a:gdLst/>
+              <a:ahLst/>
+              <a:cxnLst/>
+              <a:rect l="0" t="0" r="r" b="b"/>
+              <a:pathLst>
+                <a:path w="7104" h="2856">
+                  <a:moveTo>
+                    <a:pt x="0" y="0"/>
+                  </a:moveTo>
+                  <a:lnTo>
+                    <a:pt x="0" y="2856"/>
+                  </a:lnTo>
+                  <a:lnTo>
+                    <a:pt x="7104" y="2856"/>
+                  </a:lnTo>
+                  <a:lnTo>
+                    <a:pt x="7104" y="1"/>
+                  </a:lnTo>
+                  <a:lnTo>
+                    <a:pt x="7104" y="1"/>
+                  </a:lnTo>
+                  <a:lnTo>
+                    <a:pt x="6943" y="26"/>
+                  </a:lnTo>
+                  <a:lnTo>
+                    <a:pt x="6782" y="50"/>
+                  </a:lnTo>
+                  <a:lnTo>
+                    <a:pt x="6621" y="73"/>
+                  </a:lnTo>
+                  <a:lnTo>
+                    <a:pt x="6459" y="93"/>
+                  </a:lnTo>
+                  <a:lnTo>
+                    <a:pt x="6298" y="113"/>
+                  </a:lnTo>
+                  <a:lnTo>
+                    <a:pt x="6136" y="132"/>
+                  </a:lnTo>
+                  <a:lnTo>
+                    <a:pt x="5976" y="148"/>
+                  </a:lnTo>
+                  <a:lnTo>
+                    <a:pt x="5814" y="163"/>
+                  </a:lnTo>
+                  <a:lnTo>
+                    <a:pt x="5653" y="177"/>
+                  </a:lnTo>
+                  <a:lnTo>
+                    <a:pt x="5494" y="189"/>
+                  </a:lnTo>
+                  <a:lnTo>
+                    <a:pt x="5334" y="201"/>
+                  </a:lnTo>
+                  <a:lnTo>
+                    <a:pt x="5175" y="211"/>
+                  </a:lnTo>
+                  <a:lnTo>
+                    <a:pt x="5017" y="219"/>
+                  </a:lnTo>
+                  <a:lnTo>
+                    <a:pt x="4859" y="227"/>
+                  </a:lnTo>
+                  <a:lnTo>
+                    <a:pt x="4703" y="234"/>
+                  </a:lnTo>
+                  <a:lnTo>
+                    <a:pt x="4548" y="239"/>
+                  </a:lnTo>
+                  <a:lnTo>
+                    <a:pt x="4393" y="243"/>
+                  </a:lnTo>
+                  <a:lnTo>
+                    <a:pt x="4240" y="247"/>
+                  </a:lnTo>
+                  <a:lnTo>
+                    <a:pt x="4088" y="249"/>
+                  </a:lnTo>
+                  <a:lnTo>
+                    <a:pt x="3937" y="251"/>
+                  </a:lnTo>
+                  <a:lnTo>
+                    <a:pt x="3788" y="252"/>
+                  </a:lnTo>
+                  <a:lnTo>
+                    <a:pt x="3640" y="251"/>
+                  </a:lnTo>
+                  <a:lnTo>
+                    <a:pt x="3494" y="251"/>
+                  </a:lnTo>
+                  <a:lnTo>
+                    <a:pt x="3349" y="249"/>
+                  </a:lnTo>
+                  <a:lnTo>
+                    <a:pt x="3207" y="246"/>
+                  </a:lnTo>
+                  <a:lnTo>
+                    <a:pt x="3066" y="243"/>
+                  </a:lnTo>
+                  <a:lnTo>
+                    <a:pt x="2928" y="240"/>
+                  </a:lnTo>
+                  <a:lnTo>
+                    <a:pt x="2791" y="235"/>
+                  </a:lnTo>
+                  <a:lnTo>
+                    <a:pt x="2656" y="230"/>
+                  </a:lnTo>
+                  <a:lnTo>
+                    <a:pt x="2524" y="225"/>
+                  </a:lnTo>
+                  <a:lnTo>
+                    <a:pt x="2266" y="212"/>
+                  </a:lnTo>
+                  <a:lnTo>
+                    <a:pt x="2019" y="198"/>
+                  </a:lnTo>
+                  <a:lnTo>
+                    <a:pt x="1782" y="183"/>
+                  </a:lnTo>
+                  <a:lnTo>
+                    <a:pt x="1557" y="167"/>
+                  </a:lnTo>
+                  <a:lnTo>
+                    <a:pt x="1343" y="150"/>
+                  </a:lnTo>
+                  <a:lnTo>
+                    <a:pt x="1144" y="132"/>
+                  </a:lnTo>
+                  <a:lnTo>
+                    <a:pt x="957" y="114"/>
+                  </a:lnTo>
+                  <a:lnTo>
+                    <a:pt x="785" y="96"/>
+                  </a:lnTo>
+                  <a:lnTo>
+                    <a:pt x="627" y="79"/>
+                  </a:lnTo>
+                  <a:lnTo>
+                    <a:pt x="487" y="63"/>
+                  </a:lnTo>
+                  <a:lnTo>
+                    <a:pt x="361" y="48"/>
+                  </a:lnTo>
+                  <a:lnTo>
+                    <a:pt x="254" y="35"/>
+                  </a:lnTo>
+                  <a:lnTo>
+                    <a:pt x="165" y="23"/>
+                  </a:lnTo>
+                  <a:lnTo>
+                    <a:pt x="42" y="6"/>
+                  </a:lnTo>
+                  <a:lnTo>
+                    <a:pt x="0" y="0"/>
+                  </a:lnTo>
+                  <a:lnTo>
+                    <a:pt x="0" y="0"/>
+                  </a:lnTo>
+                  <a:close/>
+                </a:path>
+              </a:pathLst>
+            </a:custGeom>
+            <a:solidFill>
+              <a:schemeClr val="bg1"/>
+            </a:solidFill>
+            <a:ln>
+              <a:noFill/>
+            </a:ln>
+          </p:spPr>
+        </p:sp>
+        <p:sp>
+          <p:nvSpPr>
+            <p:cNvPr id="17" name="Freeform 5">
+              <a:extLst>
+                <a:ext uri="{FF2B5EF4-FFF2-40B4-BE49-F238E27FC236}">
+                  <a16:creationId xmlns:a16="http://schemas.microsoft.com/office/drawing/2014/main" id="{254B4214-6F53-497C-8322-9CE8158AA335}"/>
+                </a:ext>
+                <a:ext uri="{C183D7F6-B498-43B3-948B-1728B52AA6E4}">
+                  <adec:decorative xmlns:adec="http://schemas.microsoft.com/office/drawing/2017/decorative" val="1"/>
+                </a:ext>
+              </a:extLst>
+            </p:cNvPr>
+            <p:cNvSpPr>
+              <a:spLocks noEditPoints="1"/>
+            </p:cNvSpPr>
+            <p:nvPr>
+              <p:extLst>
+                <p:ext uri="{386F3935-93C4-4BCD-93E2-E3B085C9AB24}">
+                  <p16:designElem xmlns:p16="http://schemas.microsoft.com/office/powerpoint/2015/main" val="1"/>
+                </p:ext>
+              </p:extLst>
+            </p:nvPr>
+          </p:nvSpPr>
+          <p:spPr bwMode="gray">
+            <a:xfrm>
+              <a:off x="0" y="1587"/>
+              <a:ext cx="12192000" cy="6856413"/>
+            </a:xfrm>
+            <a:custGeom>
+              <a:avLst/>
+              <a:gdLst/>
+              <a:ahLst/>
+              <a:cxnLst/>
+              <a:rect l="0" t="0" r="r" b="b"/>
+              <a:pathLst>
+                <a:path w="15356" h="8638">
+                  <a:moveTo>
+                    <a:pt x="0" y="0"/>
+                  </a:moveTo>
+                  <a:lnTo>
+                    <a:pt x="0" y="8638"/>
+                  </a:lnTo>
+                  <a:lnTo>
+                    <a:pt x="15356" y="8638"/>
+                  </a:lnTo>
+                  <a:lnTo>
+                    <a:pt x="15356" y="0"/>
+                  </a:lnTo>
+                  <a:lnTo>
+                    <a:pt x="0" y="0"/>
+                  </a:lnTo>
+                  <a:close/>
+                  <a:moveTo>
+                    <a:pt x="14748" y="8038"/>
+                  </a:moveTo>
+                  <a:lnTo>
+                    <a:pt x="600" y="8038"/>
+                  </a:lnTo>
+                  <a:lnTo>
+                    <a:pt x="600" y="592"/>
+                  </a:lnTo>
+                  <a:lnTo>
+                    <a:pt x="14748" y="592"/>
+                  </a:lnTo>
+                  <a:lnTo>
+                    <a:pt x="14748" y="8038"/>
+                  </a:lnTo>
+                  <a:close/>
+                </a:path>
+              </a:pathLst>
+            </a:custGeom>
+            <a:solidFill>
+              <a:schemeClr val="bg1"/>
+            </a:solidFill>
+            <a:ln>
+              <a:noFill/>
+            </a:ln>
+          </p:spPr>
+        </p:sp>
+      </p:grpSp>
+      <p:sp>
+        <p:nvSpPr>
+          <p:cNvPr id="19" name="Rectangle 18">
+            <a:extLst>
+              <a:ext uri="{FF2B5EF4-FFF2-40B4-BE49-F238E27FC236}">
+                <a16:creationId xmlns:a16="http://schemas.microsoft.com/office/drawing/2014/main" id="{20E145FF-1D18-4246-A2BA-9F6B4D53364C}"/>
+              </a:ext>
+              <a:ext uri="{C183D7F6-B498-43B3-948B-1728B52AA6E4}">
+                <adec:decorative xmlns:adec="http://schemas.microsoft.com/office/drawing/2017/decorative" val="1"/>
+              </a:ext>
+            </a:extLst>
+          </p:cNvPr>
+          <p:cNvSpPr>
+            <a:spLocks noGrp="1" noRot="1" noChangeAspect="1" noMove="1" noResize="1" noEditPoints="1" noAdjustHandles="1" noChangeArrowheads="1" noChangeShapeType="1" noTextEdit="1"/>
+          </p:cNvSpPr>
+          <p:nvPr>
+            <p:extLst>
+              <p:ext uri="{386F3935-93C4-4BCD-93E2-E3B085C9AB24}">
+                <p16:designElem xmlns:p16="http://schemas.microsoft.com/office/powerpoint/2015/main" val="1"/>
+              </p:ext>
+            </p:extLst>
+          </p:nvPr>
+        </p:nvSpPr>
+        <p:spPr>
+          <a:xfrm>
+            <a:off x="10437812" y="0"/>
+            <a:ext cx="685800" cy="1143000"/>
+          </a:xfrm>
+          <a:prstGeom prst="rect">
+            <a:avLst/>
+          </a:prstGeom>
+          <a:solidFill>
+            <a:schemeClr val="accent1"/>
+          </a:solidFill>
+          <a:ln>
+            <a:noFill/>
+          </a:ln>
+        </p:spPr>
+        <p:style>
+          <a:lnRef idx="1">
+            <a:schemeClr val="accent1"/>
+          </a:lnRef>
+          <a:fillRef idx="3">
+            <a:schemeClr val="accent1"/>
+          </a:fillRef>
+          <a:effectRef idx="2">
+            <a:schemeClr val="accent1"/>
+          </a:effectRef>
+          <a:fontRef idx="minor">
+            <a:schemeClr val="lt1"/>
+          </a:fontRef>
+        </p:style>
+      </p:sp>
+      <p:sp useBgFill="1">
+        <p:nvSpPr>
+          <p:cNvPr id="21" name="Rectangle 20">
+            <a:extLst>
+              <a:ext uri="{FF2B5EF4-FFF2-40B4-BE49-F238E27FC236}">
+                <a16:creationId xmlns:a16="http://schemas.microsoft.com/office/drawing/2014/main" id="{324E43EB-867C-4B35-9A5C-E435157C7297}"/>
+              </a:ext>
+              <a:ext uri="{C183D7F6-B498-43B3-948B-1728B52AA6E4}">
+                <adec:decorative xmlns:adec="http://schemas.microsoft.com/office/drawing/2017/decorative" val="1"/>
+              </a:ext>
+            </a:extLst>
+          </p:cNvPr>
+          <p:cNvSpPr>
+            <a:spLocks noGrp="1" noRot="1" noChangeAspect="1" noMove="1" noResize="1" noEditPoints="1" noAdjustHandles="1" noChangeArrowheads="1" noChangeShapeType="1" noTextEdit="1"/>
+          </p:cNvSpPr>
+          <p:nvPr>
+            <p:extLst>
+              <p:ext uri="{386F3935-93C4-4BCD-93E2-E3B085C9AB24}">
+                <p16:designElem xmlns:p16="http://schemas.microsoft.com/office/powerpoint/2015/main" val="1"/>
+              </p:ext>
+            </p:extLst>
+          </p:nvPr>
+        </p:nvSpPr>
+        <p:spPr>
+          <a:xfrm>
+            <a:off x="0" y="0"/>
+            <a:ext cx="12192000" cy="6858000"/>
+          </a:xfrm>
+          <a:prstGeom prst="rect">
+            <a:avLst/>
+          </a:prstGeom>
+          <a:ln>
+            <a:noFill/>
+          </a:ln>
+        </p:spPr>
+        <p:style>
+          <a:lnRef idx="2">
+            <a:schemeClr val="accent1">
+              <a:shade val="50000"/>
+            </a:schemeClr>
+          </a:lnRef>
+          <a:fillRef idx="1">
+            <a:schemeClr val="accent1"/>
+          </a:fillRef>
+          <a:effectRef idx="0">
+            <a:schemeClr val="accent1"/>
+          </a:effectRef>
+          <a:fontRef idx="minor">
+            <a:schemeClr val="lt1"/>
+          </a:fontRef>
+        </p:style>
+        <p:txBody>
+          <a:bodyPr rtlCol="0" anchor="ctr"/>
+          <a:lstStyle/>
+          <a:p>
+            <a:pPr algn="ctr"/>
+            <a:endParaRPr lang="en-US"/>
+          </a:p>
+        </p:txBody>
+      </p:sp>
+      <p:sp>
+        <p:nvSpPr>
+          <p:cNvPr id="23" name="Rectangle 22">
+            <a:extLst>
+              <a:ext uri="{FF2B5EF4-FFF2-40B4-BE49-F238E27FC236}">
+                <a16:creationId xmlns:a16="http://schemas.microsoft.com/office/drawing/2014/main" id="{A7C0F5DA-B59F-4F13-8BB8-FFD8F2C572BC}"/>
+              </a:ext>
+              <a:ext uri="{C183D7F6-B498-43B3-948B-1728B52AA6E4}">
+                <adec:decorative xmlns:adec="http://schemas.microsoft.com/office/drawing/2017/decorative" val="1"/>
+              </a:ext>
+            </a:extLst>
+          </p:cNvPr>
+          <p:cNvSpPr>
+            <a:spLocks noGrp="1" noRot="1" noChangeAspect="1" noMove="1" noResize="1" noEditPoints="1" noAdjustHandles="1" noChangeArrowheads="1" noChangeShapeType="1" noTextEdit="1"/>
+          </p:cNvSpPr>
+          <p:nvPr>
+            <p:extLst>
+              <p:ext uri="{386F3935-93C4-4BCD-93E2-E3B085C9AB24}">
+                <p16:designElem xmlns:p16="http://schemas.microsoft.com/office/powerpoint/2015/main" val="1"/>
+              </p:ext>
+            </p:extLst>
+          </p:nvPr>
+        </p:nvSpPr>
+        <p:spPr>
+          <a:xfrm>
+            <a:off x="0" y="0"/>
+            <a:ext cx="12192000" cy="6858000"/>
+          </a:xfrm>
+          <a:prstGeom prst="rect">
+            <a:avLst/>
+          </a:prstGeom>
+          <a:ln>
+            <a:noFill/>
+          </a:ln>
+        </p:spPr>
+        <p:style>
+          <a:lnRef idx="2">
+            <a:schemeClr val="accent1">
+              <a:shade val="50000"/>
+            </a:schemeClr>
+          </a:lnRef>
+          <a:fillRef idx="1003">
+            <a:schemeClr val="dk2"/>
+          </a:fillRef>
+          <a:effectRef idx="0">
+            <a:schemeClr val="accent1"/>
+          </a:effectRef>
+          <a:fontRef idx="minor">
+            <a:schemeClr val="lt1"/>
+          </a:fontRef>
+        </p:style>
+      </p:sp>
+      <p:sp>
+        <p:nvSpPr>
+          <p:cNvPr id="25" name="Freeform 5">
+            <a:extLst>
+              <a:ext uri="{FF2B5EF4-FFF2-40B4-BE49-F238E27FC236}">
+                <a16:creationId xmlns:a16="http://schemas.microsoft.com/office/drawing/2014/main" id="{9CEA1DEC-CC9E-4776-9E08-048A15BFA6CA}"/>
+              </a:ext>
+              <a:ext uri="{C183D7F6-B498-43B3-948B-1728B52AA6E4}">
+                <adec:decorative xmlns:adec="http://schemas.microsoft.com/office/drawing/2017/decorative" val="1"/>
+              </a:ext>
+            </a:extLst>
+          </p:cNvPr>
+          <p:cNvSpPr>
+            <a:spLocks noGrp="1" noRot="1" noChangeAspect="1" noMove="1" noResize="1" noEditPoints="1" noAdjustHandles="1" noChangeArrowheads="1" noChangeShapeType="1" noTextEdit="1"/>
+          </p:cNvSpPr>
+          <p:nvPr>
+            <p:extLst>
+              <p:ext uri="{386F3935-93C4-4BCD-93E2-E3B085C9AB24}">
+                <p16:designElem xmlns:p16="http://schemas.microsoft.com/office/powerpoint/2015/main" val="1"/>
+              </p:ext>
+            </p:extLst>
+          </p:nvPr>
+        </p:nvSpPr>
+        <p:spPr bwMode="gray">
+          <a:xfrm rot="15922489">
+            <a:off x="3140485" y="1826078"/>
+            <a:ext cx="3299407" cy="440924"/>
+          </a:xfrm>
+          <a:custGeom>
+            <a:avLst/>
+            <a:gdLst/>
+            <a:ahLst/>
+            <a:cxnLst/>
+            <a:rect l="l" t="t" r="r" b="b"/>
+            <a:pathLst>
+              <a:path w="10000" h="5291">
+                <a:moveTo>
+                  <a:pt x="85" y="2532"/>
+                </a:moveTo>
+                <a:cubicBezTo>
+                  <a:pt x="1736" y="3911"/>
+                  <a:pt x="7524" y="5298"/>
+                  <a:pt x="9958" y="5291"/>
+                </a:cubicBezTo>
+                <a:cubicBezTo>
+                  <a:pt x="9989" y="1958"/>
+                  <a:pt x="9969" y="3333"/>
+                  <a:pt x="10000" y="0"/>
+                </a:cubicBezTo>
+                <a:lnTo>
+                  <a:pt x="10000" y="0"/>
+                </a:lnTo>
+                <a:lnTo>
+                  <a:pt x="9667" y="204"/>
+                </a:lnTo>
+                <a:lnTo>
+                  <a:pt x="9334" y="400"/>
+                </a:lnTo>
+                <a:lnTo>
+                  <a:pt x="9001" y="590"/>
+                </a:lnTo>
+                <a:lnTo>
+                  <a:pt x="8667" y="753"/>
+                </a:lnTo>
+                <a:lnTo>
+                  <a:pt x="8333" y="917"/>
+                </a:lnTo>
+                <a:lnTo>
+                  <a:pt x="7999" y="1071"/>
+                </a:lnTo>
+                <a:lnTo>
+                  <a:pt x="7669" y="1202"/>
+                </a:lnTo>
+                <a:lnTo>
+                  <a:pt x="7333" y="1325"/>
+                </a:lnTo>
+                <a:lnTo>
+                  <a:pt x="7000" y="1440"/>
+                </a:lnTo>
+                <a:lnTo>
+                  <a:pt x="6673" y="1538"/>
+                </a:lnTo>
+                <a:lnTo>
+                  <a:pt x="6340" y="1636"/>
+                </a:lnTo>
+                <a:lnTo>
+                  <a:pt x="6013" y="1719"/>
+                </a:lnTo>
+                <a:lnTo>
+                  <a:pt x="5686" y="1784"/>
+                </a:lnTo>
+                <a:lnTo>
+                  <a:pt x="5359" y="1850"/>
+                </a:lnTo>
+                <a:lnTo>
+                  <a:pt x="5036" y="1906"/>
+                </a:lnTo>
+                <a:lnTo>
+                  <a:pt x="4717" y="1948"/>
+                </a:lnTo>
+                <a:lnTo>
+                  <a:pt x="4396" y="1980"/>
+                </a:lnTo>
+                <a:lnTo>
+                  <a:pt x="4079" y="2013"/>
+                </a:lnTo>
+                <a:lnTo>
+                  <a:pt x="3766" y="2029"/>
+                </a:lnTo>
+                <a:lnTo>
+                  <a:pt x="3454" y="2046"/>
+                </a:lnTo>
+                <a:lnTo>
+                  <a:pt x="3145" y="2053"/>
+                </a:lnTo>
+                <a:lnTo>
+                  <a:pt x="2839" y="2046"/>
+                </a:lnTo>
+                <a:lnTo>
+                  <a:pt x="2537" y="2046"/>
+                </a:lnTo>
+                <a:lnTo>
+                  <a:pt x="2238" y="2029"/>
+                </a:lnTo>
+                <a:lnTo>
+                  <a:pt x="1943" y="2004"/>
+                </a:lnTo>
+                <a:lnTo>
+                  <a:pt x="1653" y="1980"/>
+                </a:lnTo>
+                <a:lnTo>
+                  <a:pt x="1368" y="1955"/>
+                </a:lnTo>
+                <a:lnTo>
+                  <a:pt x="1085" y="1915"/>
+                </a:lnTo>
+                <a:lnTo>
+                  <a:pt x="806" y="1873"/>
+                </a:lnTo>
+                <a:lnTo>
+                  <a:pt x="533" y="1833"/>
+                </a:lnTo>
+                <a:lnTo>
+                  <a:pt x="0" y="1726"/>
+                </a:lnTo>
+                <a:cubicBezTo>
+                  <a:pt x="28" y="1995"/>
+                  <a:pt x="57" y="2263"/>
+                  <a:pt x="85" y="2532"/>
+                </a:cubicBezTo>
+                <a:close/>
+              </a:path>
+            </a:pathLst>
+          </a:custGeom>
+          <a:solidFill>
+            <a:schemeClr val="bg1">
+              <a:alpha val="20000"/>
+            </a:schemeClr>
+          </a:solidFill>
+          <a:ln>
+            <a:noFill/>
+          </a:ln>
+        </p:spPr>
+      </p:sp>
+      <p:sp>
+        <p:nvSpPr>
+          <p:cNvPr id="27" name="Freeform: Shape 26">
+            <a:extLst>
+              <a:ext uri="{FF2B5EF4-FFF2-40B4-BE49-F238E27FC236}">
+                <a16:creationId xmlns:a16="http://schemas.microsoft.com/office/drawing/2014/main" id="{9CE399CF-F4B8-4832-A8CB-B93F6B1EF44B}"/>
+              </a:ext>
+              <a:ext uri="{C183D7F6-B498-43B3-948B-1728B52AA6E4}">
+                <adec:decorative xmlns:adec="http://schemas.microsoft.com/office/drawing/2017/decorative" val="1"/>
+              </a:ext>
+            </a:extLst>
+          </p:cNvPr>
+          <p:cNvSpPr>
+            <a:spLocks noGrp="1" noRot="1" noChangeAspect="1" noMove="1" noResize="1" noEditPoints="1" noAdjustHandles="1" noChangeArrowheads="1" noChangeShapeType="1" noTextEdit="1"/>
+          </p:cNvSpPr>
+          <p:nvPr>
+            <p:extLst>
+              <p:ext uri="{386F3935-93C4-4BCD-93E2-E3B085C9AB24}">
+                <p16:designElem xmlns:p16="http://schemas.microsoft.com/office/powerpoint/2015/main" val="1"/>
+              </p:ext>
+            </p:extLst>
+          </p:nvPr>
+        </p:nvSpPr>
+        <p:spPr bwMode="gray">
+          <a:xfrm rot="16200000">
+            <a:off x="5171964" y="-140866"/>
+            <a:ext cx="6053670" cy="7139732"/>
+          </a:xfrm>
+          <a:custGeom>
+            <a:avLst/>
+            <a:gdLst>
+              <a:gd name="connsiteX0" fmla="*/ 6053670 w 6053670"/>
+              <a:gd name="connsiteY0" fmla="*/ 1098 h 7139732"/>
+              <a:gd name="connsiteX1" fmla="*/ 6053670 w 6053670"/>
+              <a:gd name="connsiteY1" fmla="*/ 1084479 h 7139732"/>
+              <a:gd name="connsiteX2" fmla="*/ 6053670 w 6053670"/>
+              <a:gd name="connsiteY2" fmla="*/ 1254558 h 7139732"/>
+              <a:gd name="connsiteX3" fmla="*/ 6053670 w 6053670"/>
+              <a:gd name="connsiteY3" fmla="*/ 7139732 h 7139732"/>
+              <a:gd name="connsiteX4" fmla="*/ 0 w 6053670"/>
+              <a:gd name="connsiteY4" fmla="*/ 7139732 h 7139732"/>
+              <a:gd name="connsiteX5" fmla="*/ 0 w 6053670"/>
+              <a:gd name="connsiteY5" fmla="*/ 1249853 h 7139732"/>
+              <a:gd name="connsiteX6" fmla="*/ 0 w 6053670"/>
+              <a:gd name="connsiteY6" fmla="*/ 1084479 h 7139732"/>
+              <a:gd name="connsiteX7" fmla="*/ 0 w 6053670"/>
+              <a:gd name="connsiteY7" fmla="*/ 0 h 7139732"/>
+              <a:gd name="connsiteX8" fmla="*/ 35717 w 6053670"/>
+              <a:gd name="connsiteY8" fmla="*/ 5488 h 7139732"/>
+              <a:gd name="connsiteX9" fmla="*/ 140445 w 6053670"/>
+              <a:gd name="connsiteY9" fmla="*/ 21641 h 7139732"/>
+              <a:gd name="connsiteX10" fmla="*/ 216722 w 6053670"/>
+              <a:gd name="connsiteY10" fmla="*/ 32932 h 7139732"/>
+              <a:gd name="connsiteX11" fmla="*/ 307527 w 6053670"/>
+              <a:gd name="connsiteY11" fmla="*/ 44850 h 7139732"/>
+              <a:gd name="connsiteX12" fmla="*/ 415282 w 6053670"/>
+              <a:gd name="connsiteY12" fmla="*/ 59121 h 7139732"/>
+              <a:gd name="connsiteX13" fmla="*/ 534539 w 6053670"/>
+              <a:gd name="connsiteY13" fmla="*/ 74175 h 7139732"/>
+              <a:gd name="connsiteX14" fmla="*/ 668931 w 6053670"/>
+              <a:gd name="connsiteY14" fmla="*/ 90014 h 7139732"/>
+              <a:gd name="connsiteX15" fmla="*/ 815430 w 6053670"/>
+              <a:gd name="connsiteY15" fmla="*/ 106794 h 7139732"/>
+              <a:gd name="connsiteX16" fmla="*/ 974641 w 6053670"/>
+              <a:gd name="connsiteY16" fmla="*/ 123574 h 7139732"/>
+              <a:gd name="connsiteX17" fmla="*/ 1144144 w 6053670"/>
+              <a:gd name="connsiteY17" fmla="*/ 140667 h 7139732"/>
+              <a:gd name="connsiteX18" fmla="*/ 1326965 w 6053670"/>
+              <a:gd name="connsiteY18" fmla="*/ 156506 h 7139732"/>
+              <a:gd name="connsiteX19" fmla="*/ 1518261 w 6053670"/>
+              <a:gd name="connsiteY19" fmla="*/ 171717 h 7139732"/>
+              <a:gd name="connsiteX20" fmla="*/ 1720453 w 6053670"/>
+              <a:gd name="connsiteY20" fmla="*/ 185518 h 7139732"/>
+              <a:gd name="connsiteX21" fmla="*/ 1931121 w 6053670"/>
+              <a:gd name="connsiteY21" fmla="*/ 198690 h 7139732"/>
+              <a:gd name="connsiteX22" fmla="*/ 2150869 w 6053670"/>
+              <a:gd name="connsiteY22" fmla="*/ 211079 h 7139732"/>
+              <a:gd name="connsiteX23" fmla="*/ 2263467 w 6053670"/>
+              <a:gd name="connsiteY23" fmla="*/ 215470 h 7139732"/>
+              <a:gd name="connsiteX24" fmla="*/ 2378487 w 6053670"/>
+              <a:gd name="connsiteY24" fmla="*/ 220332 h 7139732"/>
+              <a:gd name="connsiteX25" fmla="*/ 2495323 w 6053670"/>
+              <a:gd name="connsiteY25" fmla="*/ 224879 h 7139732"/>
+              <a:gd name="connsiteX26" fmla="*/ 2612764 w 6053670"/>
+              <a:gd name="connsiteY26" fmla="*/ 227859 h 7139732"/>
+              <a:gd name="connsiteX27" fmla="*/ 2732627 w 6053670"/>
+              <a:gd name="connsiteY27" fmla="*/ 230525 h 7139732"/>
+              <a:gd name="connsiteX28" fmla="*/ 2853700 w 6053670"/>
+              <a:gd name="connsiteY28" fmla="*/ 233348 h 7139732"/>
+              <a:gd name="connsiteX29" fmla="*/ 2977195 w 6053670"/>
+              <a:gd name="connsiteY29" fmla="*/ 235229 h 7139732"/>
+              <a:gd name="connsiteX30" fmla="*/ 3101901 w 6053670"/>
+              <a:gd name="connsiteY30" fmla="*/ 235229 h 7139732"/>
+              <a:gd name="connsiteX31" fmla="*/ 3227817 w 6053670"/>
+              <a:gd name="connsiteY31" fmla="*/ 236170 h 7139732"/>
+              <a:gd name="connsiteX32" fmla="*/ 3354944 w 6053670"/>
+              <a:gd name="connsiteY32" fmla="*/ 235229 h 7139732"/>
+              <a:gd name="connsiteX33" fmla="*/ 3483887 w 6053670"/>
+              <a:gd name="connsiteY33" fmla="*/ 233348 h 7139732"/>
+              <a:gd name="connsiteX34" fmla="*/ 3612830 w 6053670"/>
+              <a:gd name="connsiteY34" fmla="*/ 231623 h 7139732"/>
+              <a:gd name="connsiteX35" fmla="*/ 3743590 w 6053670"/>
+              <a:gd name="connsiteY35" fmla="*/ 227859 h 7139732"/>
+              <a:gd name="connsiteX36" fmla="*/ 3875560 w 6053670"/>
+              <a:gd name="connsiteY36" fmla="*/ 223938 h 7139732"/>
+              <a:gd name="connsiteX37" fmla="*/ 4007530 w 6053670"/>
+              <a:gd name="connsiteY37" fmla="*/ 219391 h 7139732"/>
+              <a:gd name="connsiteX38" fmla="*/ 4140710 w 6053670"/>
+              <a:gd name="connsiteY38" fmla="*/ 212961 h 7139732"/>
+              <a:gd name="connsiteX39" fmla="*/ 4275102 w 6053670"/>
+              <a:gd name="connsiteY39" fmla="*/ 205277 h 7139732"/>
+              <a:gd name="connsiteX40" fmla="*/ 4410098 w 6053670"/>
+              <a:gd name="connsiteY40" fmla="*/ 197907 h 7139732"/>
+              <a:gd name="connsiteX41" fmla="*/ 4545096 w 6053670"/>
+              <a:gd name="connsiteY41" fmla="*/ 188498 h 7139732"/>
+              <a:gd name="connsiteX42" fmla="*/ 4681909 w 6053670"/>
+              <a:gd name="connsiteY42" fmla="*/ 177207 h 7139732"/>
+              <a:gd name="connsiteX43" fmla="*/ 4816905 w 6053670"/>
+              <a:gd name="connsiteY43" fmla="*/ 165916 h 7139732"/>
+              <a:gd name="connsiteX44" fmla="*/ 4954323 w 6053670"/>
+              <a:gd name="connsiteY44" fmla="*/ 152899 h 7139732"/>
+              <a:gd name="connsiteX45" fmla="*/ 5092347 w 6053670"/>
+              <a:gd name="connsiteY45" fmla="*/ 138629 h 7139732"/>
+              <a:gd name="connsiteX46" fmla="*/ 5228555 w 6053670"/>
+              <a:gd name="connsiteY46" fmla="*/ 123574 h 7139732"/>
+              <a:gd name="connsiteX47" fmla="*/ 5366578 w 6053670"/>
+              <a:gd name="connsiteY47" fmla="*/ 106010 h 7139732"/>
+              <a:gd name="connsiteX48" fmla="*/ 5503997 w 6053670"/>
+              <a:gd name="connsiteY48" fmla="*/ 87192 h 7139732"/>
+              <a:gd name="connsiteX49" fmla="*/ 5642020 w 6053670"/>
+              <a:gd name="connsiteY49" fmla="*/ 68530 h 7139732"/>
+              <a:gd name="connsiteX50" fmla="*/ 5779438 w 6053670"/>
+              <a:gd name="connsiteY50" fmla="*/ 46733 h 7139732"/>
+              <a:gd name="connsiteX51" fmla="*/ 5916251 w 6053670"/>
+              <a:gd name="connsiteY51" fmla="*/ 24464 h 7139732"/>
+            </a:gdLst>
+            <a:ahLst/>
+            <a:cxnLst>
+              <a:cxn ang="0">
+                <a:pos x="connsiteX0" y="connsiteY0"/>
+              </a:cxn>
+              <a:cxn ang="0">
+                <a:pos x="connsiteX1" y="connsiteY1"/>
+              </a:cxn>
+              <a:cxn ang="0">
+                <a:pos x="connsiteX2" y="connsiteY2"/>
+              </a:cxn>
+              <a:cxn ang="0">
+                <a:pos x="connsiteX3" y="connsiteY3"/>
+              </a:cxn>
+              <a:cxn ang="0">
+                <a:pos x="connsiteX4" y="connsiteY4"/>
+              </a:cxn>
+              <a:cxn ang="0">
+                <a:pos x="connsiteX5" y="connsiteY5"/>
+              </a:cxn>
+              <a:cxn ang="0">
+                <a:pos x="connsiteX6" y="connsiteY6"/>
+              </a:cxn>
+              <a:cxn ang="0">
+                <a:pos x="connsiteX7" y="connsiteY7"/>
+              </a:cxn>
+              <a:cxn ang="0">
+                <a:pos x="connsiteX8" y="connsiteY8"/>
+              </a:cxn>
+              <a:cxn ang="0">
+                <a:pos x="connsiteX9" y="connsiteY9"/>
+              </a:cxn>
+              <a:cxn ang="0">
+                <a:pos x="connsiteX10" y="connsiteY10"/>
+              </a:cxn>
+              <a:cxn ang="0">
+                <a:pos x="connsiteX11" y="connsiteY11"/>
+              </a:cxn>
+              <a:cxn ang="0">
+                <a:pos x="connsiteX12" y="connsiteY12"/>
+              </a:cxn>
+              <a:cxn ang="0">
+                <a:pos x="connsiteX13" y="connsiteY13"/>
+              </a:cxn>
+              <a:cxn ang="0">
+                <a:pos x="connsiteX14" y="connsiteY14"/>
+              </a:cxn>
+              <a:cxn ang="0">
+                <a:pos x="connsiteX15" y="connsiteY15"/>
+              </a:cxn>
+              <a:cxn ang="0">
+                <a:pos x="connsiteX16" y="connsiteY16"/>
+              </a:cxn>
+              <a:cxn ang="0">
+                <a:pos x="connsiteX17" y="connsiteY17"/>
+              </a:cxn>
+              <a:cxn ang="0">
+                <a:pos x="connsiteX18" y="connsiteY18"/>
+              </a:cxn>
+              <a:cxn ang="0">
+                <a:pos x="connsiteX19" y="connsiteY19"/>
+              </a:cxn>
+              <a:cxn ang="0">
+                <a:pos x="connsiteX20" y="connsiteY20"/>
+              </a:cxn>
+              <a:cxn ang="0">
+                <a:pos x="connsiteX21" y="connsiteY21"/>
+              </a:cxn>
+              <a:cxn ang="0">
+                <a:pos x="connsiteX22" y="connsiteY22"/>
+              </a:cxn>
+              <a:cxn ang="0">
+                <a:pos x="connsiteX23" y="connsiteY23"/>
+              </a:cxn>
+              <a:cxn ang="0">
+                <a:pos x="connsiteX24" y="connsiteY24"/>
+              </a:cxn>
+              <a:cxn ang="0">
+                <a:pos x="connsiteX25" y="connsiteY25"/>
+              </a:cxn>
+              <a:cxn ang="0">
+                <a:pos x="connsiteX26" y="connsiteY26"/>
+              </a:cxn>
+              <a:cxn ang="0">
+                <a:pos x="connsiteX27" y="connsiteY27"/>
+              </a:cxn>
+              <a:cxn ang="0">
+                <a:pos x="connsiteX28" y="connsiteY28"/>
+              </a:cxn>
+              <a:cxn ang="0">
+                <a:pos x="connsiteX29" y="connsiteY29"/>
+              </a:cxn>
+              <a:cxn ang="0">
+                <a:pos x="connsiteX30" y="connsiteY30"/>
+              </a:cxn>
+              <a:cxn ang="0">
+                <a:pos x="connsiteX31" y="connsiteY31"/>
+              </a:cxn>
+              <a:cxn ang="0">
+                <a:pos x="connsiteX32" y="connsiteY32"/>
+              </a:cxn>
+              <a:cxn ang="0">
+                <a:pos x="connsiteX33" y="connsiteY33"/>
+              </a:cxn>
+              <a:cxn ang="0">
+                <a:pos x="connsiteX34" y="connsiteY34"/>
+              </a:cxn>
+              <a:cxn ang="0">
+                <a:pos x="connsiteX35" y="connsiteY35"/>
+              </a:cxn>
+              <a:cxn ang="0">
+                <a:pos x="connsiteX36" y="connsiteY36"/>
+              </a:cxn>
+              <a:cxn ang="0">
+                <a:pos x="connsiteX37" y="connsiteY37"/>
+              </a:cxn>
+              <a:cxn ang="0">
+                <a:pos x="connsiteX38" y="connsiteY38"/>
+              </a:cxn>
+              <a:cxn ang="0">
+                <a:pos x="connsiteX39" y="connsiteY39"/>
+              </a:cxn>
+              <a:cxn ang="0">
+                <a:pos x="connsiteX40" y="connsiteY40"/>
+              </a:cxn>
+              <a:cxn ang="0">
+                <a:pos x="connsiteX41" y="connsiteY41"/>
+              </a:cxn>
+              <a:cxn ang="0">
+                <a:pos x="connsiteX42" y="connsiteY42"/>
+              </a:cxn>
+              <a:cxn ang="0">
+                <a:pos x="connsiteX43" y="connsiteY43"/>
+              </a:cxn>
+              <a:cxn ang="0">
+                <a:pos x="connsiteX44" y="connsiteY44"/>
+              </a:cxn>
+              <a:cxn ang="0">
+                <a:pos x="connsiteX45" y="connsiteY45"/>
+              </a:cxn>
+              <a:cxn ang="0">
+                <a:pos x="connsiteX46" y="connsiteY46"/>
+              </a:cxn>
+              <a:cxn ang="0">
+                <a:pos x="connsiteX47" y="connsiteY47"/>
+              </a:cxn>
+              <a:cxn ang="0">
+                <a:pos x="connsiteX48" y="connsiteY48"/>
+              </a:cxn>
+              <a:cxn ang="0">
+                <a:pos x="connsiteX49" y="connsiteY49"/>
+              </a:cxn>
+              <a:cxn ang="0">
+                <a:pos x="connsiteX50" y="connsiteY50"/>
+              </a:cxn>
+              <a:cxn ang="0">
+                <a:pos x="connsiteX51" y="connsiteY51"/>
+              </a:cxn>
+            </a:cxnLst>
+            <a:rect l="l" t="t" r="r" b="b"/>
+            <a:pathLst>
+              <a:path w="6053670" h="7139732">
+                <a:moveTo>
+                  <a:pt x="6053670" y="1098"/>
+                </a:moveTo>
+                <a:lnTo>
+                  <a:pt x="6053670" y="1084479"/>
+                </a:lnTo>
+                <a:lnTo>
+                  <a:pt x="6053670" y="1254558"/>
+                </a:lnTo>
+                <a:lnTo>
+                  <a:pt x="6053670" y="7139732"/>
+                </a:lnTo>
+                <a:lnTo>
+                  <a:pt x="0" y="7139732"/>
+                </a:lnTo>
+                <a:lnTo>
+                  <a:pt x="0" y="1249853"/>
+                </a:lnTo>
+                <a:lnTo>
+                  <a:pt x="0" y="1084479"/>
+                </a:lnTo>
+                <a:lnTo>
+                  <a:pt x="0" y="0"/>
+                </a:lnTo>
+                <a:lnTo>
+                  <a:pt x="35717" y="5488"/>
+                </a:lnTo>
+                <a:lnTo>
+                  <a:pt x="140445" y="21641"/>
+                </a:lnTo>
+                <a:lnTo>
+                  <a:pt x="216722" y="32932"/>
+                </a:lnTo>
+                <a:lnTo>
+                  <a:pt x="307527" y="44850"/>
+                </a:lnTo>
+                <a:lnTo>
+                  <a:pt x="415282" y="59121"/>
+                </a:lnTo>
+                <a:lnTo>
+                  <a:pt x="534539" y="74175"/>
+                </a:lnTo>
+                <a:lnTo>
+                  <a:pt x="668931" y="90014"/>
+                </a:lnTo>
+                <a:lnTo>
+                  <a:pt x="815430" y="106794"/>
+                </a:lnTo>
+                <a:lnTo>
+                  <a:pt x="974641" y="123574"/>
+                </a:lnTo>
+                <a:lnTo>
+                  <a:pt x="1144144" y="140667"/>
+                </a:lnTo>
+                <a:lnTo>
+                  <a:pt x="1326965" y="156506"/>
+                </a:lnTo>
+                <a:lnTo>
+                  <a:pt x="1518261" y="171717"/>
+                </a:lnTo>
+                <a:lnTo>
+                  <a:pt x="1720453" y="185518"/>
+                </a:lnTo>
+                <a:lnTo>
+                  <a:pt x="1931121" y="198690"/>
+                </a:lnTo>
+                <a:lnTo>
+                  <a:pt x="2150869" y="211079"/>
+                </a:lnTo>
+                <a:lnTo>
+                  <a:pt x="2263467" y="215470"/>
+                </a:lnTo>
+                <a:lnTo>
+                  <a:pt x="2378487" y="220332"/>
+                </a:lnTo>
+                <a:lnTo>
+                  <a:pt x="2495323" y="224879"/>
+                </a:lnTo>
+                <a:lnTo>
+                  <a:pt x="2612764" y="227859"/>
+                </a:lnTo>
+                <a:lnTo>
+                  <a:pt x="2732627" y="230525"/>
+                </a:lnTo>
+                <a:lnTo>
+                  <a:pt x="2853700" y="233348"/>
+                </a:lnTo>
+                <a:lnTo>
+                  <a:pt x="2977195" y="235229"/>
+                </a:lnTo>
+                <a:lnTo>
+                  <a:pt x="3101901" y="235229"/>
+                </a:lnTo>
+                <a:lnTo>
+                  <a:pt x="3227817" y="236170"/>
+                </a:lnTo>
+                <a:lnTo>
+                  <a:pt x="3354944" y="235229"/>
+                </a:lnTo>
+                <a:lnTo>
+                  <a:pt x="3483887" y="233348"/>
+                </a:lnTo>
+                <a:lnTo>
+                  <a:pt x="3612830" y="231623"/>
+                </a:lnTo>
+                <a:lnTo>
+                  <a:pt x="3743590" y="227859"/>
+                </a:lnTo>
+                <a:lnTo>
+                  <a:pt x="3875560" y="223938"/>
+                </a:lnTo>
+                <a:lnTo>
+                  <a:pt x="4007530" y="219391"/>
+                </a:lnTo>
+                <a:lnTo>
+                  <a:pt x="4140710" y="212961"/>
+                </a:lnTo>
+                <a:lnTo>
+                  <a:pt x="4275102" y="205277"/>
+                </a:lnTo>
+                <a:lnTo>
+                  <a:pt x="4410098" y="197907"/>
+                </a:lnTo>
+                <a:lnTo>
+                  <a:pt x="4545096" y="188498"/>
+                </a:lnTo>
+                <a:lnTo>
+                  <a:pt x="4681909" y="177207"/>
+                </a:lnTo>
+                <a:lnTo>
+                  <a:pt x="4816905" y="165916"/>
+                </a:lnTo>
+                <a:lnTo>
+                  <a:pt x="4954323" y="152899"/>
+                </a:lnTo>
+                <a:lnTo>
+                  <a:pt x="5092347" y="138629"/>
+                </a:lnTo>
+                <a:lnTo>
+                  <a:pt x="5228555" y="123574"/>
+                </a:lnTo>
+                <a:lnTo>
+                  <a:pt x="5366578" y="106010"/>
+                </a:lnTo>
+                <a:lnTo>
+                  <a:pt x="5503997" y="87192"/>
+                </a:lnTo>
+                <a:lnTo>
+                  <a:pt x="5642020" y="68530"/>
+                </a:lnTo>
+                <a:lnTo>
+                  <a:pt x="5779438" y="46733"/>
+                </a:lnTo>
+                <a:lnTo>
+                  <a:pt x="5916251" y="24464"/>
+                </a:lnTo>
+                <a:close/>
+              </a:path>
+            </a:pathLst>
+          </a:custGeom>
+          <a:solidFill>
+            <a:schemeClr val="bg1"/>
+          </a:solidFill>
+          <a:ln>
+            <a:noFill/>
+          </a:ln>
+        </p:spPr>
+      </p:sp>
+      <p:sp>
+        <p:nvSpPr>
+          <p:cNvPr id="29" name="Freeform 5">
+            <a:extLst>
+              <a:ext uri="{FF2B5EF4-FFF2-40B4-BE49-F238E27FC236}">
+                <a16:creationId xmlns:a16="http://schemas.microsoft.com/office/drawing/2014/main" id="{1F23E73A-FDC8-462C-83C1-3AA8961449CF}"/>
+              </a:ext>
+              <a:ext uri="{C183D7F6-B498-43B3-948B-1728B52AA6E4}">
+                <adec:decorative xmlns:adec="http://schemas.microsoft.com/office/drawing/2017/decorative" val="1"/>
+              </a:ext>
+            </a:extLst>
+          </p:cNvPr>
+          <p:cNvSpPr>
+            <a:spLocks noGrp="1" noRot="1" noChangeAspect="1" noMove="1" noResize="1" noEditPoints="1" noAdjustHandles="1" noChangeArrowheads="1" noChangeShapeType="1" noTextEdit="1"/>
+          </p:cNvSpPr>
+          <p:nvPr>
+            <p:extLst>
+              <p:ext uri="{386F3935-93C4-4BCD-93E2-E3B085C9AB24}">
+                <p16:designElem xmlns:p16="http://schemas.microsoft.com/office/powerpoint/2015/main" val="1"/>
+              </p:ext>
+            </p:extLst>
+          </p:nvPr>
+        </p:nvSpPr>
+        <p:spPr bwMode="gray">
+          <a:xfrm>
+            <a:off x="0" y="1587"/>
+            <a:ext cx="12192000" cy="6856413"/>
+          </a:xfrm>
+          <a:custGeom>
+            <a:avLst/>
+            <a:gdLst/>
+            <a:ahLst/>
+            <a:cxnLst/>
+            <a:rect l="0" t="0" r="r" b="b"/>
+            <a:pathLst>
+              <a:path w="15356" h="8638">
+                <a:moveTo>
+                  <a:pt x="0" y="0"/>
+                </a:moveTo>
+                <a:lnTo>
+                  <a:pt x="0" y="8638"/>
+                </a:lnTo>
+                <a:lnTo>
+                  <a:pt x="15356" y="8638"/>
+                </a:lnTo>
+                <a:lnTo>
+                  <a:pt x="15356" y="0"/>
+                </a:lnTo>
+                <a:lnTo>
+                  <a:pt x="0" y="0"/>
+                </a:lnTo>
+                <a:close/>
+                <a:moveTo>
+                  <a:pt x="14748" y="8038"/>
+                </a:moveTo>
+                <a:lnTo>
+                  <a:pt x="600" y="8038"/>
+                </a:lnTo>
+                <a:lnTo>
+                  <a:pt x="600" y="592"/>
+                </a:lnTo>
+                <a:lnTo>
+                  <a:pt x="14748" y="592"/>
+                </a:lnTo>
+                <a:lnTo>
+                  <a:pt x="14748" y="8038"/>
+                </a:lnTo>
+                <a:close/>
+              </a:path>
+            </a:pathLst>
+          </a:custGeom>
+          <a:solidFill>
+            <a:schemeClr val="bg1"/>
+          </a:solidFill>
+          <a:ln>
+            <a:noFill/>
+          </a:ln>
+        </p:spPr>
+      </p:sp>
+      <p:sp>
+        <p:nvSpPr>
+          <p:cNvPr id="2" name="Title 1">
+            <a:extLst>
+              <a:ext uri="{FF2B5EF4-FFF2-40B4-BE49-F238E27FC236}">
+                <a16:creationId xmlns:a16="http://schemas.microsoft.com/office/drawing/2014/main" id="{45A24646-3429-8847-A682-94E49DC8BB92}"/>
+              </a:ext>
+            </a:extLst>
+          </p:cNvPr>
+          <p:cNvSpPr>
+            <a:spLocks noGrp="1"/>
+          </p:cNvSpPr>
+          <p:nvPr>
+            <p:ph type="ctrTitle"/>
+          </p:nvPr>
+        </p:nvSpPr>
+        <p:spPr>
+          <a:xfrm>
+            <a:off x="994087" y="1130603"/>
+            <a:ext cx="3342442" cy="4596794"/>
+          </a:xfrm>
+        </p:spPr>
+        <p:txBody>
+          <a:bodyPr vert="horz" lIns="91440" tIns="45720" rIns="91440" bIns="45720" rtlCol="0" anchor="ctr">
+            <a:normAutofit/>
+          </a:bodyPr>
+          <a:lstStyle/>
+          <a:p>
+            <a:r>
+              <a:rPr lang="en-US" sz="3200" dirty="0">
+                <a:solidFill>
+                  <a:srgbClr val="EBEBEB"/>
+                </a:solidFill>
+              </a:rPr>
+              <a:t>Predicting change</a:t>
+            </a:r>
+          </a:p>
+        </p:txBody>
+      </p:sp>
+      <p:sp>
+        <p:nvSpPr>
+          <p:cNvPr id="3" name="Subtitle 2">
+            <a:extLst>
+              <a:ext uri="{FF2B5EF4-FFF2-40B4-BE49-F238E27FC236}">
+                <a16:creationId xmlns:a16="http://schemas.microsoft.com/office/drawing/2014/main" id="{F2AB0476-65A6-144D-9D00-6F94D146DCD2}"/>
+              </a:ext>
+            </a:extLst>
+          </p:cNvPr>
+          <p:cNvSpPr>
+            <a:spLocks noGrp="1"/>
+          </p:cNvSpPr>
+          <p:nvPr>
+            <p:ph type="subTitle" idx="1"/>
+          </p:nvPr>
+        </p:nvSpPr>
+        <p:spPr>
+          <a:xfrm>
+            <a:off x="5290077" y="437513"/>
+            <a:ext cx="5502614" cy="5954325"/>
+          </a:xfrm>
+        </p:spPr>
+        <p:txBody>
+          <a:bodyPr vert="horz" lIns="91440" tIns="45720" rIns="91440" bIns="45720" rtlCol="0" anchor="ctr">
+            <a:normAutofit/>
+          </a:bodyPr>
+          <a:lstStyle/>
+          <a:p>
+            <a:pPr marL="342900" indent="-342900">
+              <a:buFont typeface="Wingdings 3" charset="2"/>
+              <a:buChar char=""/>
+            </a:pPr>
+            <a:r>
+              <a:rPr lang="en-US" sz="2000" dirty="0">
+                <a:solidFill>
+                  <a:schemeClr val="tx1">
+                    <a:lumMod val="75000"/>
+                    <a:lumOff val="25000"/>
+                  </a:schemeClr>
+                </a:solidFill>
+              </a:rPr>
+              <a:t>Graphs show trend</a:t>
+            </a:r>
+          </a:p>
+          <a:p>
+            <a:pPr marL="342900" indent="-342900">
+              <a:buFont typeface="Wingdings 3" charset="2"/>
+              <a:buChar char=""/>
+            </a:pPr>
+            <a:endParaRPr lang="en-US" sz="2000" dirty="0">
+              <a:solidFill>
+                <a:schemeClr val="tx1">
+                  <a:lumMod val="75000"/>
+                  <a:lumOff val="25000"/>
+                </a:schemeClr>
+              </a:solidFill>
+            </a:endParaRPr>
+          </a:p>
+          <a:p>
+            <a:pPr marL="342900" indent="-342900">
+              <a:buFont typeface="Wingdings 3" charset="2"/>
+              <a:buChar char=""/>
+            </a:pPr>
+            <a:r>
+              <a:rPr lang="en-US" sz="2000" dirty="0">
+                <a:solidFill>
+                  <a:schemeClr val="tx1">
+                    <a:lumMod val="75000"/>
+                    <a:lumOff val="25000"/>
+                  </a:schemeClr>
+                </a:solidFill>
+              </a:rPr>
+              <a:t>Insufficient data to build model</a:t>
+            </a:r>
+          </a:p>
+        </p:txBody>
+      </p:sp>
+    </p:spTree>
+    <p:extLst>
+      <p:ext uri="{BB962C8B-B14F-4D97-AF65-F5344CB8AC3E}">
+        <p14:creationId xmlns:p14="http://schemas.microsoft.com/office/powerpoint/2010/main" val="21497469"/>
       </p:ext>
     </p:extLst>
   </p:cSld>
@@ -18858,6 +21469,16 @@
             <a:r>
               <a:rPr lang="en-US" dirty="0"/>
               <a:t>Change how demographics data is collected</a:t>
+            </a:r>
+          </a:p>
+          <a:p>
+            <a:pPr marL="285750" indent="-285750">
+              <a:buFont typeface="Arial" panose="020B0604020202020204" pitchFamily="34" charset="0"/>
+              <a:buChar char="•"/>
+            </a:pPr>
+            <a:r>
+              <a:rPr lang="en-US" dirty="0"/>
+              <a:t>Collect all data across months, at minimum</a:t>
             </a:r>
           </a:p>
         </p:txBody>

</xml_diff>

<commit_message>
notes in notebook regarding stats
notes in notebook regarding stats for slides needed
</commit_message>
<xml_diff>
--- a/presentation/visit_scotland_presentation.pptx
+++ b/presentation/visit_scotland_presentation.pptx
@@ -891,15 +891,20 @@
           <a:bodyPr/>
           <a:lstStyle/>
           <a:p>
-            <a:r>
-              <a:rPr lang="en-US" dirty="0"/>
-              <a:t>Answer to questions:</a:t>
-            </a:r>
+            <a:endParaRPr lang="en-US" dirty="0"/>
           </a:p>
           <a:p>
             <a:r>
-              <a:rPr lang="en-US" sz="1200" dirty="0"/>
-              <a:t>Which kind of activity generates the most visits to sites?</a:t>
+              <a:rPr lang="en-US" i="1" dirty="0" err="1"/>
+              <a:t>Q:</a:t>
+            </a:r>
+            <a:r>
+              <a:rPr lang="en-US" sz="1200" i="1" dirty="0" err="1"/>
+              <a:t>Which</a:t>
+            </a:r>
+            <a:r>
+              <a:rPr lang="en-US" sz="1200" i="1" dirty="0"/>
+              <a:t> kind of activity generates the most visits to sites?</a:t>
             </a:r>
           </a:p>
           <a:p>
@@ -1098,13 +1103,8 @@
             </a:pPr>
             <a:r>
               <a:rPr lang="en-US" dirty="0"/>
-              <a:t>Trend is one of visits spending more, across fewer visits - but to build an effective and accurate model to predict and explore this. A clear recommendation to change their collection method </a:t>
+              <a:t>Trend is one of visits spending more, across fewer visits - but to build an effective and accurate model to predict and explore this. A clear recommendation to change their collection method to collect monthly. </a:t>
             </a:r>
-            <a:r>
-              <a:rPr lang="en-US"/>
-              <a:t>to collect monthly. </a:t>
-            </a:r>
-            <a:endParaRPr lang="en-US" dirty="0"/>
           </a:p>
           <a:p>
             <a:pPr marL="171450" indent="-171450">

</xml_diff>

<commit_message>
stats for slides 5-8 added
stats for slides 5-8 added, to both notebook and presentation
</commit_message>
<xml_diff>
--- a/presentation/visit_scotland_presentation.pptx
+++ b/presentation/visit_scotland_presentation.pptx
@@ -1885,6 +1885,24 @@
           </a:p>
           <a:p>
             <a:r>
+              <a:rPr lang="en-US" sz="1200" dirty="0"/>
+              <a:t>41% of visits are to cities</a:t>
+            </a:r>
+          </a:p>
+          <a:p>
+            <a:endParaRPr lang="en-US" sz="1200" dirty="0"/>
+          </a:p>
+          <a:p>
+            <a:r>
+              <a:rPr lang="en-US" sz="1200" dirty="0"/>
+              <a:t>68% on average are to urban areas</a:t>
+            </a:r>
+          </a:p>
+          <a:p>
+            <a:endParaRPr lang="en-US" sz="1200" dirty="0"/>
+          </a:p>
+          <a:p>
+            <a:r>
               <a:rPr lang="en-US" sz="1200" i="1" dirty="0"/>
               <a:t>Q: What type of locations receive the most visits? What kinds of locations do people spend the most in?</a:t>
             </a:r>
@@ -1970,6 +1988,12 @@
         <p:txBody>
           <a:bodyPr/>
           <a:lstStyle/>
+          <a:p>
+            <a:r>
+              <a:rPr lang="en-US" i="0" dirty="0"/>
+              <a:t>Hotels are most popular, 66% is the average occupancy – with B&amp;B second at 44%</a:t>
+            </a:r>
+          </a:p>
           <a:p>
             <a:endParaRPr lang="en-US" i="1" dirty="0"/>
           </a:p>
@@ -2070,6 +2094,12 @@
         <p:txBody>
           <a:bodyPr/>
           <a:lstStyle/>
+          <a:p>
+            <a:r>
+              <a:rPr lang="en-US" dirty="0"/>
+              <a:t>As just outlined, the difference between hotels and B&amp;B’s is quite significant when looking overall (20 percentage points) – but when breaking down by urban areas, it is 23% and 18% respectively. </a:t>
+            </a:r>
+          </a:p>
           <a:p>
             <a:endParaRPr lang="en-US" dirty="0"/>
           </a:p>

</xml_diff>

<commit_message>
presentation updated (finished draft)
presentation updated (finished draft) - notes added to notebook
</commit_message>
<xml_diff>
--- a/presentation/visit_scotland_presentation.pptx
+++ b/presentation/visit_scotland_presentation.pptx
@@ -23,8 +23,8 @@
     <p:sldId id="261" r:id="rId14"/>
     <p:sldId id="267" r:id="rId15"/>
     <p:sldId id="288" r:id="rId16"/>
-    <p:sldId id="272" r:id="rId17"/>
-    <p:sldId id="274" r:id="rId18"/>
+    <p:sldId id="274" r:id="rId17"/>
+    <p:sldId id="272" r:id="rId18"/>
     <p:sldId id="275" r:id="rId19"/>
   </p:sldIdLst>
   <p:sldSz cx="12192000" cy="6858000"/>
@@ -899,13 +899,8 @@
           <a:p>
             <a:r>
               <a:rPr lang="en-US" dirty="0"/>
-              <a:t>Eating out accounts for 13409 million – 17.8% of </a:t>
+              <a:t>Eating out accounts for 13409 million – 17.8% of the total</a:t>
             </a:r>
-            <a:r>
-              <a:rPr lang="en-US"/>
-              <a:t>the total</a:t>
-            </a:r>
-            <a:endParaRPr lang="en-US" dirty="0"/>
           </a:p>
           <a:p>
             <a:r>
@@ -1263,7 +1258,7 @@
     </p:spTree>
     <p:extLst>
       <p:ext uri="{BB962C8B-B14F-4D97-AF65-F5344CB8AC3E}">
-        <p14:creationId xmlns:p14="http://schemas.microsoft.com/office/powerpoint/2010/main" val="1445134492"/>
+        <p14:creationId xmlns:p14="http://schemas.microsoft.com/office/powerpoint/2010/main" val="4008326389"/>
       </p:ext>
     </p:extLst>
   </p:cSld>
@@ -1317,16 +1312,6 @@
           <a:bodyPr/>
           <a:lstStyle/>
           <a:p>
-            <a:r>
-              <a:rPr lang="en-US" dirty="0"/>
-              <a:t>Answer to Q:</a:t>
-            </a:r>
-          </a:p>
-          <a:p>
-            <a:r>
-              <a:rPr lang="en-US" sz="1200" dirty="0"/>
-              <a:t>Is there any way to predict spending and visits for Visit Scotland?</a:t>
-            </a:r>
             <a:endParaRPr lang="en-US" dirty="0"/>
           </a:p>
         </p:txBody>
@@ -1357,7 +1342,7 @@
     </p:spTree>
     <p:extLst>
       <p:ext uri="{BB962C8B-B14F-4D97-AF65-F5344CB8AC3E}">
-        <p14:creationId xmlns:p14="http://schemas.microsoft.com/office/powerpoint/2010/main" val="4008326389"/>
+        <p14:creationId xmlns:p14="http://schemas.microsoft.com/office/powerpoint/2010/main" val="1445134492"/>
       </p:ext>
     </p:extLst>
   </p:cSld>
@@ -21417,7 +21402,7 @@
                   </a:schemeClr>
                 </a:solidFill>
               </a:rPr>
-              <a:t>Graphs show trend</a:t>
+              <a:t>Graphs demonstrate trends</a:t>
             </a:r>
           </a:p>
           <a:p>
@@ -21513,7 +21498,7 @@
           <a:p>
             <a:r>
               <a:rPr lang="en-US" sz="4400" dirty="0"/>
-              <a:t>Recommendations</a:t>
+              <a:t>Summary</a:t>
             </a:r>
           </a:p>
         </p:txBody>
@@ -21536,8 +21521,8 @@
         </p:nvSpPr>
         <p:spPr>
           <a:xfrm>
-            <a:off x="1154955" y="2352906"/>
-            <a:ext cx="8825658" cy="3285893"/>
+            <a:off x="1154955" y="2308302"/>
+            <a:ext cx="8825658" cy="3330498"/>
           </a:xfrm>
         </p:spPr>
         <p:txBody>
@@ -21550,7 +21535,7 @@
             </a:pPr>
             <a:r>
               <a:rPr lang="en-US" dirty="0"/>
-              <a:t>Change how demographics data is collected</a:t>
+              <a:t>Majority of visitors have access to / travel by car</a:t>
             </a:r>
           </a:p>
           <a:p>
@@ -21560,7 +21545,57 @@
             </a:pPr>
             <a:r>
               <a:rPr lang="en-US" dirty="0"/>
-              <a:t>Collect all data across months, at minimum</a:t>
+              <a:t>Visitors generally visit urban areas / cities</a:t>
+            </a:r>
+          </a:p>
+          <a:p>
+            <a:pPr marL="285750" indent="-285750">
+              <a:buFont typeface="Arial" panose="020B0604020202020204" pitchFamily="34" charset="0"/>
+              <a:buChar char="•"/>
+            </a:pPr>
+            <a:r>
+              <a:rPr lang="en-US" dirty="0"/>
+              <a:t>Hotels and b&amp;b most popular accommodation</a:t>
+            </a:r>
+          </a:p>
+          <a:p>
+            <a:pPr marL="285750" indent="-285750">
+              <a:buFont typeface="Arial" panose="020B0604020202020204" pitchFamily="34" charset="0"/>
+              <a:buChar char="•"/>
+            </a:pPr>
+            <a:r>
+              <a:rPr lang="en-US" dirty="0"/>
+              <a:t>no children - are married</a:t>
+            </a:r>
+          </a:p>
+          <a:p>
+            <a:pPr marL="285750" indent="-285750">
+              <a:buFont typeface="Arial" panose="020B0604020202020204" pitchFamily="34" charset="0"/>
+              <a:buChar char="•"/>
+            </a:pPr>
+            <a:r>
+              <a:rPr lang="en-US" dirty="0"/>
+              <a:t>16-24 most popular age group, but decreasing</a:t>
+            </a:r>
+          </a:p>
+          <a:p>
+            <a:pPr marL="285750" indent="-285750">
+              <a:buFont typeface="Arial" panose="020B0604020202020204" pitchFamily="34" charset="0"/>
+              <a:buChar char="•"/>
+            </a:pPr>
+            <a:r>
+              <a:rPr lang="en-US" dirty="0"/>
+              <a:t>England higher in spend and nights, but Scotland higher in visits</a:t>
+            </a:r>
+          </a:p>
+          <a:p>
+            <a:pPr marL="285750" indent="-285750">
+              <a:buFont typeface="Arial" panose="020B0604020202020204" pitchFamily="34" charset="0"/>
+              <a:buChar char="•"/>
+            </a:pPr>
+            <a:r>
+              <a:rPr lang="en-US" dirty="0"/>
+              <a:t>Most common activities: eating out, visiting friends/family</a:t>
             </a:r>
           </a:p>
         </p:txBody>
@@ -21568,7 +21603,7 @@
     </p:spTree>
     <p:extLst>
       <p:ext uri="{BB962C8B-B14F-4D97-AF65-F5344CB8AC3E}">
-        <p14:creationId xmlns:p14="http://schemas.microsoft.com/office/powerpoint/2010/main" val="536200534"/>
+        <p14:creationId xmlns:p14="http://schemas.microsoft.com/office/powerpoint/2010/main" val="550171486"/>
       </p:ext>
     </p:extLst>
   </p:cSld>
@@ -21625,7 +21660,7 @@
           <a:p>
             <a:r>
               <a:rPr lang="en-US" sz="4400" dirty="0"/>
-              <a:t>Summary</a:t>
+              <a:t>Recommendations</a:t>
             </a:r>
           </a:p>
         </p:txBody>
@@ -21648,22 +21683,84 @@
         </p:nvSpPr>
         <p:spPr>
           <a:xfrm>
-            <a:off x="1154955" y="2308302"/>
-            <a:ext cx="8825658" cy="3330498"/>
+            <a:off x="1154955" y="2352906"/>
+            <a:ext cx="8825658" cy="3285893"/>
           </a:xfrm>
         </p:spPr>
         <p:txBody>
-          <a:bodyPr/>
+          <a:bodyPr>
+            <a:normAutofit/>
+          </a:bodyPr>
           <a:lstStyle/>
           <a:p>
-            <a:endParaRPr lang="en-US"/>
+            <a:pPr marL="285750" indent="-285750">
+              <a:buFont typeface="Arial" panose="020B0604020202020204" pitchFamily="34" charset="0"/>
+              <a:buChar char="•"/>
+            </a:pPr>
+            <a:r>
+              <a:rPr lang="en-US" dirty="0"/>
+              <a:t>Confidently Promote remote locations</a:t>
+            </a:r>
+          </a:p>
+          <a:p>
+            <a:pPr marL="285750" indent="-285750">
+              <a:buFont typeface="Arial" panose="020B0604020202020204" pitchFamily="34" charset="0"/>
+              <a:buChar char="•"/>
+            </a:pPr>
+            <a:r>
+              <a:rPr lang="en-US" dirty="0"/>
+              <a:t>Develop partnerships with b&amp;b providers</a:t>
+            </a:r>
+          </a:p>
+          <a:p>
+            <a:pPr marL="285750" indent="-285750">
+              <a:buFont typeface="Arial" panose="020B0604020202020204" pitchFamily="34" charset="0"/>
+              <a:buChar char="•"/>
+            </a:pPr>
+            <a:r>
+              <a:rPr lang="en-US" dirty="0"/>
+              <a:t>Focus on urban areas</a:t>
+            </a:r>
+          </a:p>
+          <a:p>
+            <a:pPr marL="285750" indent="-285750">
+              <a:buFont typeface="Arial" panose="020B0604020202020204" pitchFamily="34" charset="0"/>
+              <a:buChar char="•"/>
+            </a:pPr>
+            <a:r>
+              <a:rPr lang="en-US" dirty="0"/>
+              <a:t>Target elder age groups</a:t>
+            </a:r>
+          </a:p>
+          <a:p>
+            <a:endParaRPr lang="en-US" b="1" dirty="0"/>
+          </a:p>
+          <a:p>
+            <a:pPr marL="285750" indent="-285750">
+              <a:buFont typeface="Arial" panose="020B0604020202020204" pitchFamily="34" charset="0"/>
+              <a:buChar char="•"/>
+            </a:pPr>
+            <a:r>
+              <a:rPr lang="en-US" dirty="0"/>
+              <a:t>Develop the questions asked for demographics</a:t>
+            </a:r>
+          </a:p>
+          <a:p>
+            <a:pPr marL="285750" indent="-285750">
+              <a:buFont typeface="Arial" panose="020B0604020202020204" pitchFamily="34" charset="0"/>
+              <a:buChar char="•"/>
+            </a:pPr>
+            <a:r>
+              <a:rPr lang="en-US" dirty="0"/>
+              <a:t>Collect data more frequently  </a:t>
+            </a:r>
           </a:p>
         </p:txBody>
       </p:sp>
     </p:spTree>
     <p:extLst>
       <p:ext uri="{BB962C8B-B14F-4D97-AF65-F5344CB8AC3E}">
-        <p14:creationId xmlns:p14="http://schemas.microsoft.com/office/powerpoint/2010/main" val="550171486"/>
+        <p14:creationId xmlns:p14="http://schemas.microsoft.com/office/powerpoint/2010/main" val="536200534"/>
       </p:ext>
     </p:extLst>
   </p:cSld>
@@ -21676,6 +21773,14 @@
 <file path=ppt/slides/slide18.xml><?xml version="1.0" encoding="utf-8"?>
 <p:sld xmlns:a="http://schemas.openxmlformats.org/drawingml/2006/main" xmlns:r="http://schemas.openxmlformats.org/officeDocument/2006/relationships" xmlns:p="http://schemas.openxmlformats.org/presentationml/2006/main">
   <p:cSld>
+    <p:bg>
+      <p:bgPr>
+        <a:solidFill>
+          <a:schemeClr val="bg1"/>
+        </a:solidFill>
+        <a:effectLst/>
+      </p:bgPr>
+    </p:bg>
     <p:spTree>
       <p:nvGrpSpPr>
         <p:cNvPr id="1" name=""/>
@@ -21708,49 +21813,511 @@
         </p:nvSpPr>
         <p:spPr>
           <a:xfrm>
-            <a:off x="1069848" y="1298448"/>
-            <a:ext cx="7315200" cy="914400"/>
+            <a:off x="7007145" y="1241266"/>
+            <a:ext cx="4535926" cy="3153753"/>
           </a:xfrm>
         </p:spPr>
         <p:txBody>
           <a:bodyPr>
-            <a:noAutofit/>
+            <a:normAutofit/>
           </a:bodyPr>
           <a:lstStyle/>
           <a:p>
             <a:r>
-              <a:rPr lang="en-US" sz="4400"/>
+              <a:rPr lang="en-US">
+                <a:solidFill>
+                  <a:srgbClr val="EBEBEB"/>
+                </a:solidFill>
+              </a:rPr>
               <a:t>Questions?</a:t>
             </a:r>
-            <a:endParaRPr lang="en-US" sz="4400" dirty="0"/>
           </a:p>
         </p:txBody>
       </p:sp>
-      <p:sp>
-        <p:nvSpPr>
-          <p:cNvPr id="3" name="Subtitle 2">
+      <p:grpSp>
+        <p:nvGrpSpPr>
+          <p:cNvPr id="9" name="Group 8">
             <a:extLst>
               <a:ext uri="{FF2B5EF4-FFF2-40B4-BE49-F238E27FC236}">
-                <a16:creationId xmlns:a16="http://schemas.microsoft.com/office/drawing/2014/main" id="{F2AB0476-65A6-144D-9D00-6F94D146DCD2}"/>
+                <a16:creationId xmlns:a16="http://schemas.microsoft.com/office/drawing/2014/main" id="{7E2D86BB-893F-471B-AD66-50E01777C082}"/>
+              </a:ext>
+              <a:ext uri="{C183D7F6-B498-43B3-948B-1728B52AA6E4}">
+                <adec:decorative xmlns:adec="http://schemas.microsoft.com/office/drawing/2017/decorative" val="1"/>
               </a:ext>
             </a:extLst>
           </p:cNvPr>
-          <p:cNvSpPr>
-            <a:spLocks noGrp="1"/>
-          </p:cNvSpPr>
+          <p:cNvGrpSpPr>
+            <a:grpSpLocks noGrp="1" noUngrp="1" noRot="1" noChangeAspect="1" noMove="1" noResize="1"/>
+          </p:cNvGrpSpPr>
           <p:nvPr>
-            <p:ph type="subTitle" idx="1"/>
+            <p:extLst>
+              <p:ext uri="{386F3935-93C4-4BCD-93E2-E3B085C9AB24}">
+                <p16:designElem xmlns:p16="http://schemas.microsoft.com/office/powerpoint/2015/main" val="1"/>
+              </p:ext>
+            </p:extLst>
           </p:nvPr>
-        </p:nvSpPr>
-        <p:spPr/>
-        <p:txBody>
-          <a:bodyPr/>
-          <a:lstStyle/>
-          <a:p>
-            <a:endParaRPr lang="en-US"/>
-          </a:p>
-        </p:txBody>
-      </p:sp>
+        </p:nvGrpSpPr>
+        <p:grpSpPr>
+          <a:xfrm>
+            <a:off x="423333" y="396837"/>
+            <a:ext cx="6451503" cy="6058999"/>
+            <a:chOff x="423333" y="396837"/>
+            <a:chExt cx="6451503" cy="6058999"/>
+          </a:xfrm>
+        </p:grpSpPr>
+        <p:sp>
+          <p:nvSpPr>
+            <p:cNvPr id="10" name="Rectangle 9">
+              <a:extLst>
+                <a:ext uri="{FF2B5EF4-FFF2-40B4-BE49-F238E27FC236}">
+                  <a16:creationId xmlns:a16="http://schemas.microsoft.com/office/drawing/2014/main" id="{61E3F80D-79C6-468A-83E4-3FEA585566FA}"/>
+                </a:ext>
+                <a:ext uri="{C183D7F6-B498-43B3-948B-1728B52AA6E4}">
+                  <adec:decorative xmlns:adec="http://schemas.microsoft.com/office/drawing/2017/decorative" val="1"/>
+                </a:ext>
+              </a:extLst>
+            </p:cNvPr>
+            <p:cNvSpPr/>
+            <p:nvPr>
+              <p:extLst>
+                <p:ext uri="{386F3935-93C4-4BCD-93E2-E3B085C9AB24}">
+                  <p16:designElem xmlns:p16="http://schemas.microsoft.com/office/powerpoint/2015/main" val="1"/>
+                </p:ext>
+              </p:extLst>
+            </p:nvPr>
+          </p:nvSpPr>
+          <p:spPr bwMode="gray">
+            <a:xfrm flipH="1">
+              <a:off x="423333" y="402165"/>
+              <a:ext cx="5229339" cy="6053670"/>
+            </a:xfrm>
+            <a:prstGeom prst="rect">
+              <a:avLst/>
+            </a:prstGeom>
+            <a:solidFill>
+              <a:schemeClr val="bg1"/>
+            </a:solidFill>
+            <a:ln>
+              <a:noFill/>
+            </a:ln>
+            <a:effectLst/>
+          </p:spPr>
+          <p:style>
+            <a:lnRef idx="1">
+              <a:schemeClr val="accent1"/>
+            </a:lnRef>
+            <a:fillRef idx="3">
+              <a:schemeClr val="accent1"/>
+            </a:fillRef>
+            <a:effectRef idx="2">
+              <a:schemeClr val="accent1"/>
+            </a:effectRef>
+            <a:fontRef idx="minor">
+              <a:schemeClr val="lt1"/>
+            </a:fontRef>
+          </p:style>
+        </p:sp>
+        <p:sp>
+          <p:nvSpPr>
+            <p:cNvPr id="11" name="Freeform 5">
+              <a:extLst>
+                <a:ext uri="{FF2B5EF4-FFF2-40B4-BE49-F238E27FC236}">
+                  <a16:creationId xmlns:a16="http://schemas.microsoft.com/office/drawing/2014/main" id="{009504C1-96CE-44B4-8DF0-613CF9D1DABE}"/>
+                </a:ext>
+                <a:ext uri="{C183D7F6-B498-43B3-948B-1728B52AA6E4}">
+                  <adec:decorative xmlns:adec="http://schemas.microsoft.com/office/drawing/2017/decorative" val="1"/>
+                </a:ext>
+              </a:extLst>
+            </p:cNvPr>
+            <p:cNvSpPr/>
+            <p:nvPr>
+              <p:extLst>
+                <p:ext uri="{386F3935-93C4-4BCD-93E2-E3B085C9AB24}">
+                  <p16:designElem xmlns:p16="http://schemas.microsoft.com/office/powerpoint/2015/main" val="1"/>
+                </p:ext>
+              </p:extLst>
+            </p:nvPr>
+          </p:nvSpPr>
+          <p:spPr bwMode="gray">
+            <a:xfrm rot="5400000" flipH="1">
+              <a:off x="3161515" y="2801722"/>
+              <a:ext cx="6053670" cy="1254558"/>
+            </a:xfrm>
+            <a:custGeom>
+              <a:avLst/>
+              <a:gdLst/>
+              <a:ahLst/>
+              <a:cxnLst/>
+              <a:rect l="l" t="t" r="r" b="b"/>
+              <a:pathLst>
+                <a:path w="10000" h="8000">
+                  <a:moveTo>
+                    <a:pt x="0" y="0"/>
+                  </a:moveTo>
+                  <a:lnTo>
+                    <a:pt x="0" y="7970"/>
+                  </a:lnTo>
+                  <a:lnTo>
+                    <a:pt x="10000" y="8000"/>
+                  </a:lnTo>
+                  <a:lnTo>
+                    <a:pt x="10000" y="7"/>
+                  </a:lnTo>
+                  <a:lnTo>
+                    <a:pt x="10000" y="7"/>
+                  </a:lnTo>
+                  <a:lnTo>
+                    <a:pt x="9773" y="156"/>
+                  </a:lnTo>
+                  <a:lnTo>
+                    <a:pt x="9547" y="298"/>
+                  </a:lnTo>
+                  <a:lnTo>
+                    <a:pt x="9320" y="437"/>
+                  </a:lnTo>
+                  <a:lnTo>
+                    <a:pt x="9092" y="556"/>
+                  </a:lnTo>
+                  <a:lnTo>
+                    <a:pt x="8865" y="676"/>
+                  </a:lnTo>
+                  <a:lnTo>
+                    <a:pt x="8637" y="788"/>
+                  </a:lnTo>
+                  <a:lnTo>
+                    <a:pt x="8412" y="884"/>
+                  </a:lnTo>
+                  <a:lnTo>
+                    <a:pt x="8184" y="975"/>
+                  </a:lnTo>
+                  <a:lnTo>
+                    <a:pt x="7957" y="1058"/>
+                  </a:lnTo>
+                  <a:lnTo>
+                    <a:pt x="7734" y="1130"/>
+                  </a:lnTo>
+                  <a:lnTo>
+                    <a:pt x="7508" y="1202"/>
+                  </a:lnTo>
+                  <a:lnTo>
+                    <a:pt x="7285" y="1262"/>
+                  </a:lnTo>
+                  <a:lnTo>
+                    <a:pt x="7062" y="1309"/>
+                  </a:lnTo>
+                  <a:lnTo>
+                    <a:pt x="6840" y="1358"/>
+                  </a:lnTo>
+                  <a:lnTo>
+                    <a:pt x="6620" y="1399"/>
+                  </a:lnTo>
+                  <a:lnTo>
+                    <a:pt x="6402" y="1428"/>
+                  </a:lnTo>
+                  <a:lnTo>
+                    <a:pt x="6184" y="1453"/>
+                  </a:lnTo>
+                  <a:lnTo>
+                    <a:pt x="5968" y="1477"/>
+                  </a:lnTo>
+                  <a:lnTo>
+                    <a:pt x="5755" y="1488"/>
+                  </a:lnTo>
+                  <a:lnTo>
+                    <a:pt x="5542" y="1500"/>
+                  </a:lnTo>
+                  <a:lnTo>
+                    <a:pt x="5332" y="1506"/>
+                  </a:lnTo>
+                  <a:lnTo>
+                    <a:pt x="5124" y="1500"/>
+                  </a:lnTo>
+                  <a:lnTo>
+                    <a:pt x="4918" y="1500"/>
+                  </a:lnTo>
+                  <a:lnTo>
+                    <a:pt x="4714" y="1488"/>
+                  </a:lnTo>
+                  <a:lnTo>
+                    <a:pt x="4514" y="1470"/>
+                  </a:lnTo>
+                  <a:lnTo>
+                    <a:pt x="4316" y="1453"/>
+                  </a:lnTo>
+                  <a:lnTo>
+                    <a:pt x="4122" y="1434"/>
+                  </a:lnTo>
+                  <a:lnTo>
+                    <a:pt x="3929" y="1405"/>
+                  </a:lnTo>
+                  <a:lnTo>
+                    <a:pt x="3739" y="1374"/>
+                  </a:lnTo>
+                  <a:lnTo>
+                    <a:pt x="3553" y="1346"/>
+                  </a:lnTo>
+                  <a:lnTo>
+                    <a:pt x="3190" y="1267"/>
+                  </a:lnTo>
+                  <a:lnTo>
+                    <a:pt x="2842" y="1183"/>
+                  </a:lnTo>
+                  <a:lnTo>
+                    <a:pt x="2508" y="1095"/>
+                  </a:lnTo>
+                  <a:lnTo>
+                    <a:pt x="2192" y="998"/>
+                  </a:lnTo>
+                  <a:lnTo>
+                    <a:pt x="1890" y="897"/>
+                  </a:lnTo>
+                  <a:lnTo>
+                    <a:pt x="1610" y="788"/>
+                  </a:lnTo>
+                  <a:lnTo>
+                    <a:pt x="1347" y="681"/>
+                  </a:lnTo>
+                  <a:lnTo>
+                    <a:pt x="1105" y="574"/>
+                  </a:lnTo>
+                  <a:lnTo>
+                    <a:pt x="883" y="473"/>
+                  </a:lnTo>
+                  <a:lnTo>
+                    <a:pt x="686" y="377"/>
+                  </a:lnTo>
+                  <a:lnTo>
+                    <a:pt x="508" y="286"/>
+                  </a:lnTo>
+                  <a:lnTo>
+                    <a:pt x="358" y="210"/>
+                  </a:lnTo>
+                  <a:lnTo>
+                    <a:pt x="232" y="138"/>
+                  </a:lnTo>
+                  <a:lnTo>
+                    <a:pt x="59" y="35"/>
+                  </a:lnTo>
+                  <a:lnTo>
+                    <a:pt x="0" y="0"/>
+                  </a:lnTo>
+                  <a:lnTo>
+                    <a:pt x="0" y="0"/>
+                  </a:lnTo>
+                  <a:close/>
+                </a:path>
+              </a:pathLst>
+            </a:custGeom>
+            <a:solidFill>
+              <a:schemeClr val="bg1"/>
+            </a:solidFill>
+            <a:ln>
+              <a:noFill/>
+            </a:ln>
+          </p:spPr>
+        </p:sp>
+        <p:sp>
+          <p:nvSpPr>
+            <p:cNvPr id="12" name="Freeform 5">
+              <a:extLst>
+                <a:ext uri="{FF2B5EF4-FFF2-40B4-BE49-F238E27FC236}">
+                  <a16:creationId xmlns:a16="http://schemas.microsoft.com/office/drawing/2014/main" id="{1F299836-4C10-4395-B386-C0FA537C417E}"/>
+                </a:ext>
+                <a:ext uri="{C183D7F6-B498-43B3-948B-1728B52AA6E4}">
+                  <adec:decorative xmlns:adec="http://schemas.microsoft.com/office/drawing/2017/decorative" val="1"/>
+                </a:ext>
+              </a:extLst>
+            </p:cNvPr>
+            <p:cNvSpPr/>
+            <p:nvPr>
+              <p:extLst>
+                <p:ext uri="{386F3935-93C4-4BCD-93E2-E3B085C9AB24}">
+                  <p16:designElem xmlns:p16="http://schemas.microsoft.com/office/powerpoint/2015/main" val="1"/>
+                </p:ext>
+              </p:extLst>
+            </p:nvPr>
+          </p:nvSpPr>
+          <p:spPr bwMode="gray">
+            <a:xfrm rot="5677511" flipH="1">
+              <a:off x="5004670" y="1826079"/>
+              <a:ext cx="3299407" cy="440924"/>
+            </a:xfrm>
+            <a:custGeom>
+              <a:avLst/>
+              <a:gdLst/>
+              <a:ahLst/>
+              <a:cxnLst/>
+              <a:rect l="l" t="t" r="r" b="b"/>
+              <a:pathLst>
+                <a:path w="10000" h="5291">
+                  <a:moveTo>
+                    <a:pt x="85" y="2532"/>
+                  </a:moveTo>
+                  <a:cubicBezTo>
+                    <a:pt x="1736" y="3911"/>
+                    <a:pt x="7524" y="5298"/>
+                    <a:pt x="9958" y="5291"/>
+                  </a:cubicBezTo>
+                  <a:cubicBezTo>
+                    <a:pt x="9989" y="1958"/>
+                    <a:pt x="9969" y="3333"/>
+                    <a:pt x="10000" y="0"/>
+                  </a:cubicBezTo>
+                  <a:lnTo>
+                    <a:pt x="10000" y="0"/>
+                  </a:lnTo>
+                  <a:lnTo>
+                    <a:pt x="9667" y="204"/>
+                  </a:lnTo>
+                  <a:lnTo>
+                    <a:pt x="9334" y="400"/>
+                  </a:lnTo>
+                  <a:lnTo>
+                    <a:pt x="9001" y="590"/>
+                  </a:lnTo>
+                  <a:lnTo>
+                    <a:pt x="8667" y="753"/>
+                  </a:lnTo>
+                  <a:lnTo>
+                    <a:pt x="8333" y="917"/>
+                  </a:lnTo>
+                  <a:lnTo>
+                    <a:pt x="7999" y="1071"/>
+                  </a:lnTo>
+                  <a:lnTo>
+                    <a:pt x="7669" y="1202"/>
+                  </a:lnTo>
+                  <a:lnTo>
+                    <a:pt x="7333" y="1325"/>
+                  </a:lnTo>
+                  <a:lnTo>
+                    <a:pt x="7000" y="1440"/>
+                  </a:lnTo>
+                  <a:lnTo>
+                    <a:pt x="6673" y="1538"/>
+                  </a:lnTo>
+                  <a:lnTo>
+                    <a:pt x="6340" y="1636"/>
+                  </a:lnTo>
+                  <a:lnTo>
+                    <a:pt x="6013" y="1719"/>
+                  </a:lnTo>
+                  <a:lnTo>
+                    <a:pt x="5686" y="1784"/>
+                  </a:lnTo>
+                  <a:lnTo>
+                    <a:pt x="5359" y="1850"/>
+                  </a:lnTo>
+                  <a:lnTo>
+                    <a:pt x="5036" y="1906"/>
+                  </a:lnTo>
+                  <a:lnTo>
+                    <a:pt x="4717" y="1948"/>
+                  </a:lnTo>
+                  <a:lnTo>
+                    <a:pt x="4396" y="1980"/>
+                  </a:lnTo>
+                  <a:lnTo>
+                    <a:pt x="4079" y="2013"/>
+                  </a:lnTo>
+                  <a:lnTo>
+                    <a:pt x="3766" y="2029"/>
+                  </a:lnTo>
+                  <a:lnTo>
+                    <a:pt x="3454" y="2046"/>
+                  </a:lnTo>
+                  <a:lnTo>
+                    <a:pt x="3145" y="2053"/>
+                  </a:lnTo>
+                  <a:lnTo>
+                    <a:pt x="2839" y="2046"/>
+                  </a:lnTo>
+                  <a:lnTo>
+                    <a:pt x="2537" y="2046"/>
+                  </a:lnTo>
+                  <a:lnTo>
+                    <a:pt x="2238" y="2029"/>
+                  </a:lnTo>
+                  <a:lnTo>
+                    <a:pt x="1943" y="2004"/>
+                  </a:lnTo>
+                  <a:lnTo>
+                    <a:pt x="1653" y="1980"/>
+                  </a:lnTo>
+                  <a:lnTo>
+                    <a:pt x="1368" y="1955"/>
+                  </a:lnTo>
+                  <a:lnTo>
+                    <a:pt x="1085" y="1915"/>
+                  </a:lnTo>
+                  <a:lnTo>
+                    <a:pt x="806" y="1873"/>
+                  </a:lnTo>
+                  <a:lnTo>
+                    <a:pt x="533" y="1833"/>
+                  </a:lnTo>
+                  <a:lnTo>
+                    <a:pt x="0" y="1726"/>
+                  </a:lnTo>
+                  <a:cubicBezTo>
+                    <a:pt x="28" y="1995"/>
+                    <a:pt x="57" y="2263"/>
+                    <a:pt x="85" y="2532"/>
+                  </a:cubicBezTo>
+                  <a:close/>
+                </a:path>
+              </a:pathLst>
+            </a:custGeom>
+            <a:solidFill>
+              <a:schemeClr val="bg1">
+                <a:alpha val="20000"/>
+              </a:schemeClr>
+            </a:solidFill>
+            <a:ln>
+              <a:noFill/>
+            </a:ln>
+          </p:spPr>
+        </p:sp>
+      </p:grpSp>
+      <p:pic>
+        <p:nvPicPr>
+          <p:cNvPr id="6" name="Graphic 5" descr="Question mark">
+            <a:extLst>
+              <a:ext uri="{FF2B5EF4-FFF2-40B4-BE49-F238E27FC236}">
+                <a16:creationId xmlns:a16="http://schemas.microsoft.com/office/drawing/2014/main" id="{B75C180F-4EEC-4612-8A1E-4C7AD83CC3C2}"/>
+              </a:ext>
+            </a:extLst>
+          </p:cNvPr>
+          <p:cNvPicPr>
+            <a:picLocks noChangeAspect="1"/>
+          </p:cNvPicPr>
+          <p:nvPr/>
+        </p:nvPicPr>
+        <p:blipFill>
+          <a:blip r:embed="rId3">
+            <a:extLst>
+              <a:ext uri="{28A0092B-C50C-407E-A947-70E740481C1C}">
+                <a14:useLocalDpi xmlns:a14="http://schemas.microsoft.com/office/drawing/2010/main" val="0"/>
+              </a:ext>
+              <a:ext uri="{96DAC541-7B7A-43D3-8B79-37D633B846F1}">
+                <asvg:svgBlip xmlns:asvg="http://schemas.microsoft.com/office/drawing/2016/SVG/main" r:embed="rId4"/>
+              </a:ext>
+            </a:extLst>
+          </a:blip>
+          <a:stretch>
+            <a:fillRect/>
+          </a:stretch>
+        </p:blipFill>
+        <p:spPr>
+          <a:xfrm>
+            <a:off x="1287252" y="1114621"/>
+            <a:ext cx="4628758" cy="4628758"/>
+          </a:xfrm>
+          <a:prstGeom prst="rect">
+            <a:avLst/>
+          </a:prstGeom>
+        </p:spPr>
+      </p:pic>
     </p:spTree>
     <p:extLst>
       <p:ext uri="{BB962C8B-B14F-4D97-AF65-F5344CB8AC3E}">
@@ -25142,7 +25709,7 @@
                   <a:schemeClr val="tx1"/>
                 </a:solidFill>
               </a:rPr>
-              <a:t>9 questions around 6 key areas</a:t>
+              <a:t>9 questions around 6 datasets</a:t>
             </a:r>
           </a:p>
         </p:txBody>
@@ -25187,10 +25754,10 @@
       </p:grpSpPr>
       <p:sp>
         <p:nvSpPr>
-          <p:cNvPr id="76" name="Rectangle 67">
+          <p:cNvPr id="84" name="Rectangle 83">
             <a:extLst>
               <a:ext uri="{FF2B5EF4-FFF2-40B4-BE49-F238E27FC236}">
-                <a16:creationId xmlns:a16="http://schemas.microsoft.com/office/drawing/2014/main" id="{4D564D1C-BBBA-41AB-8D3D-65E6513686EA}"/>
+                <a16:creationId xmlns:a16="http://schemas.microsoft.com/office/drawing/2014/main" id="{1B9CC3E5-EA42-4393-A2C0-5192B91BD745}"/>
               </a:ext>
               <a:ext uri="{C183D7F6-B498-43B3-948B-1728B52AA6E4}">
                 <adec:decorative xmlns:adec="http://schemas.microsoft.com/office/drawing/2017/decorative" val="1"/>
@@ -25248,12 +25815,45 @@
           </a:p>
         </p:txBody>
       </p:sp>
+      <p:pic>
+        <p:nvPicPr>
+          <p:cNvPr id="7" name="Picture 6" descr="Chart&#10;&#10;Description automatically generated">
+            <a:extLst>
+              <a:ext uri="{FF2B5EF4-FFF2-40B4-BE49-F238E27FC236}">
+                <a16:creationId xmlns:a16="http://schemas.microsoft.com/office/drawing/2014/main" id="{06360CCE-C34C-B841-963B-ACC0F53874DF}"/>
+              </a:ext>
+            </a:extLst>
+          </p:cNvPr>
+          <p:cNvPicPr>
+            <a:picLocks noChangeAspect="1"/>
+          </p:cNvPicPr>
+          <p:nvPr/>
+        </p:nvPicPr>
+        <p:blipFill>
+          <a:blip r:embed="rId3"/>
+          <a:stretch>
+            <a:fillRect/>
+          </a:stretch>
+        </p:blipFill>
+        <p:spPr>
+          <a:xfrm>
+            <a:off x="561110" y="511836"/>
+            <a:ext cx="5448111" cy="3364208"/>
+          </a:xfrm>
+          <a:prstGeom prst="roundRect">
+            <a:avLst>
+              <a:gd name="adj" fmla="val 0"/>
+            </a:avLst>
+          </a:prstGeom>
+          <a:effectLst/>
+        </p:spPr>
+      </p:pic>
       <p:sp>
         <p:nvSpPr>
-          <p:cNvPr id="77" name="Rectangle 69">
+          <p:cNvPr id="86" name="Rectangle 85">
             <a:extLst>
               <a:ext uri="{FF2B5EF4-FFF2-40B4-BE49-F238E27FC236}">
-                <a16:creationId xmlns:a16="http://schemas.microsoft.com/office/drawing/2014/main" id="{4D63F519-D67F-403F-938E-102A5A37D900}"/>
+                <a16:creationId xmlns:a16="http://schemas.microsoft.com/office/drawing/2014/main" id="{FB8DBC8E-FBA7-466C-8D97-75B15FBE9048}"/>
               </a:ext>
               <a:ext uri="{C183D7F6-B498-43B3-948B-1728B52AA6E4}">
                 <adec:decorative xmlns:adec="http://schemas.microsoft.com/office/drawing/2017/decorative" val="1"/>
@@ -25301,12 +25901,45 @@
           </a:fontRef>
         </p:style>
       </p:sp>
+      <p:pic>
+        <p:nvPicPr>
+          <p:cNvPr id="8" name="Picture 7" descr="Chart, bar chart&#10;&#10;Description automatically generated">
+            <a:extLst>
+              <a:ext uri="{FF2B5EF4-FFF2-40B4-BE49-F238E27FC236}">
+                <a16:creationId xmlns:a16="http://schemas.microsoft.com/office/drawing/2014/main" id="{72352342-1F3A-0646-9C07-BA2F38F66AF0}"/>
+              </a:ext>
+            </a:extLst>
+          </p:cNvPr>
+          <p:cNvPicPr>
+            <a:picLocks noChangeAspect="1"/>
+          </p:cNvPicPr>
+          <p:nvPr/>
+        </p:nvPicPr>
+        <p:blipFill>
+          <a:blip r:embed="rId4"/>
+          <a:stretch>
+            <a:fillRect/>
+          </a:stretch>
+        </p:blipFill>
+        <p:spPr>
+          <a:xfrm>
+            <a:off x="6172946" y="535121"/>
+            <a:ext cx="5370123" cy="3316051"/>
+          </a:xfrm>
+          <a:prstGeom prst="roundRect">
+            <a:avLst>
+              <a:gd name="adj" fmla="val 0"/>
+            </a:avLst>
+          </a:prstGeom>
+          <a:effectLst/>
+        </p:spPr>
+      </p:pic>
       <p:sp>
         <p:nvSpPr>
-          <p:cNvPr id="78" name="Freeform: Shape 71">
+          <p:cNvPr id="88" name="Freeform: Shape 87">
             <a:extLst>
               <a:ext uri="{FF2B5EF4-FFF2-40B4-BE49-F238E27FC236}">
-                <a16:creationId xmlns:a16="http://schemas.microsoft.com/office/drawing/2014/main" id="{0690B2E9-00B3-4554-8C5C-2D5134ADF40E}"/>
+                <a16:creationId xmlns:a16="http://schemas.microsoft.com/office/drawing/2014/main" id="{E6FFF64E-1FE4-4AE0-9D62-567AA183C128}"/>
               </a:ext>
               <a:ext uri="{C183D7F6-B498-43B3-948B-1728B52AA6E4}">
                 <adec:decorative xmlns:adec="http://schemas.microsoft.com/office/drawing/2017/decorative" val="1"/>
@@ -25760,10 +26393,10 @@
       </p:sp>
       <p:sp>
         <p:nvSpPr>
-          <p:cNvPr id="79" name="Freeform 5">
+          <p:cNvPr id="90" name="Freeform 5">
             <a:extLst>
               <a:ext uri="{FF2B5EF4-FFF2-40B4-BE49-F238E27FC236}">
-                <a16:creationId xmlns:a16="http://schemas.microsoft.com/office/drawing/2014/main" id="{25225EF6-7666-40A5-813B-4BE52C749418}"/>
+                <a16:creationId xmlns:a16="http://schemas.microsoft.com/office/drawing/2014/main" id="{9C80E52D-DE5C-4267-9C99-8741F2E42E36}"/>
               </a:ext>
               <a:ext uri="{C183D7F6-B498-43B3-948B-1728B52AA6E4}">
                 <adec:decorative xmlns:adec="http://schemas.microsoft.com/office/drawing/2017/decorative" val="1"/>
@@ -25940,8 +26573,8 @@
         </p:nvSpPr>
         <p:spPr>
           <a:xfrm>
-            <a:off x="649976" y="4174067"/>
-            <a:ext cx="10893094" cy="1481440"/>
+            <a:off x="649975" y="4517136"/>
+            <a:ext cx="10893095" cy="1174947"/>
           </a:xfrm>
         </p:spPr>
         <p:txBody>
@@ -25950,80 +26583,13 @@
           </a:bodyPr>
           <a:lstStyle/>
           <a:p>
-            <a:pPr algn="ctr"/>
             <a:r>
-              <a:rPr lang="en-US" sz="7200"/>
+              <a:rPr lang="en-US" sz="6000"/>
               <a:t>Transport</a:t>
             </a:r>
           </a:p>
         </p:txBody>
       </p:sp>
-      <p:pic>
-        <p:nvPicPr>
-          <p:cNvPr id="8" name="Picture 7">
-            <a:extLst>
-              <a:ext uri="{FF2B5EF4-FFF2-40B4-BE49-F238E27FC236}">
-                <a16:creationId xmlns:a16="http://schemas.microsoft.com/office/drawing/2014/main" id="{72352342-1F3A-0646-9C07-BA2F38F66AF0}"/>
-              </a:ext>
-            </a:extLst>
-          </p:cNvPr>
-          <p:cNvPicPr>
-            <a:picLocks noChangeAspect="1"/>
-          </p:cNvPicPr>
-          <p:nvPr/>
-        </p:nvPicPr>
-        <p:blipFill>
-          <a:blip r:embed="rId3"/>
-          <a:stretch>
-            <a:fillRect/>
-          </a:stretch>
-        </p:blipFill>
-        <p:spPr>
-          <a:xfrm>
-            <a:off x="6502805" y="1202493"/>
-            <a:ext cx="3775725" cy="2331510"/>
-          </a:xfrm>
-          <a:prstGeom prst="roundRect">
-            <a:avLst>
-              <a:gd name="adj" fmla="val 1858"/>
-            </a:avLst>
-          </a:prstGeom>
-          <a:effectLst/>
-        </p:spPr>
-      </p:pic>
-      <p:pic>
-        <p:nvPicPr>
-          <p:cNvPr id="7" name="Picture 6">
-            <a:extLst>
-              <a:ext uri="{FF2B5EF4-FFF2-40B4-BE49-F238E27FC236}">
-                <a16:creationId xmlns:a16="http://schemas.microsoft.com/office/drawing/2014/main" id="{06360CCE-C34C-B841-963B-ACC0F53874DF}"/>
-              </a:ext>
-            </a:extLst>
-          </p:cNvPr>
-          <p:cNvPicPr>
-            <a:picLocks noChangeAspect="1"/>
-          </p:cNvPicPr>
-          <p:nvPr/>
-        </p:nvPicPr>
-        <p:blipFill>
-          <a:blip r:embed="rId4"/>
-          <a:stretch>
-            <a:fillRect/>
-          </a:stretch>
-        </p:blipFill>
-        <p:spPr>
-          <a:xfrm>
-            <a:off x="1913470" y="1073979"/>
-            <a:ext cx="4182530" cy="2582712"/>
-          </a:xfrm>
-          <a:prstGeom prst="roundRect">
-            <a:avLst>
-              <a:gd name="adj" fmla="val 1858"/>
-            </a:avLst>
-          </a:prstGeom>
-          <a:effectLst/>
-        </p:spPr>
-      </p:pic>
     </p:spTree>
     <p:extLst>
       <p:ext uri="{BB962C8B-B14F-4D97-AF65-F5344CB8AC3E}">
@@ -26956,8 +27522,8 @@
         </p:nvSpPr>
         <p:spPr>
           <a:xfrm>
-            <a:off x="7007145" y="1241266"/>
-            <a:ext cx="4535926" cy="3153753"/>
+            <a:off x="8382055" y="1241266"/>
+            <a:ext cx="3161016" cy="3153753"/>
           </a:xfrm>
         </p:spPr>
         <p:txBody>
@@ -26967,7 +27533,7 @@
           <a:lstStyle/>
           <a:p>
             <a:r>
-              <a:rPr lang="en-US" sz="3800">
+              <a:rPr lang="en-US" sz="2600">
                 <a:solidFill>
                   <a:srgbClr val="EBEBEB"/>
                 </a:solidFill>
@@ -26979,10 +27545,10 @@
       </p:sp>
       <p:grpSp>
         <p:nvGrpSpPr>
-          <p:cNvPr id="8" name="Group 7">
+          <p:cNvPr id="16" name="Group 15">
             <a:extLst>
               <a:ext uri="{FF2B5EF4-FFF2-40B4-BE49-F238E27FC236}">
-                <a16:creationId xmlns:a16="http://schemas.microsoft.com/office/drawing/2014/main" id="{7E2D86BB-893F-471B-AD66-50E01777C082}"/>
+                <a16:creationId xmlns:a16="http://schemas.microsoft.com/office/drawing/2014/main" id="{25A657F0-42F3-40D3-BC75-7DA1F5C6A225}"/>
               </a:ext>
               <a:ext uri="{C183D7F6-B498-43B3-948B-1728B52AA6E4}">
                 <adec:decorative xmlns:adec="http://schemas.microsoft.com/office/drawing/2017/decorative" val="1"/>
@@ -27002,18 +27568,18 @@
         </p:nvGrpSpPr>
         <p:grpSpPr>
           <a:xfrm>
-            <a:off x="423333" y="396837"/>
-            <a:ext cx="6451503" cy="6058999"/>
-            <a:chOff x="423333" y="396837"/>
-            <a:chExt cx="6451503" cy="6058999"/>
+            <a:off x="423332" y="396837"/>
+            <a:ext cx="7906665" cy="6058999"/>
+            <a:chOff x="423332" y="396837"/>
+            <a:chExt cx="7906665" cy="6058999"/>
           </a:xfrm>
         </p:grpSpPr>
         <p:sp>
           <p:nvSpPr>
-            <p:cNvPr id="9" name="Rectangle 8">
+            <p:cNvPr id="17" name="Rectangle 16">
               <a:extLst>
                 <a:ext uri="{FF2B5EF4-FFF2-40B4-BE49-F238E27FC236}">
-                  <a16:creationId xmlns:a16="http://schemas.microsoft.com/office/drawing/2014/main" id="{61E3F80D-79C6-468A-83E4-3FEA585566FA}"/>
+                  <a16:creationId xmlns:a16="http://schemas.microsoft.com/office/drawing/2014/main" id="{2E94FF68-7A60-47B7-AB98-1674FC7F2D14}"/>
                 </a:ext>
                 <a:ext uri="{C183D7F6-B498-43B3-948B-1728B52AA6E4}">
                   <adec:decorative xmlns:adec="http://schemas.microsoft.com/office/drawing/2017/decorative" val="1"/>
@@ -27031,8 +27597,8 @@
           </p:nvSpPr>
           <p:spPr bwMode="gray">
             <a:xfrm flipH="1">
-              <a:off x="423333" y="402165"/>
-              <a:ext cx="5229339" cy="6053670"/>
+              <a:off x="423332" y="402165"/>
+              <a:ext cx="6785133" cy="6053670"/>
             </a:xfrm>
             <a:prstGeom prst="rect">
               <a:avLst/>
@@ -27062,10 +27628,10 @@
         </p:sp>
         <p:sp>
           <p:nvSpPr>
-            <p:cNvPr id="10" name="Freeform 5">
+            <p:cNvPr id="18" name="Freeform 5">
               <a:extLst>
                 <a:ext uri="{FF2B5EF4-FFF2-40B4-BE49-F238E27FC236}">
-                  <a16:creationId xmlns:a16="http://schemas.microsoft.com/office/drawing/2014/main" id="{009504C1-96CE-44B4-8DF0-613CF9D1DABE}"/>
+                  <a16:creationId xmlns:a16="http://schemas.microsoft.com/office/drawing/2014/main" id="{42B4F8D7-4E9C-45EF-9072-1AF32CEF7102}"/>
                 </a:ext>
                 <a:ext uri="{C183D7F6-B498-43B3-948B-1728B52AA6E4}">
                   <adec:decorative xmlns:adec="http://schemas.microsoft.com/office/drawing/2017/decorative" val="1"/>
@@ -27083,7 +27649,7 @@
           </p:nvSpPr>
           <p:spPr bwMode="gray">
             <a:xfrm rot="5400000" flipH="1">
-              <a:off x="3161515" y="2801722"/>
+              <a:off x="4616676" y="2801722"/>
               <a:ext cx="6053670" cy="1254558"/>
             </a:xfrm>
             <a:custGeom>
@@ -27261,10 +27827,10 @@
         </p:sp>
         <p:sp>
           <p:nvSpPr>
-            <p:cNvPr id="11" name="Freeform 5">
+            <p:cNvPr id="19" name="Freeform 5">
               <a:extLst>
                 <a:ext uri="{FF2B5EF4-FFF2-40B4-BE49-F238E27FC236}">
-                  <a16:creationId xmlns:a16="http://schemas.microsoft.com/office/drawing/2014/main" id="{1F299836-4C10-4395-B386-C0FA537C417E}"/>
+                  <a16:creationId xmlns:a16="http://schemas.microsoft.com/office/drawing/2014/main" id="{3ECBDDDB-593C-40F0-8E80-AA75798EE40C}"/>
                 </a:ext>
                 <a:ext uri="{C183D7F6-B498-43B3-948B-1728B52AA6E4}">
                   <adec:decorative xmlns:adec="http://schemas.microsoft.com/office/drawing/2017/decorative" val="1"/>
@@ -27282,7 +27848,7 @@
           </p:nvSpPr>
           <p:spPr bwMode="gray">
             <a:xfrm rot="5677511" flipH="1">
-              <a:off x="5004670" y="1826079"/>
+              <a:off x="6459831" y="1826079"/>
               <a:ext cx="3299407" cy="440924"/>
             </a:xfrm>
             <a:custGeom>
@@ -27424,7 +27990,7 @@
       </p:grpSp>
       <p:pic>
         <p:nvPicPr>
-          <p:cNvPr id="3" name="Picture 2">
+          <p:cNvPr id="3" name="Picture 2" descr="Chart, bar chart&#10;&#10;Description automatically generated">
             <a:extLst>
               <a:ext uri="{FF2B5EF4-FFF2-40B4-BE49-F238E27FC236}">
                 <a16:creationId xmlns:a16="http://schemas.microsoft.com/office/drawing/2014/main" id="{9B7F6766-9AA7-3B44-87B8-610A6AB7F623}"/>
@@ -27444,8 +28010,8 @@
         </p:blipFill>
         <p:spPr>
           <a:xfrm>
-            <a:off x="1109763" y="1890271"/>
-            <a:ext cx="4983737" cy="3077457"/>
+            <a:off x="1109763" y="1439668"/>
+            <a:ext cx="6443180" cy="3978663"/>
           </a:xfrm>
           <a:prstGeom prst="rect">
             <a:avLst/>

</xml_diff>

<commit_message>
presentation and notebook updated - accommodation
presentation and notebook updated - with the first accommodation plot
</commit_message>
<xml_diff>
--- a/presentation/visit_scotland_presentation.pptx
+++ b/presentation/visit_scotland_presentation.pptx
@@ -214,7 +214,7 @@
           <a:p>
             <a:fld id="{39E45C5B-EFBF-B347-8741-23B5D567B9D2}" type="datetimeFigureOut">
               <a:rPr lang="en-US" smtClean="0"/>
-              <a:t>2/14/22</a:t>
+              <a:t>2/15/22</a:t>
             </a:fld>
             <a:endParaRPr lang="en-US"/>
           </a:p>
@@ -2707,7 +2707,7 @@
           <a:p>
             <a:fld id="{271C8135-AB25-DB40-A95F-47B2B066DEC0}" type="datetimeFigureOut">
               <a:rPr lang="en-US" smtClean="0"/>
-              <a:t>2/14/22</a:t>
+              <a:t>2/15/22</a:t>
             </a:fld>
             <a:endParaRPr lang="en-US"/>
           </a:p>
@@ -3795,7 +3795,7 @@
           <a:p>
             <a:fld id="{271C8135-AB25-DB40-A95F-47B2B066DEC0}" type="datetimeFigureOut">
               <a:rPr lang="en-US" smtClean="0"/>
-              <a:t>2/14/22</a:t>
+              <a:t>2/15/22</a:t>
             </a:fld>
             <a:endParaRPr lang="en-US"/>
           </a:p>
@@ -4775,7 +4775,7 @@
           <a:p>
             <a:fld id="{271C8135-AB25-DB40-A95F-47B2B066DEC0}" type="datetimeFigureOut">
               <a:rPr lang="en-US" smtClean="0"/>
-              <a:t>2/14/22</a:t>
+              <a:t>2/15/22</a:t>
             </a:fld>
             <a:endParaRPr lang="en-US"/>
           </a:p>
@@ -5909,7 +5909,7 @@
           <a:p>
             <a:fld id="{271C8135-AB25-DB40-A95F-47B2B066DEC0}" type="datetimeFigureOut">
               <a:rPr lang="en-US" smtClean="0"/>
-              <a:t>2/14/22</a:t>
+              <a:t>2/15/22</a:t>
             </a:fld>
             <a:endParaRPr lang="en-US"/>
           </a:p>
@@ -6942,7 +6942,7 @@
           <a:p>
             <a:fld id="{271C8135-AB25-DB40-A95F-47B2B066DEC0}" type="datetimeFigureOut">
               <a:rPr lang="en-US" smtClean="0"/>
-              <a:t>2/14/22</a:t>
+              <a:t>2/15/22</a:t>
             </a:fld>
             <a:endParaRPr lang="en-US"/>
           </a:p>
@@ -7602,7 +7602,7 @@
           <a:p>
             <a:fld id="{271C8135-AB25-DB40-A95F-47B2B066DEC0}" type="datetimeFigureOut">
               <a:rPr lang="en-US" smtClean="0"/>
-              <a:t>2/14/22</a:t>
+              <a:t>2/15/22</a:t>
             </a:fld>
             <a:endParaRPr lang="en-US"/>
           </a:p>
@@ -8463,7 +8463,7 @@
           <a:p>
             <a:fld id="{271C8135-AB25-DB40-A95F-47B2B066DEC0}" type="datetimeFigureOut">
               <a:rPr lang="en-US" smtClean="0"/>
-              <a:t>2/14/22</a:t>
+              <a:t>2/15/22</a:t>
             </a:fld>
             <a:endParaRPr lang="en-US"/>
           </a:p>
@@ -8653,7 +8653,7 @@
           <a:p>
             <a:fld id="{271C8135-AB25-DB40-A95F-47B2B066DEC0}" type="datetimeFigureOut">
               <a:rPr lang="en-US" smtClean="0"/>
-              <a:t>2/14/22</a:t>
+              <a:t>2/15/22</a:t>
             </a:fld>
             <a:endParaRPr lang="en-US"/>
           </a:p>
@@ -9625,7 +9625,7 @@
           <a:p>
             <a:fld id="{271C8135-AB25-DB40-A95F-47B2B066DEC0}" type="datetimeFigureOut">
               <a:rPr lang="en-US" smtClean="0"/>
-              <a:t>2/14/22</a:t>
+              <a:t>2/15/22</a:t>
             </a:fld>
             <a:endParaRPr lang="en-US"/>
           </a:p>
@@ -9836,7 +9836,7 @@
           <a:p>
             <a:fld id="{271C8135-AB25-DB40-A95F-47B2B066DEC0}" type="datetimeFigureOut">
               <a:rPr lang="en-US" smtClean="0"/>
-              <a:t>2/14/22</a:t>
+              <a:t>2/15/22</a:t>
             </a:fld>
             <a:endParaRPr lang="en-US"/>
           </a:p>
@@ -10870,7 +10870,7 @@
           <a:p>
             <a:fld id="{271C8135-AB25-DB40-A95F-47B2B066DEC0}" type="datetimeFigureOut">
               <a:rPr lang="en-US" smtClean="0"/>
-              <a:t>2/14/22</a:t>
+              <a:t>2/15/22</a:t>
             </a:fld>
             <a:endParaRPr lang="en-US"/>
           </a:p>
@@ -11142,7 +11142,7 @@
           <a:p>
             <a:fld id="{271C8135-AB25-DB40-A95F-47B2B066DEC0}" type="datetimeFigureOut">
               <a:rPr lang="en-US" smtClean="0"/>
-              <a:t>2/14/22</a:t>
+              <a:t>2/15/22</a:t>
             </a:fld>
             <a:endParaRPr lang="en-US"/>
           </a:p>
@@ -11552,7 +11552,7 @@
           <a:p>
             <a:fld id="{271C8135-AB25-DB40-A95F-47B2B066DEC0}" type="datetimeFigureOut">
               <a:rPr lang="en-US" smtClean="0"/>
-              <a:t>2/14/22</a:t>
+              <a:t>2/15/22</a:t>
             </a:fld>
             <a:endParaRPr lang="en-US"/>
           </a:p>
@@ -11679,7 +11679,7 @@
           <a:p>
             <a:fld id="{271C8135-AB25-DB40-A95F-47B2B066DEC0}" type="datetimeFigureOut">
               <a:rPr lang="en-US" smtClean="0"/>
-              <a:t>2/14/22</a:t>
+              <a:t>2/15/22</a:t>
             </a:fld>
             <a:endParaRPr lang="en-US"/>
           </a:p>
@@ -11774,7 +11774,7 @@
           <a:p>
             <a:fld id="{271C8135-AB25-DB40-A95F-47B2B066DEC0}" type="datetimeFigureOut">
               <a:rPr lang="en-US" smtClean="0"/>
-              <a:t>2/14/22</a:t>
+              <a:t>2/15/22</a:t>
             </a:fld>
             <a:endParaRPr lang="en-US"/>
           </a:p>
@@ -12855,7 +12855,7 @@
           <a:p>
             <a:fld id="{271C8135-AB25-DB40-A95F-47B2B066DEC0}" type="datetimeFigureOut">
               <a:rPr lang="en-US" smtClean="0"/>
-              <a:t>2/14/22</a:t>
+              <a:t>2/15/22</a:t>
             </a:fld>
             <a:endParaRPr lang="en-US"/>
           </a:p>
@@ -13963,7 +13963,7 @@
           <a:p>
             <a:fld id="{271C8135-AB25-DB40-A95F-47B2B066DEC0}" type="datetimeFigureOut">
               <a:rPr lang="en-US" smtClean="0"/>
-              <a:t>2/14/22</a:t>
+              <a:t>2/15/22</a:t>
             </a:fld>
             <a:endParaRPr lang="en-US"/>
           </a:p>
@@ -14960,7 +14960,7 @@
           <a:p>
             <a:fld id="{271C8135-AB25-DB40-A95F-47B2B066DEC0}" type="datetimeFigureOut">
               <a:rPr lang="en-US" smtClean="0"/>
-              <a:t>2/14/22</a:t>
+              <a:t>2/15/22</a:t>
             </a:fld>
             <a:endParaRPr lang="en-US"/>
           </a:p>
@@ -27545,7 +27545,7 @@
       </p:sp>
       <p:grpSp>
         <p:nvGrpSpPr>
-          <p:cNvPr id="16" name="Group 15">
+          <p:cNvPr id="24" name="Group 23">
             <a:extLst>
               <a:ext uri="{FF2B5EF4-FFF2-40B4-BE49-F238E27FC236}">
                 <a16:creationId xmlns:a16="http://schemas.microsoft.com/office/drawing/2014/main" id="{25A657F0-42F3-40D3-BC75-7DA1F5C6A225}"/>
@@ -27576,7 +27576,7 @@
         </p:grpSpPr>
         <p:sp>
           <p:nvSpPr>
-            <p:cNvPr id="17" name="Rectangle 16">
+            <p:cNvPr id="25" name="Rectangle 24">
               <a:extLst>
                 <a:ext uri="{FF2B5EF4-FFF2-40B4-BE49-F238E27FC236}">
                   <a16:creationId xmlns:a16="http://schemas.microsoft.com/office/drawing/2014/main" id="{2E94FF68-7A60-47B7-AB98-1674FC7F2D14}"/>
@@ -27628,7 +27628,7 @@
         </p:sp>
         <p:sp>
           <p:nvSpPr>
-            <p:cNvPr id="18" name="Freeform 5">
+            <p:cNvPr id="26" name="Freeform 5">
               <a:extLst>
                 <a:ext uri="{FF2B5EF4-FFF2-40B4-BE49-F238E27FC236}">
                   <a16:creationId xmlns:a16="http://schemas.microsoft.com/office/drawing/2014/main" id="{42B4F8D7-4E9C-45EF-9072-1AF32CEF7102}"/>
@@ -27827,7 +27827,7 @@
         </p:sp>
         <p:sp>
           <p:nvSpPr>
-            <p:cNvPr id="19" name="Freeform 5">
+            <p:cNvPr id="27" name="Freeform 5">
               <a:extLst>
                 <a:ext uri="{FF2B5EF4-FFF2-40B4-BE49-F238E27FC236}">
                   <a16:creationId xmlns:a16="http://schemas.microsoft.com/office/drawing/2014/main" id="{3ECBDDDB-593C-40F0-8E80-AA75798EE40C}"/>
@@ -27990,10 +27990,10 @@
       </p:grpSp>
       <p:pic>
         <p:nvPicPr>
-          <p:cNvPr id="3" name="Picture 2" descr="Chart, bar chart&#10;&#10;Description automatically generated">
+          <p:cNvPr id="4" name="Picture 3">
             <a:extLst>
               <a:ext uri="{FF2B5EF4-FFF2-40B4-BE49-F238E27FC236}">
-                <a16:creationId xmlns:a16="http://schemas.microsoft.com/office/drawing/2014/main" id="{9B7F6766-9AA7-3B44-87B8-610A6AB7F623}"/>
+                <a16:creationId xmlns:a16="http://schemas.microsoft.com/office/drawing/2014/main" id="{CED12498-0AA4-E546-A0E6-9FDEDE9D714C}"/>
               </a:ext>
             </a:extLst>
           </p:cNvPr>

</xml_diff>

<commit_message>
accommodation plots and slides corrected
accommodation plots and slides corrected
</commit_message>
<xml_diff>
--- a/presentation/visit_scotland_presentation.pptx
+++ b/presentation/visit_scotland_presentation.pptx
@@ -1894,11 +1894,7 @@
           <a:p>
             <a:r>
               <a:rPr lang="en-US" sz="1200" dirty="0"/>
-              <a:t>NOTE TO SELF – the accommodation plot here, or on the accommodation slide needs to go. </a:t>
-            </a:r>
-            <a:r>
-              <a:rPr lang="en-US" sz="1200"/>
-              <a:t>It’s duplicated.</a:t>
+              <a:t>NOTE TO SELF – the accommodation plot here, or on the accommodation slide needs to go. It’s duplicated.</a:t>
             </a:r>
           </a:p>
           <a:p>
@@ -2012,8 +2008,11 @@
           <a:p>
             <a:r>
               <a:rPr lang="en-US" i="0" dirty="0"/>
-              <a:t>Hotels are most popular, 66% is the average occupancy – with B&amp;B second at 44%</a:t>
+              <a:t>Hotels are most popular, 66% is the average bed occupancy and 86% room occupancy – with B&amp;B second at 44% bed occ, and 53% room occ.</a:t>
             </a:r>
+          </a:p>
+          <a:p>
+            <a:endParaRPr lang="en-US" i="0" dirty="0"/>
           </a:p>
           <a:p>
             <a:endParaRPr lang="en-US" i="1" dirty="0"/>
@@ -2116,9 +2115,12 @@
           <a:bodyPr/>
           <a:lstStyle/>
           <a:p>
+            <a:endParaRPr lang="en-US" dirty="0"/>
+          </a:p>
+          <a:p>
             <a:r>
               <a:rPr lang="en-US" dirty="0"/>
-              <a:t>As just outlined, the difference between hotels and B&amp;B’s is quite significant when looking overall (20 percentage points) – but when breaking down by urban areas, it is 23% and 18% respectively. </a:t>
+              <a:t>Urban area – 68%</a:t>
             </a:r>
           </a:p>
           <a:p>
@@ -27448,10 +27450,10 @@
       </p:sp>
       <p:pic>
         <p:nvPicPr>
-          <p:cNvPr id="9" name="Picture 8">
+          <p:cNvPr id="4" name="Picture 3">
             <a:extLst>
               <a:ext uri="{FF2B5EF4-FFF2-40B4-BE49-F238E27FC236}">
-                <a16:creationId xmlns:a16="http://schemas.microsoft.com/office/drawing/2014/main" id="{362C6A19-D7B5-434F-B623-BB8B95DCEF78}"/>
+                <a16:creationId xmlns:a16="http://schemas.microsoft.com/office/drawing/2014/main" id="{5A03F157-7E6E-6844-B93B-6D031557F553}"/>
               </a:ext>
             </a:extLst>
           </p:cNvPr>
@@ -27468,8 +27470,8 @@
         </p:blipFill>
         <p:spPr>
           <a:xfrm>
-            <a:off x="797454" y="474133"/>
-            <a:ext cx="5164002" cy="3185586"/>
+            <a:off x="648931" y="569662"/>
+            <a:ext cx="5263506" cy="3246968"/>
           </a:xfrm>
           <a:prstGeom prst="rect">
             <a:avLst/>
@@ -28873,10 +28875,10 @@
       </p:sp>
       <p:pic>
         <p:nvPicPr>
-          <p:cNvPr id="5" name="Picture 4">
+          <p:cNvPr id="6" name="Picture 5">
             <a:extLst>
               <a:ext uri="{FF2B5EF4-FFF2-40B4-BE49-F238E27FC236}">
-                <a16:creationId xmlns:a16="http://schemas.microsoft.com/office/drawing/2014/main" id="{0EB4F0AC-5BCF-734F-8E93-1AE6A6BD9E68}"/>
+                <a16:creationId xmlns:a16="http://schemas.microsoft.com/office/drawing/2014/main" id="{FFB0594A-FDF1-1649-ADE6-33D3396D590E}"/>
               </a:ext>
             </a:extLst>
           </p:cNvPr>
@@ -28893,8 +28895,8 @@
         </p:blipFill>
         <p:spPr>
           <a:xfrm>
-            <a:off x="797454" y="474133"/>
-            <a:ext cx="5164002" cy="3185586"/>
+            <a:off x="487049" y="359810"/>
+            <a:ext cx="5370123" cy="3312738"/>
           </a:xfrm>
           <a:prstGeom prst="rect">
             <a:avLst/>

</xml_diff>